<commit_message>
PPT for case study version-1
</commit_message>
<xml_diff>
--- a/lending_club_case_study.pptx
+++ b/lending_club_case_study.pptx
@@ -1355,8 +1355,8 @@
         </p:nvSpPr>
         <p:spPr>
           <a:xfrm>
-            <a:off x="1569720" y="4147072"/>
-            <a:ext cx="9677400" cy="782265"/>
+            <a:off x="1569720" y="3762351"/>
+            <a:ext cx="9677400" cy="1551707"/>
           </a:xfrm>
           <a:prstGeom prst="rect">
             <a:avLst/>
@@ -1416,6 +1416,14 @@
               </a:rPr>
               <a:t>Study</a:t>
             </a:r>
+            <a:br>
+              <a:rPr lang="en-IN" b="1" spc="-10" dirty="0">
+                <a:latin typeface="+mn-lt"/>
+              </a:rPr>
+            </a:br>
+            <a:endParaRPr b="1" spc="-10" dirty="0">
+              <a:latin typeface="+mn-lt"/>
+            </a:endParaRPr>
           </a:p>
         </p:txBody>
       </p:sp>
@@ -1615,6 +1623,114 @@
           </a:p>
         </p:txBody>
       </p:sp>
+      <p:pic>
+        <p:nvPicPr>
+          <p:cNvPr id="5" name="Graphic 4" descr="Rupee">
+            <a:extLst>
+              <a:ext uri="{FF2B5EF4-FFF2-40B4-BE49-F238E27FC236}">
+                <a16:creationId xmlns:a16="http://schemas.microsoft.com/office/drawing/2014/main" id="{FF3611EB-5E0A-3DB4-5DC0-595BF4B77A4D}"/>
+              </a:ext>
+            </a:extLst>
+          </p:cNvPr>
+          <p:cNvPicPr>
+            <a:picLocks noChangeAspect="1"/>
+          </p:cNvPicPr>
+          <p:nvPr/>
+        </p:nvPicPr>
+        <p:blipFill>
+          <a:blip r:embed="rId2">
+            <a:extLst>
+              <a:ext uri="{96DAC541-7B7A-43D3-8B79-37D633B846F1}">
+                <asvg:svgBlip xmlns:asvg="http://schemas.microsoft.com/office/drawing/2016/SVG/main" r:embed="rId3"/>
+              </a:ext>
+            </a:extLst>
+          </a:blip>
+          <a:stretch>
+            <a:fillRect/>
+          </a:stretch>
+        </p:blipFill>
+        <p:spPr>
+          <a:xfrm>
+            <a:off x="2379572" y="3657600"/>
+            <a:ext cx="914400" cy="914400"/>
+          </a:xfrm>
+          <a:prstGeom prst="rect">
+            <a:avLst/>
+          </a:prstGeom>
+        </p:spPr>
+      </p:pic>
+      <p:pic>
+        <p:nvPicPr>
+          <p:cNvPr id="7" name="Graphic 6" descr="Coins">
+            <a:extLst>
+              <a:ext uri="{FF2B5EF4-FFF2-40B4-BE49-F238E27FC236}">
+                <a16:creationId xmlns:a16="http://schemas.microsoft.com/office/drawing/2014/main" id="{20646688-5A44-5270-1997-90CADB3AF403}"/>
+              </a:ext>
+            </a:extLst>
+          </p:cNvPr>
+          <p:cNvPicPr>
+            <a:picLocks noChangeAspect="1"/>
+          </p:cNvPicPr>
+          <p:nvPr/>
+        </p:nvPicPr>
+        <p:blipFill>
+          <a:blip r:embed="rId4">
+            <a:extLst>
+              <a:ext uri="{96DAC541-7B7A-43D3-8B79-37D633B846F1}">
+                <asvg:svgBlip xmlns:asvg="http://schemas.microsoft.com/office/drawing/2016/SVG/main" r:embed="rId5"/>
+              </a:ext>
+            </a:extLst>
+          </a:blip>
+          <a:stretch>
+            <a:fillRect/>
+          </a:stretch>
+        </p:blipFill>
+        <p:spPr>
+          <a:xfrm>
+            <a:off x="6959192" y="4572000"/>
+            <a:ext cx="914400" cy="914400"/>
+          </a:xfrm>
+          <a:prstGeom prst="rect">
+            <a:avLst/>
+          </a:prstGeom>
+        </p:spPr>
+      </p:pic>
+      <p:pic>
+        <p:nvPicPr>
+          <p:cNvPr id="8" name="Graphic 7" descr="Coins">
+            <a:extLst>
+              <a:ext uri="{FF2B5EF4-FFF2-40B4-BE49-F238E27FC236}">
+                <a16:creationId xmlns:a16="http://schemas.microsoft.com/office/drawing/2014/main" id="{71D1B8CB-3DFD-BBB6-F3FD-63713BE83A23}"/>
+              </a:ext>
+            </a:extLst>
+          </p:cNvPr>
+          <p:cNvPicPr>
+            <a:picLocks noChangeAspect="1"/>
+          </p:cNvPicPr>
+          <p:nvPr/>
+        </p:nvPicPr>
+        <p:blipFill>
+          <a:blip r:embed="rId4">
+            <a:extLst>
+              <a:ext uri="{96DAC541-7B7A-43D3-8B79-37D633B846F1}">
+                <asvg:svgBlip xmlns:asvg="http://schemas.microsoft.com/office/drawing/2016/SVG/main" r:embed="rId5"/>
+              </a:ext>
+            </a:extLst>
+          </a:blip>
+          <a:stretch>
+            <a:fillRect/>
+          </a:stretch>
+        </p:blipFill>
+        <p:spPr>
+          <a:xfrm>
+            <a:off x="7985760" y="4538204"/>
+            <a:ext cx="914400" cy="914400"/>
+          </a:xfrm>
+          <a:prstGeom prst="rect">
+            <a:avLst/>
+          </a:prstGeom>
+        </p:spPr>
+      </p:pic>
     </p:spTree>
   </p:cSld>
   <p:clrMapOvr>

</xml_diff>

<commit_message>
PPT for case study version-2
</commit_message>
<xml_diff>
--- a/lending_club_case_study.pptx
+++ b/lending_club_case_study.pptx
@@ -4,13 +4,17 @@
   <p:sldMasterIdLst>
     <p:sldMasterId id="2147483648" r:id="rId1"/>
   </p:sldMasterIdLst>
+  <p:notesMasterIdLst>
+    <p:notesMasterId r:id="rId9"/>
+  </p:notesMasterIdLst>
   <p:sldIdLst>
     <p:sldId id="256" r:id="rId2"/>
     <p:sldId id="257" r:id="rId3"/>
-    <p:sldId id="258" r:id="rId4"/>
-    <p:sldId id="260" r:id="rId5"/>
-    <p:sldId id="261" r:id="rId6"/>
-    <p:sldId id="259" r:id="rId7"/>
+    <p:sldId id="262" r:id="rId4"/>
+    <p:sldId id="258" r:id="rId5"/>
+    <p:sldId id="260" r:id="rId6"/>
+    <p:sldId id="261" r:id="rId7"/>
+    <p:sldId id="259" r:id="rId8"/>
   </p:sldIdLst>
   <p:sldSz cx="12192000" cy="10058400"/>
   <p:notesSz cx="12192000" cy="10058400"/>
@@ -38,6 +42,356 @@
 </p:presentation>
 </file>
 
+<file path=ppt/notesMasters/notesMaster1.xml><?xml version="1.0" encoding="utf-8"?>
+<p:notesMaster xmlns:a="http://schemas.openxmlformats.org/drawingml/2006/main" xmlns:r="http://schemas.openxmlformats.org/officeDocument/2006/relationships" xmlns:p="http://schemas.openxmlformats.org/presentationml/2006/main">
+  <p:cSld>
+    <p:bg>
+      <p:bgRef idx="1001">
+        <a:schemeClr val="bg1"/>
+      </p:bgRef>
+    </p:bg>
+    <p:spTree>
+      <p:nvGrpSpPr>
+        <p:cNvPr id="1" name=""/>
+        <p:cNvGrpSpPr/>
+        <p:nvPr/>
+      </p:nvGrpSpPr>
+      <p:grpSpPr>
+        <a:xfrm>
+          <a:off x="0" y="0"/>
+          <a:ext cx="0" cy="0"/>
+          <a:chOff x="0" y="0"/>
+          <a:chExt cx="0" cy="0"/>
+        </a:xfrm>
+      </p:grpSpPr>
+      <p:sp>
+        <p:nvSpPr>
+          <p:cNvPr id="2" name="Header Placeholder 1"/>
+          <p:cNvSpPr>
+            <a:spLocks noGrp="1"/>
+          </p:cNvSpPr>
+          <p:nvPr>
+            <p:ph type="hdr" sz="quarter"/>
+          </p:nvPr>
+        </p:nvSpPr>
+        <p:spPr>
+          <a:xfrm>
+            <a:off x="0" y="0"/>
+            <a:ext cx="5283200" cy="504825"/>
+          </a:xfrm>
+          <a:prstGeom prst="rect">
+            <a:avLst/>
+          </a:prstGeom>
+        </p:spPr>
+        <p:txBody>
+          <a:bodyPr vert="horz" lIns="91440" tIns="45720" rIns="91440" bIns="45720" rtlCol="0"/>
+          <a:lstStyle>
+            <a:lvl1pPr algn="l">
+              <a:defRPr sz="1200"/>
+            </a:lvl1pPr>
+          </a:lstStyle>
+          <a:p>
+            <a:endParaRPr lang="en-IN"/>
+          </a:p>
+        </p:txBody>
+      </p:sp>
+      <p:sp>
+        <p:nvSpPr>
+          <p:cNvPr id="3" name="Date Placeholder 2"/>
+          <p:cNvSpPr>
+            <a:spLocks noGrp="1"/>
+          </p:cNvSpPr>
+          <p:nvPr>
+            <p:ph type="dt" idx="1"/>
+          </p:nvPr>
+        </p:nvSpPr>
+        <p:spPr>
+          <a:xfrm>
+            <a:off x="6905625" y="0"/>
+            <a:ext cx="5283200" cy="504825"/>
+          </a:xfrm>
+          <a:prstGeom prst="rect">
+            <a:avLst/>
+          </a:prstGeom>
+        </p:spPr>
+        <p:txBody>
+          <a:bodyPr vert="horz" lIns="91440" tIns="45720" rIns="91440" bIns="45720" rtlCol="0"/>
+          <a:lstStyle>
+            <a:lvl1pPr algn="r">
+              <a:defRPr sz="1200"/>
+            </a:lvl1pPr>
+          </a:lstStyle>
+          <a:p>
+            <a:fld id="{C75D3387-C564-4E9D-B894-3D0A5F35EB9E}" type="datetimeFigureOut">
+              <a:rPr lang="en-IN" smtClean="0"/>
+              <a:t>15-11-2024</a:t>
+            </a:fld>
+            <a:endParaRPr lang="en-IN"/>
+          </a:p>
+        </p:txBody>
+      </p:sp>
+      <p:sp>
+        <p:nvSpPr>
+          <p:cNvPr id="4" name="Slide Image Placeholder 3"/>
+          <p:cNvSpPr>
+            <a:spLocks noGrp="1" noRot="1" noChangeAspect="1"/>
+          </p:cNvSpPr>
+          <p:nvPr>
+            <p:ph type="sldImg" idx="2"/>
+          </p:nvPr>
+        </p:nvSpPr>
+        <p:spPr>
+          <a:xfrm>
+            <a:off x="4038600" y="1257300"/>
+            <a:ext cx="4114800" cy="3394075"/>
+          </a:xfrm>
+          <a:prstGeom prst="rect">
+            <a:avLst/>
+          </a:prstGeom>
+          <a:noFill/>
+          <a:ln w="12700">
+            <a:solidFill>
+              <a:prstClr val="black"/>
+            </a:solidFill>
+          </a:ln>
+        </p:spPr>
+        <p:txBody>
+          <a:bodyPr vert="horz" lIns="91440" tIns="45720" rIns="91440" bIns="45720" rtlCol="0" anchor="ctr"/>
+          <a:lstStyle/>
+          <a:p>
+            <a:endParaRPr lang="en-IN"/>
+          </a:p>
+        </p:txBody>
+      </p:sp>
+      <p:sp>
+        <p:nvSpPr>
+          <p:cNvPr id="5" name="Notes Placeholder 4"/>
+          <p:cNvSpPr>
+            <a:spLocks noGrp="1"/>
+          </p:cNvSpPr>
+          <p:nvPr>
+            <p:ph type="body" sz="quarter" idx="3"/>
+          </p:nvPr>
+        </p:nvSpPr>
+        <p:spPr>
+          <a:xfrm>
+            <a:off x="1219200" y="4840288"/>
+            <a:ext cx="9753600" cy="3960812"/>
+          </a:xfrm>
+          <a:prstGeom prst="rect">
+            <a:avLst/>
+          </a:prstGeom>
+        </p:spPr>
+        <p:txBody>
+          <a:bodyPr vert="horz" lIns="91440" tIns="45720" rIns="91440" bIns="45720" rtlCol="0"/>
+          <a:lstStyle/>
+          <a:p>
+            <a:pPr lvl="0"/>
+            <a:r>
+              <a:rPr lang="en-US"/>
+              <a:t>Click to edit Master text styles</a:t>
+            </a:r>
+          </a:p>
+          <a:p>
+            <a:pPr lvl="1"/>
+            <a:r>
+              <a:rPr lang="en-US"/>
+              <a:t>Second level</a:t>
+            </a:r>
+          </a:p>
+          <a:p>
+            <a:pPr lvl="2"/>
+            <a:r>
+              <a:rPr lang="en-US"/>
+              <a:t>Third level</a:t>
+            </a:r>
+          </a:p>
+          <a:p>
+            <a:pPr lvl="3"/>
+            <a:r>
+              <a:rPr lang="en-US"/>
+              <a:t>Fourth level</a:t>
+            </a:r>
+          </a:p>
+          <a:p>
+            <a:pPr lvl="4"/>
+            <a:r>
+              <a:rPr lang="en-US"/>
+              <a:t>Fifth level</a:t>
+            </a:r>
+            <a:endParaRPr lang="en-IN"/>
+          </a:p>
+        </p:txBody>
+      </p:sp>
+      <p:sp>
+        <p:nvSpPr>
+          <p:cNvPr id="6" name="Footer Placeholder 5"/>
+          <p:cNvSpPr>
+            <a:spLocks noGrp="1"/>
+          </p:cNvSpPr>
+          <p:nvPr>
+            <p:ph type="ftr" sz="quarter" idx="4"/>
+          </p:nvPr>
+        </p:nvSpPr>
+        <p:spPr>
+          <a:xfrm>
+            <a:off x="0" y="9553575"/>
+            <a:ext cx="5283200" cy="504825"/>
+          </a:xfrm>
+          <a:prstGeom prst="rect">
+            <a:avLst/>
+          </a:prstGeom>
+        </p:spPr>
+        <p:txBody>
+          <a:bodyPr vert="horz" lIns="91440" tIns="45720" rIns="91440" bIns="45720" rtlCol="0" anchor="b"/>
+          <a:lstStyle>
+            <a:lvl1pPr algn="l">
+              <a:defRPr sz="1200"/>
+            </a:lvl1pPr>
+          </a:lstStyle>
+          <a:p>
+            <a:endParaRPr lang="en-IN"/>
+          </a:p>
+        </p:txBody>
+      </p:sp>
+      <p:sp>
+        <p:nvSpPr>
+          <p:cNvPr id="7" name="Slide Number Placeholder 6"/>
+          <p:cNvSpPr>
+            <a:spLocks noGrp="1"/>
+          </p:cNvSpPr>
+          <p:nvPr>
+            <p:ph type="sldNum" sz="quarter" idx="5"/>
+          </p:nvPr>
+        </p:nvSpPr>
+        <p:spPr>
+          <a:xfrm>
+            <a:off x="6905625" y="9553575"/>
+            <a:ext cx="5283200" cy="504825"/>
+          </a:xfrm>
+          <a:prstGeom prst="rect">
+            <a:avLst/>
+          </a:prstGeom>
+        </p:spPr>
+        <p:txBody>
+          <a:bodyPr vert="horz" lIns="91440" tIns="45720" rIns="91440" bIns="45720" rtlCol="0" anchor="b"/>
+          <a:lstStyle>
+            <a:lvl1pPr algn="r">
+              <a:defRPr sz="1200"/>
+            </a:lvl1pPr>
+          </a:lstStyle>
+          <a:p>
+            <a:fld id="{3605F0D7-6116-4BBB-A0C4-07256CEFAFDC}" type="slidenum">
+              <a:rPr lang="en-IN" smtClean="0"/>
+              <a:t>‹#›</a:t>
+            </a:fld>
+            <a:endParaRPr lang="en-IN"/>
+          </a:p>
+        </p:txBody>
+      </p:sp>
+    </p:spTree>
+    <p:extLst>
+      <p:ext uri="{BB962C8B-B14F-4D97-AF65-F5344CB8AC3E}">
+        <p14:creationId xmlns:p14="http://schemas.microsoft.com/office/powerpoint/2010/main" val="242782606"/>
+      </p:ext>
+    </p:extLst>
+  </p:cSld>
+  <p:clrMap bg1="lt1" tx1="dk1" bg2="lt2" tx2="dk2" accent1="accent1" accent2="accent2" accent3="accent3" accent4="accent4" accent5="accent5" accent6="accent6" hlink="hlink" folHlink="folHlink"/>
+  <p:notesStyle>
+    <a:lvl1pPr marL="0" algn="l" defTabSz="914400" rtl="0" eaLnBrk="1" latinLnBrk="0" hangingPunct="1">
+      <a:defRPr sz="1200" kern="1200">
+        <a:solidFill>
+          <a:schemeClr val="tx1"/>
+        </a:solidFill>
+        <a:latin typeface="+mn-lt"/>
+        <a:ea typeface="+mn-ea"/>
+        <a:cs typeface="+mn-cs"/>
+      </a:defRPr>
+    </a:lvl1pPr>
+    <a:lvl2pPr marL="457200" algn="l" defTabSz="914400" rtl="0" eaLnBrk="1" latinLnBrk="0" hangingPunct="1">
+      <a:defRPr sz="1200" kern="1200">
+        <a:solidFill>
+          <a:schemeClr val="tx1"/>
+        </a:solidFill>
+        <a:latin typeface="+mn-lt"/>
+        <a:ea typeface="+mn-ea"/>
+        <a:cs typeface="+mn-cs"/>
+      </a:defRPr>
+    </a:lvl2pPr>
+    <a:lvl3pPr marL="914400" algn="l" defTabSz="914400" rtl="0" eaLnBrk="1" latinLnBrk="0" hangingPunct="1">
+      <a:defRPr sz="1200" kern="1200">
+        <a:solidFill>
+          <a:schemeClr val="tx1"/>
+        </a:solidFill>
+        <a:latin typeface="+mn-lt"/>
+        <a:ea typeface="+mn-ea"/>
+        <a:cs typeface="+mn-cs"/>
+      </a:defRPr>
+    </a:lvl3pPr>
+    <a:lvl4pPr marL="1371600" algn="l" defTabSz="914400" rtl="0" eaLnBrk="1" latinLnBrk="0" hangingPunct="1">
+      <a:defRPr sz="1200" kern="1200">
+        <a:solidFill>
+          <a:schemeClr val="tx1"/>
+        </a:solidFill>
+        <a:latin typeface="+mn-lt"/>
+        <a:ea typeface="+mn-ea"/>
+        <a:cs typeface="+mn-cs"/>
+      </a:defRPr>
+    </a:lvl4pPr>
+    <a:lvl5pPr marL="1828800" algn="l" defTabSz="914400" rtl="0" eaLnBrk="1" latinLnBrk="0" hangingPunct="1">
+      <a:defRPr sz="1200" kern="1200">
+        <a:solidFill>
+          <a:schemeClr val="tx1"/>
+        </a:solidFill>
+        <a:latin typeface="+mn-lt"/>
+        <a:ea typeface="+mn-ea"/>
+        <a:cs typeface="+mn-cs"/>
+      </a:defRPr>
+    </a:lvl5pPr>
+    <a:lvl6pPr marL="2286000" algn="l" defTabSz="914400" rtl="0" eaLnBrk="1" latinLnBrk="0" hangingPunct="1">
+      <a:defRPr sz="1200" kern="1200">
+        <a:solidFill>
+          <a:schemeClr val="tx1"/>
+        </a:solidFill>
+        <a:latin typeface="+mn-lt"/>
+        <a:ea typeface="+mn-ea"/>
+        <a:cs typeface="+mn-cs"/>
+      </a:defRPr>
+    </a:lvl6pPr>
+    <a:lvl7pPr marL="2743200" algn="l" defTabSz="914400" rtl="0" eaLnBrk="1" latinLnBrk="0" hangingPunct="1">
+      <a:defRPr sz="1200" kern="1200">
+        <a:solidFill>
+          <a:schemeClr val="tx1"/>
+        </a:solidFill>
+        <a:latin typeface="+mn-lt"/>
+        <a:ea typeface="+mn-ea"/>
+        <a:cs typeface="+mn-cs"/>
+      </a:defRPr>
+    </a:lvl7pPr>
+    <a:lvl8pPr marL="3200400" algn="l" defTabSz="914400" rtl="0" eaLnBrk="1" latinLnBrk="0" hangingPunct="1">
+      <a:defRPr sz="1200" kern="1200">
+        <a:solidFill>
+          <a:schemeClr val="tx1"/>
+        </a:solidFill>
+        <a:latin typeface="+mn-lt"/>
+        <a:ea typeface="+mn-ea"/>
+        <a:cs typeface="+mn-cs"/>
+      </a:defRPr>
+    </a:lvl8pPr>
+    <a:lvl9pPr marL="3657600" algn="l" defTabSz="914400" rtl="0" eaLnBrk="1" latinLnBrk="0" hangingPunct="1">
+      <a:defRPr sz="1200" kern="1200">
+        <a:solidFill>
+          <a:schemeClr val="tx1"/>
+        </a:solidFill>
+        <a:latin typeface="+mn-lt"/>
+        <a:ea typeface="+mn-ea"/>
+        <a:cs typeface="+mn-cs"/>
+      </a:defRPr>
+    </a:lvl9pPr>
+  </p:notesStyle>
+</p:notesMaster>
+</file>
+
 <file path=ppt/slideLayouts/slideLayout1.xml><?xml version="1.0" encoding="utf-8"?>
 <p:sldLayout xmlns:a="http://schemas.openxmlformats.org/drawingml/2006/main" xmlns:r="http://schemas.openxmlformats.org/officeDocument/2006/relationships" xmlns:p="http://schemas.openxmlformats.org/presentationml/2006/main" type="obj" preserve="1">
   <p:cSld name="Title Slide">
@@ -187,8 +541,8 @@
             </a:lvl1pPr>
           </a:lstStyle>
           <a:p>
-            <a:fld id="{1D8BD707-D9CF-40AE-B4C6-C98DA3205C09}" type="datetimeFigureOut">
-              <a:rPr lang="en-US"/>
+            <a:fld id="{6A1F3B75-D739-459F-AFFB-6AA49E5EC2D8}" type="datetime1">
+              <a:rPr lang="en-US" smtClean="0"/>
               <a:t>11/15/2024</a:t>
             </a:fld>
             <a:endParaRPr lang="en-US"/>
@@ -364,8 +718,8 @@
             </a:lvl1pPr>
           </a:lstStyle>
           <a:p>
-            <a:fld id="{1D8BD707-D9CF-40AE-B4C6-C98DA3205C09}" type="datetimeFigureOut">
-              <a:rPr lang="en-US"/>
+            <a:fld id="{5641E79E-3BE4-4C33-9FDC-8E8BC9AEC30A}" type="datetime1">
+              <a:rPr lang="en-US" smtClean="0"/>
               <a:t>11/15/2024</a:t>
             </a:fld>
             <a:endParaRPr lang="en-US"/>
@@ -578,8 +932,8 @@
             </a:lvl1pPr>
           </a:lstStyle>
           <a:p>
-            <a:fld id="{1D8BD707-D9CF-40AE-B4C6-C98DA3205C09}" type="datetimeFigureOut">
-              <a:rPr lang="en-US"/>
+            <a:fld id="{C8B716DF-BFBA-42E5-AE98-99BE7AC39697}" type="datetime1">
+              <a:rPr lang="en-US" smtClean="0"/>
               <a:t>11/15/2024</a:t>
             </a:fld>
             <a:endParaRPr lang="en-US"/>
@@ -726,8 +1080,8 @@
             </a:lvl1pPr>
           </a:lstStyle>
           <a:p>
-            <a:fld id="{1D8BD707-D9CF-40AE-B4C6-C98DA3205C09}" type="datetimeFigureOut">
-              <a:rPr lang="en-US"/>
+            <a:fld id="{398F0C5D-AF81-4C6B-9BA2-22DCCBF7E3E0}" type="datetime1">
+              <a:rPr lang="en-US" smtClean="0"/>
               <a:t>11/15/2024</a:t>
             </a:fld>
             <a:endParaRPr lang="en-US"/>
@@ -853,8 +1207,8 @@
             </a:lvl1pPr>
           </a:lstStyle>
           <a:p>
-            <a:fld id="{1D8BD707-D9CF-40AE-B4C6-C98DA3205C09}" type="datetimeFigureOut">
-              <a:rPr lang="en-US"/>
+            <a:fld id="{C6B910F7-70A7-44AF-B4B8-5CD810326D05}" type="datetime1">
+              <a:rPr lang="en-US" smtClean="0"/>
               <a:t>11/15/2024</a:t>
             </a:fld>
             <a:endParaRPr lang="en-US"/>
@@ -1122,8 +1476,8 @@
             </a:lvl1pPr>
           </a:lstStyle>
           <a:p>
-            <a:fld id="{1D8BD707-D9CF-40AE-B4C6-C98DA3205C09}" type="datetimeFigureOut">
-              <a:rPr lang="en-US"/>
+            <a:fld id="{B3220616-63A2-4442-AAF1-F276CF4C6A97}" type="datetime1">
+              <a:rPr lang="en-US" smtClean="0"/>
               <a:t>11/15/2024</a:t>
             </a:fld>
             <a:endParaRPr lang="en-US"/>
@@ -1182,6 +1536,7 @@
     <p:sldLayoutId id="2147483664" r:id="rId4"/>
     <p:sldLayoutId id="2147483665" r:id="rId5"/>
   </p:sldLayoutIdLst>
+  <p:hf sldNum="0" hdr="0" ftr="0" dt="0"/>
   <p:txStyles>
     <p:titleStyle>
       <a:lvl1pPr>
@@ -1355,8 +1710,8 @@
         </p:nvSpPr>
         <p:spPr>
           <a:xfrm>
-            <a:off x="1569720" y="3762351"/>
-            <a:ext cx="9677400" cy="1551707"/>
+            <a:off x="1569720" y="4147072"/>
+            <a:ext cx="9677400" cy="782265"/>
           </a:xfrm>
           <a:prstGeom prst="rect">
             <a:avLst/>
@@ -1416,11 +1771,12 @@
               </a:rPr>
               <a:t>Study</a:t>
             </a:r>
-            <a:br>
+            <a:r>
               <a:rPr lang="en-IN" b="1" spc="-10" dirty="0">
                 <a:latin typeface="+mn-lt"/>
               </a:rPr>
-            </a:br>
+              <a:t>  </a:t>
+            </a:r>
             <a:endParaRPr b="1" spc="-10" dirty="0">
               <a:latin typeface="+mn-lt"/>
             </a:endParaRPr>
@@ -1628,7 +1984,7 @@
           <p:cNvPr id="5" name="Graphic 4" descr="Rupee">
             <a:extLst>
               <a:ext uri="{FF2B5EF4-FFF2-40B4-BE49-F238E27FC236}">
-                <a16:creationId xmlns:a16="http://schemas.microsoft.com/office/drawing/2014/main" id="{FF3611EB-5E0A-3DB4-5DC0-595BF4B77A4D}"/>
+                <a16:creationId xmlns:a16="http://schemas.microsoft.com/office/drawing/2014/main" id="{DA11E503-F92F-CB98-75B9-FED82C4ACBF5}"/>
               </a:ext>
             </a:extLst>
           </p:cNvPr>
@@ -1651,7 +2007,7 @@
         </p:blipFill>
         <p:spPr>
           <a:xfrm>
-            <a:off x="2379572" y="3657600"/>
+            <a:off x="2209800" y="4011905"/>
             <a:ext cx="914400" cy="914400"/>
           </a:xfrm>
           <a:prstGeom prst="rect">
@@ -1664,7 +2020,7 @@
           <p:cNvPr id="7" name="Graphic 6" descr="Coins">
             <a:extLst>
               <a:ext uri="{FF2B5EF4-FFF2-40B4-BE49-F238E27FC236}">
-                <a16:creationId xmlns:a16="http://schemas.microsoft.com/office/drawing/2014/main" id="{20646688-5A44-5270-1997-90CADB3AF403}"/>
+                <a16:creationId xmlns:a16="http://schemas.microsoft.com/office/drawing/2014/main" id="{11EB5AF5-FEF4-EAA8-61F4-9C779926D65E}"/>
               </a:ext>
             </a:extLst>
           </p:cNvPr>
@@ -1687,7 +2043,7 @@
         </p:blipFill>
         <p:spPr>
           <a:xfrm>
-            <a:off x="6959192" y="4572000"/>
+            <a:off x="7376159" y="4929337"/>
             <a:ext cx="914400" cy="914400"/>
           </a:xfrm>
           <a:prstGeom prst="rect">
@@ -1700,7 +2056,7 @@
           <p:cNvPr id="8" name="Graphic 7" descr="Coins">
             <a:extLst>
               <a:ext uri="{FF2B5EF4-FFF2-40B4-BE49-F238E27FC236}">
-                <a16:creationId xmlns:a16="http://schemas.microsoft.com/office/drawing/2014/main" id="{71D1B8CB-3DFD-BBB6-F3FD-63713BE83A23}"/>
+                <a16:creationId xmlns:a16="http://schemas.microsoft.com/office/drawing/2014/main" id="{2AF0DD37-9B72-A8A7-B4BE-D841A0A39B55}"/>
               </a:ext>
             </a:extLst>
           </p:cNvPr>
@@ -1723,7 +2079,7 @@
         </p:blipFill>
         <p:spPr>
           <a:xfrm>
-            <a:off x="7985760" y="4538204"/>
+            <a:off x="8275319" y="4929337"/>
             <a:ext cx="914400" cy="914400"/>
           </a:xfrm>
           <a:prstGeom prst="rect">
@@ -1775,7 +2131,7 @@
         <p:spPr>
           <a:xfrm>
             <a:off x="533400" y="1023898"/>
-            <a:ext cx="10058400" cy="769441"/>
+            <a:ext cx="10058400" cy="615553"/>
           </a:xfrm>
         </p:spPr>
         <p:txBody>
@@ -1783,7 +2139,7 @@
           <a:lstStyle/>
           <a:p>
             <a:r>
-              <a:rPr lang="en-IN" b="1" dirty="0">
+              <a:rPr lang="en-IN" sz="4000" b="1" dirty="0">
                 <a:latin typeface="+mn-lt"/>
               </a:rPr>
               <a:t>Objective</a:t>
@@ -1805,7 +2161,7 @@
         </p:nvSpPr>
         <p:spPr>
           <a:xfrm>
-            <a:off x="533400" y="2474655"/>
+            <a:off x="533400" y="1834575"/>
             <a:ext cx="11125200" cy="6555641"/>
           </a:xfrm>
           <a:prstGeom prst="rect">
@@ -1906,6 +2262,155 @@
 </file>
 
 <file path=ppt/slides/slide3.xml><?xml version="1.0" encoding="utf-8"?>
+<p:sld xmlns:a="http://schemas.openxmlformats.org/drawingml/2006/main" xmlns:r="http://schemas.openxmlformats.org/officeDocument/2006/relationships" xmlns:p="http://schemas.openxmlformats.org/presentationml/2006/main">
+  <p:cSld>
+    <p:spTree>
+      <p:nvGrpSpPr>
+        <p:cNvPr id="1" name=""/>
+        <p:cNvGrpSpPr/>
+        <p:nvPr/>
+      </p:nvGrpSpPr>
+      <p:grpSpPr>
+        <a:xfrm>
+          <a:off x="0" y="0"/>
+          <a:ext cx="0" cy="0"/>
+          <a:chOff x="0" y="0"/>
+          <a:chExt cx="0" cy="0"/>
+        </a:xfrm>
+      </p:grpSpPr>
+      <p:sp>
+        <p:nvSpPr>
+          <p:cNvPr id="2" name="Title 1">
+            <a:extLst>
+              <a:ext uri="{FF2B5EF4-FFF2-40B4-BE49-F238E27FC236}">
+                <a16:creationId xmlns:a16="http://schemas.microsoft.com/office/drawing/2014/main" id="{DA293D82-0F4B-FBF0-5301-54C252029375}"/>
+              </a:ext>
+            </a:extLst>
+          </p:cNvPr>
+          <p:cNvSpPr>
+            <a:spLocks noGrp="1"/>
+          </p:cNvSpPr>
+          <p:nvPr>
+            <p:ph type="title"/>
+          </p:nvPr>
+        </p:nvSpPr>
+        <p:spPr>
+          <a:xfrm>
+            <a:off x="457200" y="1219200"/>
+            <a:ext cx="9296400" cy="4267200"/>
+          </a:xfrm>
+        </p:spPr>
+        <p:txBody>
+          <a:bodyPr/>
+          <a:lstStyle/>
+          <a:p>
+            <a:r>
+              <a:rPr lang="en-IN" sz="4000" b="1" dirty="0">
+                <a:latin typeface="+mn-lt"/>
+              </a:rPr>
+              <a:t>Technology Used</a:t>
+            </a:r>
+            <a:br>
+              <a:rPr lang="en-IN" b="1" dirty="0">
+                <a:latin typeface="+mn-lt"/>
+              </a:rPr>
+            </a:br>
+            <a:r>
+              <a:rPr lang="en-IN" b="1" dirty="0">
+                <a:latin typeface="+mn-lt"/>
+              </a:rPr>
+              <a:t> - </a:t>
+            </a:r>
+            <a:r>
+              <a:rPr lang="en-IN" sz="2800" b="1" dirty="0">
+                <a:latin typeface="+mn-lt"/>
+              </a:rPr>
+              <a:t>Python </a:t>
+            </a:r>
+            <a:br>
+              <a:rPr lang="en-IN" b="1" dirty="0">
+                <a:latin typeface="+mn-lt"/>
+              </a:rPr>
+            </a:br>
+            <a:r>
+              <a:rPr lang="en-IN" sz="4000" b="1" dirty="0">
+                <a:latin typeface="+mn-lt"/>
+              </a:rPr>
+              <a:t>Libraries used</a:t>
+            </a:r>
+            <a:br>
+              <a:rPr lang="en-IN" b="1" dirty="0">
+                <a:latin typeface="+mn-lt"/>
+              </a:rPr>
+            </a:br>
+            <a:r>
+              <a:rPr lang="en-IN" sz="2800" b="1" dirty="0">
+                <a:latin typeface="+mn-lt"/>
+              </a:rPr>
+              <a:t> </a:t>
+            </a:r>
+            <a:r>
+              <a:rPr lang="en-IN" sz="2800" dirty="0">
+                <a:latin typeface="+mn-lt"/>
+              </a:rPr>
+              <a:t> - </a:t>
+            </a:r>
+            <a:r>
+              <a:rPr lang="en-IN" sz="2800" dirty="0" err="1">
+                <a:latin typeface="+mn-lt"/>
+              </a:rPr>
+              <a:t>numpy</a:t>
+            </a:r>
+            <a:br>
+              <a:rPr lang="en-IN" sz="2800" dirty="0">
+                <a:latin typeface="+mn-lt"/>
+              </a:rPr>
+            </a:br>
+            <a:r>
+              <a:rPr lang="en-IN" sz="2800" dirty="0">
+                <a:latin typeface="+mn-lt"/>
+              </a:rPr>
+              <a:t>  - pandas</a:t>
+            </a:r>
+            <a:br>
+              <a:rPr lang="en-IN" sz="2800" dirty="0">
+                <a:latin typeface="+mn-lt"/>
+              </a:rPr>
+            </a:br>
+            <a:r>
+              <a:rPr lang="en-IN" sz="2800" dirty="0">
+                <a:latin typeface="+mn-lt"/>
+              </a:rPr>
+              <a:t>  - seaborn</a:t>
+            </a:r>
+            <a:br>
+              <a:rPr lang="en-IN" sz="2800" dirty="0">
+                <a:latin typeface="+mn-lt"/>
+              </a:rPr>
+            </a:br>
+            <a:r>
+              <a:rPr lang="en-IN" sz="2800" dirty="0">
+                <a:latin typeface="+mn-lt"/>
+              </a:rPr>
+              <a:t>  - matplotlib</a:t>
+            </a:r>
+          </a:p>
+        </p:txBody>
+      </p:sp>
+    </p:spTree>
+    <p:extLst>
+      <p:ext uri="{BB962C8B-B14F-4D97-AF65-F5344CB8AC3E}">
+        <p14:creationId xmlns:p14="http://schemas.microsoft.com/office/powerpoint/2010/main" val="123458188"/>
+      </p:ext>
+    </p:extLst>
+  </p:cSld>
+  <p:clrMapOvr>
+    <a:masterClrMapping/>
+  </p:clrMapOvr>
+</p:sld>
+</file>
+
+<file path=ppt/slides/slide4.xml><?xml version="1.0" encoding="utf-8"?>
 <p:sld xmlns:a="http://schemas.openxmlformats.org/drawingml/2006/main" xmlns:r="http://schemas.openxmlformats.org/officeDocument/2006/relationships" xmlns:p="http://schemas.openxmlformats.org/presentationml/2006/main">
   <p:cSld>
     <p:spTree>
@@ -2069,7 +2574,7 @@
         <p:spPr>
           <a:xfrm>
             <a:off x="152400" y="1013102"/>
-            <a:ext cx="11887200" cy="3293209"/>
+            <a:ext cx="11887200" cy="4339650"/>
           </a:xfrm>
           <a:prstGeom prst="rect">
             <a:avLst/>
@@ -2090,6 +2595,11 @@
             </a:r>
           </a:p>
           <a:p>
+            <a:endParaRPr lang="en-US" sz="4000" b="1" dirty="0">
+              <a:latin typeface="+mn-lt"/>
+            </a:endParaRPr>
+          </a:p>
+          <a:p>
             <a:r>
               <a:rPr lang="en-US" sz="2800" dirty="0">
                 <a:latin typeface="+mj-lt"/>
@@ -2138,6 +2648,11 @@
               </a:rPr>
               <a:t>whether the loan was paid off, ongoing or defaulted.</a:t>
             </a:r>
+          </a:p>
+          <a:p>
+            <a:endParaRPr lang="en-US" sz="2800" dirty="0">
+              <a:latin typeface="+mj-lt"/>
+            </a:endParaRPr>
           </a:p>
           <a:p>
             <a:r>
@@ -2162,7 +2677,7 @@
 </p:sld>
 </file>
 
-<file path=ppt/slides/slide4.xml><?xml version="1.0" encoding="utf-8"?>
+<file path=ppt/slides/slide5.xml><?xml version="1.0" encoding="utf-8"?>
 <p:sld xmlns:a="http://schemas.openxmlformats.org/drawingml/2006/main" xmlns:r="http://schemas.openxmlformats.org/officeDocument/2006/relationships" xmlns:p="http://schemas.openxmlformats.org/presentationml/2006/main">
   <p:cSld>
     <p:spTree>
@@ -3138,7 +3653,7 @@
 </p:sld>
 </file>
 
-<file path=ppt/slides/slide5.xml><?xml version="1.0" encoding="utf-8"?>
+<file path=ppt/slides/slide6.xml><?xml version="1.0" encoding="utf-8"?>
 <p:sld xmlns:a="http://schemas.openxmlformats.org/drawingml/2006/main" xmlns:r="http://schemas.openxmlformats.org/officeDocument/2006/relationships" xmlns:p="http://schemas.openxmlformats.org/presentationml/2006/main">
   <p:cSld>
     <p:spTree>
@@ -3302,7 +3817,7 @@
         <p:spPr>
           <a:xfrm>
             <a:off x="461464" y="1219200"/>
-            <a:ext cx="11044736" cy="1631216"/>
+            <a:ext cx="11044736" cy="5447645"/>
           </a:xfrm>
           <a:prstGeom prst="rect">
             <a:avLst/>
@@ -3316,75 +3831,100 @@
           <a:lstStyle/>
           <a:p>
             <a:r>
-              <a:rPr lang="en-US" sz="2800" b="1">
+              <a:rPr lang="en-US" sz="4000" b="1" dirty="0">
                 <a:latin typeface="+mn-lt"/>
               </a:rPr>
-              <a:t>Data Analysis </a:t>
-            </a:r>
-            <a:r>
-              <a:rPr lang="en-US" sz="2800" b="1" dirty="0">
-                <a:latin typeface="+mn-lt"/>
-              </a:rPr>
-              <a:t>Approach</a:t>
-            </a:r>
-          </a:p>
-          <a:p>
-            <a:r>
-              <a:rPr lang="en-US" sz="1800" b="1" dirty="0">
+              <a:t>Data Analysis Approach</a:t>
+            </a:r>
+          </a:p>
+          <a:p>
+            <a:pPr marL="514350" indent="-514350" algn="l">
+              <a:buAutoNum type="arabicPeriod"/>
+            </a:pPr>
+            <a:r>
+              <a:rPr lang="en-US" sz="2800" dirty="0">
                 <a:latin typeface="+mj-lt"/>
               </a:rPr>
-              <a:t>1. Data Import </a:t>
-            </a:r>
-          </a:p>
-          <a:p>
-            <a:r>
-              <a:rPr lang="en-US" sz="1800" dirty="0">
+              <a:t>Univariate Analysis </a:t>
+            </a:r>
+          </a:p>
+          <a:p>
+            <a:pPr algn="l"/>
+            <a:r>
+              <a:rPr lang="en-US" sz="2800" dirty="0">
                 <a:latin typeface="+mj-lt"/>
               </a:rPr>
-              <a:t>2. </a:t>
-            </a:r>
-            <a:r>
-              <a:rPr lang="en-US" sz="1800" b="1" dirty="0">
+              <a:t>       - Analyzing each column, plotting the distributions of each column.</a:t>
+            </a:r>
+          </a:p>
+          <a:p>
+            <a:pPr algn="l"/>
+            <a:endParaRPr lang="en-US" sz="2800" dirty="0">
+              <a:latin typeface="+mj-lt"/>
+            </a:endParaRPr>
+          </a:p>
+          <a:p>
+            <a:pPr algn="l"/>
+            <a:r>
+              <a:rPr lang="en-US" sz="2800" dirty="0">
                 <a:latin typeface="+mj-lt"/>
               </a:rPr>
-              <a:t>Data Cleaning : </a:t>
-            </a:r>
-            <a:r>
-              <a:rPr lang="en-IN" sz="1800" dirty="0"/>
-              <a:t>Removing null value and duplicate data</a:t>
-            </a:r>
-          </a:p>
-          <a:p>
-            <a:r>
-              <a:rPr lang="en-US" sz="1800" dirty="0">
+              <a:t>2. Segmented Univariate Analysis</a:t>
+            </a:r>
+          </a:p>
+          <a:p>
+            <a:pPr algn="l"/>
+            <a:r>
+              <a:rPr lang="en-US" sz="2800" dirty="0">
                 <a:latin typeface="+mj-lt"/>
               </a:rPr>
-              <a:t>3. </a:t>
-            </a:r>
-            <a:r>
-              <a:rPr lang="en-US" sz="1800" b="1" dirty="0">
+              <a:t>      - Analyzing continuous data columns to the categorical column.</a:t>
+            </a:r>
+          </a:p>
+          <a:p>
+            <a:pPr algn="l"/>
+            <a:endParaRPr lang="en-US" sz="2800" dirty="0">
+              <a:latin typeface="+mj-lt"/>
+            </a:endParaRPr>
+          </a:p>
+          <a:p>
+            <a:pPr algn="l"/>
+            <a:r>
+              <a:rPr lang="en-US" sz="2800" dirty="0">
                 <a:latin typeface="+mj-lt"/>
               </a:rPr>
-              <a:t>Data Preprocessing:  </a:t>
-            </a:r>
-            <a:r>
-              <a:rPr lang="en-US" sz="1800" dirty="0">
+              <a:t>3. Bivariate Analysis</a:t>
+            </a:r>
+          </a:p>
+          <a:p>
+            <a:pPr algn="l"/>
+            <a:r>
+              <a:rPr lang="en-US" sz="2800" dirty="0">
                 <a:latin typeface="+mj-lt"/>
               </a:rPr>
-              <a:t>Removing irrelevant columns.</a:t>
-            </a:r>
-            <a:r>
-              <a:rPr lang="en-US" sz="1800" b="1" dirty="0">
+              <a:t>    - Analyzing the two variable behavior like term and loan status</a:t>
+            </a:r>
+          </a:p>
+          <a:p>
+            <a:pPr algn="l"/>
+            <a:r>
+              <a:rPr lang="en-US" sz="2800" dirty="0">
                 <a:latin typeface="+mj-lt"/>
               </a:rPr>
-              <a:t>  </a:t>
-            </a:r>
-            <a:r>
-              <a:rPr lang="en-US" sz="1800" dirty="0">
-                <a:latin typeface="+mj-lt"/>
-              </a:rPr>
-              <a:t>Encode categorical variables, and normalize numeric data for analysis.</a:t>
-            </a:r>
+              <a:t>      with respect to loan amount.</a:t>
+            </a:r>
+          </a:p>
+          <a:p>
+            <a:pPr algn="l"/>
+            <a:endParaRPr lang="en-US" sz="2800" dirty="0">
+              <a:latin typeface="+mj-lt"/>
+            </a:endParaRPr>
+          </a:p>
+          <a:p>
+            <a:pPr algn="l"/>
+            <a:endParaRPr lang="en-US" sz="2800" dirty="0">
+              <a:latin typeface="+mj-lt"/>
+            </a:endParaRPr>
           </a:p>
         </p:txBody>
       </p:sp>
@@ -3401,7 +3941,7 @@
 </p:sld>
 </file>
 
-<file path=ppt/slides/slide6.xml><?xml version="1.0" encoding="utf-8"?>
+<file path=ppt/slides/slide7.xml><?xml version="1.0" encoding="utf-8"?>
 <p:sld xmlns:a="http://schemas.openxmlformats.org/drawingml/2006/main" xmlns:r="http://schemas.openxmlformats.org/officeDocument/2006/relationships" xmlns:p="http://schemas.openxmlformats.org/presentationml/2006/main">
   <p:cSld>
     <p:spTree>
@@ -3418,6 +3958,46 @@
           <a:chExt cx="0" cy="0"/>
         </a:xfrm>
       </p:grpSpPr>
+      <p:sp>
+        <p:nvSpPr>
+          <p:cNvPr id="5" name="TextBox 4">
+            <a:extLst>
+              <a:ext uri="{FF2B5EF4-FFF2-40B4-BE49-F238E27FC236}">
+                <a16:creationId xmlns:a16="http://schemas.microsoft.com/office/drawing/2014/main" id="{F4DF063B-6720-142D-523D-23B8A60CF4B0}"/>
+              </a:ext>
+            </a:extLst>
+          </p:cNvPr>
+          <p:cNvSpPr txBox="1"/>
+          <p:nvPr/>
+        </p:nvSpPr>
+        <p:spPr>
+          <a:xfrm>
+            <a:off x="762000" y="1219200"/>
+            <a:ext cx="8458200" cy="707886"/>
+          </a:xfrm>
+          <a:prstGeom prst="rect">
+            <a:avLst/>
+          </a:prstGeom>
+          <a:noFill/>
+        </p:spPr>
+        <p:txBody>
+          <a:bodyPr wrap="square">
+            <a:spAutoFit/>
+          </a:bodyPr>
+          <a:lstStyle/>
+          <a:p>
+            <a:r>
+              <a:rPr lang="en-IN" sz="4000" b="1" i="0" u="none" strike="noStrike" baseline="0" dirty="0">
+                <a:latin typeface="+mn-lt"/>
+              </a:rPr>
+              <a:t>Analysis</a:t>
+            </a:r>
+            <a:endParaRPr lang="en-IN" sz="4000" dirty="0">
+              <a:latin typeface="+mn-lt"/>
+            </a:endParaRPr>
+          </a:p>
+        </p:txBody>
+      </p:sp>
     </p:spTree>
     <p:extLst>
       <p:ext uri="{BB962C8B-B14F-4D97-AF65-F5344CB8AC3E}">
@@ -3712,4 +4292,299 @@
   <a:objectDefaults/>
   <a:extraClrSchemeLst/>
 </a:theme>
+</file>
+
+<file path=ppt/theme/theme2.xml><?xml version="1.0" encoding="utf-8"?>
+<a:theme xmlns:a="http://schemas.openxmlformats.org/drawingml/2006/main" name="Office Theme">
+  <a:themeElements>
+    <a:clrScheme name="Office">
+      <a:dk1>
+        <a:sysClr val="windowText" lastClr="000000"/>
+      </a:dk1>
+      <a:lt1>
+        <a:sysClr val="window" lastClr="FFFFFF"/>
+      </a:lt1>
+      <a:dk2>
+        <a:srgbClr val="44546A"/>
+      </a:dk2>
+      <a:lt2>
+        <a:srgbClr val="E7E6E6"/>
+      </a:lt2>
+      <a:accent1>
+        <a:srgbClr val="4472C4"/>
+      </a:accent1>
+      <a:accent2>
+        <a:srgbClr val="ED7D31"/>
+      </a:accent2>
+      <a:accent3>
+        <a:srgbClr val="A5A5A5"/>
+      </a:accent3>
+      <a:accent4>
+        <a:srgbClr val="FFC000"/>
+      </a:accent4>
+      <a:accent5>
+        <a:srgbClr val="5B9BD5"/>
+      </a:accent5>
+      <a:accent6>
+        <a:srgbClr val="70AD47"/>
+      </a:accent6>
+      <a:hlink>
+        <a:srgbClr val="0563C1"/>
+      </a:hlink>
+      <a:folHlink>
+        <a:srgbClr val="954F72"/>
+      </a:folHlink>
+    </a:clrScheme>
+    <a:fontScheme name="Office">
+      <a:majorFont>
+        <a:latin typeface="Calibri Light" panose="020F0302020204030204"/>
+        <a:ea typeface=""/>
+        <a:cs typeface=""/>
+        <a:font script="Jpan" typeface="游ゴシック Light"/>
+        <a:font script="Hang" typeface="맑은 고딕"/>
+        <a:font script="Hans" typeface="等线 Light"/>
+        <a:font script="Hant" typeface="新細明體"/>
+        <a:font script="Arab" typeface="Times New Roman"/>
+        <a:font script="Hebr" typeface="Times New Roman"/>
+        <a:font script="Thai" typeface="Angsana New"/>
+        <a:font script="Ethi" typeface="Nyala"/>
+        <a:font script="Beng" typeface="Vrinda"/>
+        <a:font script="Gujr" typeface="Shruti"/>
+        <a:font script="Khmr" typeface="MoolBoran"/>
+        <a:font script="Knda" typeface="Tunga"/>
+        <a:font script="Guru" typeface="Raavi"/>
+        <a:font script="Cans" typeface="Euphemia"/>
+        <a:font script="Cher" typeface="Plantagenet Cherokee"/>
+        <a:font script="Yiii" typeface="Microsoft Yi Baiti"/>
+        <a:font script="Tibt" typeface="Microsoft Himalaya"/>
+        <a:font script="Thaa" typeface="MV Boli"/>
+        <a:font script="Deva" typeface="Mangal"/>
+        <a:font script="Telu" typeface="Gautami"/>
+        <a:font script="Taml" typeface="Latha"/>
+        <a:font script="Syrc" typeface="Estrangelo Edessa"/>
+        <a:font script="Orya" typeface="Kalinga"/>
+        <a:font script="Mlym" typeface="Kartika"/>
+        <a:font script="Laoo" typeface="DokChampa"/>
+        <a:font script="Sinh" typeface="Iskoola Pota"/>
+        <a:font script="Mong" typeface="Mongolian Baiti"/>
+        <a:font script="Viet" typeface="Times New Roman"/>
+        <a:font script="Uigh" typeface="Microsoft Uighur"/>
+        <a:font script="Geor" typeface="Sylfaen"/>
+        <a:font script="Armn" typeface="Arial"/>
+        <a:font script="Bugi" typeface="Leelawadee UI"/>
+        <a:font script="Bopo" typeface="Microsoft JhengHei"/>
+        <a:font script="Java" typeface="Javanese Text"/>
+        <a:font script="Lisu" typeface="Segoe UI"/>
+        <a:font script="Mymr" typeface="Myanmar Text"/>
+        <a:font script="Nkoo" typeface="Ebrima"/>
+        <a:font script="Olck" typeface="Nirmala UI"/>
+        <a:font script="Osma" typeface="Ebrima"/>
+        <a:font script="Phag" typeface="Phagspa"/>
+        <a:font script="Syrn" typeface="Estrangelo Edessa"/>
+        <a:font script="Syrj" typeface="Estrangelo Edessa"/>
+        <a:font script="Syre" typeface="Estrangelo Edessa"/>
+        <a:font script="Sora" typeface="Nirmala UI"/>
+        <a:font script="Tale" typeface="Microsoft Tai Le"/>
+        <a:font script="Talu" typeface="Microsoft New Tai Lue"/>
+        <a:font script="Tfng" typeface="Ebrima"/>
+      </a:majorFont>
+      <a:minorFont>
+        <a:latin typeface="Calibri" panose="020F0502020204030204"/>
+        <a:ea typeface=""/>
+        <a:cs typeface=""/>
+        <a:font script="Jpan" typeface="游ゴシック"/>
+        <a:font script="Hang" typeface="맑은 고딕"/>
+        <a:font script="Hans" typeface="等线"/>
+        <a:font script="Hant" typeface="新細明體"/>
+        <a:font script="Arab" typeface="Arial"/>
+        <a:font script="Hebr" typeface="Arial"/>
+        <a:font script="Thai" typeface="Cordia New"/>
+        <a:font script="Ethi" typeface="Nyala"/>
+        <a:font script="Beng" typeface="Vrinda"/>
+        <a:font script="Gujr" typeface="Shruti"/>
+        <a:font script="Khmr" typeface="DaunPenh"/>
+        <a:font script="Knda" typeface="Tunga"/>
+        <a:font script="Guru" typeface="Raavi"/>
+        <a:font script="Cans" typeface="Euphemia"/>
+        <a:font script="Cher" typeface="Plantagenet Cherokee"/>
+        <a:font script="Yiii" typeface="Microsoft Yi Baiti"/>
+        <a:font script="Tibt" typeface="Microsoft Himalaya"/>
+        <a:font script="Thaa" typeface="MV Boli"/>
+        <a:font script="Deva" typeface="Mangal"/>
+        <a:font script="Telu" typeface="Gautami"/>
+        <a:font script="Taml" typeface="Latha"/>
+        <a:font script="Syrc" typeface="Estrangelo Edessa"/>
+        <a:font script="Orya" typeface="Kalinga"/>
+        <a:font script="Mlym" typeface="Kartika"/>
+        <a:font script="Laoo" typeface="DokChampa"/>
+        <a:font script="Sinh" typeface="Iskoola Pota"/>
+        <a:font script="Mong" typeface="Mongolian Baiti"/>
+        <a:font script="Viet" typeface="Arial"/>
+        <a:font script="Uigh" typeface="Microsoft Uighur"/>
+        <a:font script="Geor" typeface="Sylfaen"/>
+        <a:font script="Armn" typeface="Arial"/>
+        <a:font script="Bugi" typeface="Leelawadee UI"/>
+        <a:font script="Bopo" typeface="Microsoft JhengHei"/>
+        <a:font script="Java" typeface="Javanese Text"/>
+        <a:font script="Lisu" typeface="Segoe UI"/>
+        <a:font script="Mymr" typeface="Myanmar Text"/>
+        <a:font script="Nkoo" typeface="Ebrima"/>
+        <a:font script="Olck" typeface="Nirmala UI"/>
+        <a:font script="Osma" typeface="Ebrima"/>
+        <a:font script="Phag" typeface="Phagspa"/>
+        <a:font script="Syrn" typeface="Estrangelo Edessa"/>
+        <a:font script="Syrj" typeface="Estrangelo Edessa"/>
+        <a:font script="Syre" typeface="Estrangelo Edessa"/>
+        <a:font script="Sora" typeface="Nirmala UI"/>
+        <a:font script="Tale" typeface="Microsoft Tai Le"/>
+        <a:font script="Talu" typeface="Microsoft New Tai Lue"/>
+        <a:font script="Tfng" typeface="Ebrima"/>
+      </a:minorFont>
+    </a:fontScheme>
+    <a:fmtScheme name="Office">
+      <a:fillStyleLst>
+        <a:solidFill>
+          <a:schemeClr val="phClr"/>
+        </a:solidFill>
+        <a:gradFill rotWithShape="1">
+          <a:gsLst>
+            <a:gs pos="0">
+              <a:schemeClr val="phClr">
+                <a:lumMod val="110000"/>
+                <a:satMod val="105000"/>
+                <a:tint val="67000"/>
+              </a:schemeClr>
+            </a:gs>
+            <a:gs pos="50000">
+              <a:schemeClr val="phClr">
+                <a:lumMod val="105000"/>
+                <a:satMod val="103000"/>
+                <a:tint val="73000"/>
+              </a:schemeClr>
+            </a:gs>
+            <a:gs pos="100000">
+              <a:schemeClr val="phClr">
+                <a:lumMod val="105000"/>
+                <a:satMod val="109000"/>
+                <a:tint val="81000"/>
+              </a:schemeClr>
+            </a:gs>
+          </a:gsLst>
+          <a:lin ang="5400000" scaled="0"/>
+        </a:gradFill>
+        <a:gradFill rotWithShape="1">
+          <a:gsLst>
+            <a:gs pos="0">
+              <a:schemeClr val="phClr">
+                <a:satMod val="103000"/>
+                <a:lumMod val="102000"/>
+                <a:tint val="94000"/>
+              </a:schemeClr>
+            </a:gs>
+            <a:gs pos="50000">
+              <a:schemeClr val="phClr">
+                <a:satMod val="110000"/>
+                <a:lumMod val="100000"/>
+                <a:shade val="100000"/>
+              </a:schemeClr>
+            </a:gs>
+            <a:gs pos="100000">
+              <a:schemeClr val="phClr">
+                <a:lumMod val="99000"/>
+                <a:satMod val="120000"/>
+                <a:shade val="78000"/>
+              </a:schemeClr>
+            </a:gs>
+          </a:gsLst>
+          <a:lin ang="5400000" scaled="0"/>
+        </a:gradFill>
+      </a:fillStyleLst>
+      <a:lnStyleLst>
+        <a:ln w="6350" cap="flat" cmpd="sng" algn="ctr">
+          <a:solidFill>
+            <a:schemeClr val="phClr"/>
+          </a:solidFill>
+          <a:prstDash val="solid"/>
+          <a:miter lim="800000"/>
+        </a:ln>
+        <a:ln w="12700" cap="flat" cmpd="sng" algn="ctr">
+          <a:solidFill>
+            <a:schemeClr val="phClr"/>
+          </a:solidFill>
+          <a:prstDash val="solid"/>
+          <a:miter lim="800000"/>
+        </a:ln>
+        <a:ln w="19050" cap="flat" cmpd="sng" algn="ctr">
+          <a:solidFill>
+            <a:schemeClr val="phClr"/>
+          </a:solidFill>
+          <a:prstDash val="solid"/>
+          <a:miter lim="800000"/>
+        </a:ln>
+      </a:lnStyleLst>
+      <a:effectStyleLst>
+        <a:effectStyle>
+          <a:effectLst/>
+        </a:effectStyle>
+        <a:effectStyle>
+          <a:effectLst/>
+        </a:effectStyle>
+        <a:effectStyle>
+          <a:effectLst>
+            <a:outerShdw blurRad="57150" dist="19050" dir="5400000" algn="ctr" rotWithShape="0">
+              <a:srgbClr val="000000">
+                <a:alpha val="63000"/>
+              </a:srgbClr>
+            </a:outerShdw>
+          </a:effectLst>
+        </a:effectStyle>
+      </a:effectStyleLst>
+      <a:bgFillStyleLst>
+        <a:solidFill>
+          <a:schemeClr val="phClr"/>
+        </a:solidFill>
+        <a:solidFill>
+          <a:schemeClr val="phClr">
+            <a:tint val="95000"/>
+            <a:satMod val="170000"/>
+          </a:schemeClr>
+        </a:solidFill>
+        <a:gradFill rotWithShape="1">
+          <a:gsLst>
+            <a:gs pos="0">
+              <a:schemeClr val="phClr">
+                <a:tint val="93000"/>
+                <a:satMod val="150000"/>
+                <a:shade val="98000"/>
+                <a:lumMod val="102000"/>
+              </a:schemeClr>
+            </a:gs>
+            <a:gs pos="50000">
+              <a:schemeClr val="phClr">
+                <a:tint val="98000"/>
+                <a:satMod val="130000"/>
+                <a:shade val="90000"/>
+                <a:lumMod val="103000"/>
+              </a:schemeClr>
+            </a:gs>
+            <a:gs pos="100000">
+              <a:schemeClr val="phClr">
+                <a:shade val="63000"/>
+                <a:satMod val="120000"/>
+              </a:schemeClr>
+            </a:gs>
+          </a:gsLst>
+          <a:lin ang="5400000" scaled="0"/>
+        </a:gradFill>
+      </a:bgFillStyleLst>
+    </a:fmtScheme>
+  </a:themeElements>
+  <a:objectDefaults/>
+  <a:extraClrSchemeLst/>
+  <a:extLst>
+    <a:ext uri="{05A4C25C-085E-4340-85A3-A5531E510DB2}">
+      <thm15:themeFamily xmlns:thm15="http://schemas.microsoft.com/office/thememl/2012/main" name="Office Theme" id="{62F939B6-93AF-4DB8-9C6B-D6C7DFDC589F}" vid="{4A3C46E8-61CC-4603-A589-7422A47A8E4A}"/>
+    </a:ext>
+  </a:extLst>
+</a:theme>
 </file>
</xml_diff>

<commit_message>
Updated IPYNB file,Presentation deck and README.md
</commit_message>
<xml_diff>
--- a/lending_club_case_study.pptx
+++ b/lending_club_case_study.pptx
@@ -5,7 +5,7 @@
     <p:sldMasterId id="2147483648" r:id="rId1"/>
   </p:sldMasterIdLst>
   <p:notesMasterIdLst>
-    <p:notesMasterId r:id="rId9"/>
+    <p:notesMasterId r:id="rId23"/>
   </p:notesMasterIdLst>
   <p:sldIdLst>
     <p:sldId id="256" r:id="rId2"/>
@@ -15,6 +15,20 @@
     <p:sldId id="260" r:id="rId6"/>
     <p:sldId id="261" r:id="rId7"/>
     <p:sldId id="259" r:id="rId8"/>
+    <p:sldId id="263" r:id="rId9"/>
+    <p:sldId id="264" r:id="rId10"/>
+    <p:sldId id="265" r:id="rId11"/>
+    <p:sldId id="266" r:id="rId12"/>
+    <p:sldId id="267" r:id="rId13"/>
+    <p:sldId id="268" r:id="rId14"/>
+    <p:sldId id="269" r:id="rId15"/>
+    <p:sldId id="270" r:id="rId16"/>
+    <p:sldId id="271" r:id="rId17"/>
+    <p:sldId id="272" r:id="rId18"/>
+    <p:sldId id="273" r:id="rId19"/>
+    <p:sldId id="274" r:id="rId20"/>
+    <p:sldId id="275" r:id="rId21"/>
+    <p:sldId id="276" r:id="rId22"/>
   </p:sldIdLst>
   <p:sldSz cx="12192000" cy="10058400"/>
   <p:notesSz cx="12192000" cy="10058400"/>
@@ -42,6 +56,32 @@
 </p:presentation>
 </file>
 
+<file path=ppt/commentAuthors.xml><?xml version="1.0" encoding="utf-8"?>
+<p:cmAuthorLst xmlns:a="http://schemas.openxmlformats.org/drawingml/2006/main" xmlns:r="http://schemas.openxmlformats.org/officeDocument/2006/relationships" xmlns:p="http://schemas.openxmlformats.org/presentationml/2006/main">
+  <p:cmAuthor id="1" name="Archit Agrawal" initials="AA" lastIdx="1" clrIdx="0">
+    <p:extLst>
+      <p:ext uri="{19B8F6BF-5375-455C-9EA6-DF929625EA0E}">
+        <p15:presenceInfo xmlns:p15="http://schemas.microsoft.com/office/powerpoint/2012/main" userId="75888e2955304846" providerId="Windows Live"/>
+      </p:ext>
+    </p:extLst>
+  </p:cmAuthor>
+</p:cmAuthorLst>
+</file>
+
+<file path=ppt/comments/comment1.xml><?xml version="1.0" encoding="utf-8"?>
+<p:cmLst xmlns:a="http://schemas.openxmlformats.org/drawingml/2006/main" xmlns:r="http://schemas.openxmlformats.org/officeDocument/2006/relationships" xmlns:p="http://schemas.openxmlformats.org/presentationml/2006/main">
+  <p:cm authorId="1" dt="2024-11-17T12:48:58.561" idx="1">
+    <p:pos x="10" y="10"/>
+    <p:text/>
+    <p:extLst>
+      <p:ext uri="{C676402C-5697-4E1C-873F-D02D1690AC5C}">
+        <p15:threadingInfo xmlns:p15="http://schemas.microsoft.com/office/powerpoint/2012/main" timeZoneBias="-330"/>
+      </p:ext>
+    </p:extLst>
+  </p:cm>
+</p:cmLst>
+</file>
+
 <file path=ppt/notesMasters/notesMaster1.xml><?xml version="1.0" encoding="utf-8"?>
 <p:notesMaster xmlns:a="http://schemas.openxmlformats.org/drawingml/2006/main" xmlns:r="http://schemas.openxmlformats.org/officeDocument/2006/relationships" xmlns:p="http://schemas.openxmlformats.org/presentationml/2006/main">
   <p:cSld>
@@ -124,7 +164,7 @@
           <a:p>
             <a:fld id="{C75D3387-C564-4E9D-B894-3D0A5F35EB9E}" type="datetimeFigureOut">
               <a:rPr lang="en-IN" smtClean="0"/>
-              <a:t>15-11-2024</a:t>
+              <a:t>17-11-2024</a:t>
             </a:fld>
             <a:endParaRPr lang="en-IN"/>
           </a:p>
@@ -392,6 +432,306 @@
 </p:notesMaster>
 </file>
 
+<file path=ppt/notesSlides/notesSlide1.xml><?xml version="1.0" encoding="utf-8"?>
+<p:notes xmlns:a="http://schemas.openxmlformats.org/drawingml/2006/main" xmlns:r="http://schemas.openxmlformats.org/officeDocument/2006/relationships" xmlns:p="http://schemas.openxmlformats.org/presentationml/2006/main">
+  <p:cSld>
+    <p:spTree>
+      <p:nvGrpSpPr>
+        <p:cNvPr id="1" name=""/>
+        <p:cNvGrpSpPr/>
+        <p:nvPr/>
+      </p:nvGrpSpPr>
+      <p:grpSpPr>
+        <a:xfrm>
+          <a:off x="0" y="0"/>
+          <a:ext cx="0" cy="0"/>
+          <a:chOff x="0" y="0"/>
+          <a:chExt cx="0" cy="0"/>
+        </a:xfrm>
+      </p:grpSpPr>
+      <p:sp>
+        <p:nvSpPr>
+          <p:cNvPr id="2" name="Slide Image Placeholder 1"/>
+          <p:cNvSpPr>
+            <a:spLocks noGrp="1" noRot="1" noChangeAspect="1"/>
+          </p:cNvSpPr>
+          <p:nvPr>
+            <p:ph type="sldImg"/>
+          </p:nvPr>
+        </p:nvSpPr>
+        <p:spPr/>
+      </p:sp>
+      <p:sp>
+        <p:nvSpPr>
+          <p:cNvPr id="3" name="Notes Placeholder 2"/>
+          <p:cNvSpPr>
+            <a:spLocks noGrp="1"/>
+          </p:cNvSpPr>
+          <p:nvPr>
+            <p:ph type="body" idx="1"/>
+          </p:nvPr>
+        </p:nvSpPr>
+        <p:spPr/>
+        <p:txBody>
+          <a:bodyPr/>
+          <a:lstStyle/>
+          <a:p>
+            <a:endParaRPr lang="en-IN" dirty="0"/>
+          </a:p>
+        </p:txBody>
+      </p:sp>
+      <p:sp>
+        <p:nvSpPr>
+          <p:cNvPr id="4" name="Slide Number Placeholder 3"/>
+          <p:cNvSpPr>
+            <a:spLocks noGrp="1"/>
+          </p:cNvSpPr>
+          <p:nvPr>
+            <p:ph type="sldNum" sz="quarter" idx="5"/>
+          </p:nvPr>
+        </p:nvSpPr>
+        <p:spPr/>
+        <p:txBody>
+          <a:bodyPr/>
+          <a:lstStyle/>
+          <a:p>
+            <a:fld id="{3605F0D7-6116-4BBB-A0C4-07256CEFAFDC}" type="slidenum">
+              <a:rPr lang="en-IN" smtClean="0"/>
+              <a:t>14</a:t>
+            </a:fld>
+            <a:endParaRPr lang="en-IN"/>
+          </a:p>
+        </p:txBody>
+      </p:sp>
+    </p:spTree>
+    <p:extLst>
+      <p:ext uri="{BB962C8B-B14F-4D97-AF65-F5344CB8AC3E}">
+        <p14:creationId xmlns:p14="http://schemas.microsoft.com/office/powerpoint/2010/main" val="1739711405"/>
+      </p:ext>
+    </p:extLst>
+  </p:cSld>
+  <p:clrMapOvr>
+    <a:masterClrMapping/>
+  </p:clrMapOvr>
+</p:notes>
+</file>
+
+<file path=ppt/notesSlides/notesSlide2.xml><?xml version="1.0" encoding="utf-8"?>
+<p:notes xmlns:a="http://schemas.openxmlformats.org/drawingml/2006/main" xmlns:r="http://schemas.openxmlformats.org/officeDocument/2006/relationships" xmlns:p="http://schemas.openxmlformats.org/presentationml/2006/main">
+  <p:cSld>
+    <p:spTree>
+      <p:nvGrpSpPr>
+        <p:cNvPr id="1" name="">
+          <a:extLst>
+            <a:ext uri="{FF2B5EF4-FFF2-40B4-BE49-F238E27FC236}">
+              <a16:creationId xmlns:a16="http://schemas.microsoft.com/office/drawing/2014/main" id="{77D8F2E0-917C-EC15-FA4B-FA58F0188D2F}"/>
+            </a:ext>
+          </a:extLst>
+        </p:cNvPr>
+        <p:cNvGrpSpPr/>
+        <p:nvPr/>
+      </p:nvGrpSpPr>
+      <p:grpSpPr>
+        <a:xfrm>
+          <a:off x="0" y="0"/>
+          <a:ext cx="0" cy="0"/>
+          <a:chOff x="0" y="0"/>
+          <a:chExt cx="0" cy="0"/>
+        </a:xfrm>
+      </p:grpSpPr>
+      <p:sp>
+        <p:nvSpPr>
+          <p:cNvPr id="2" name="Slide Image Placeholder 1">
+            <a:extLst>
+              <a:ext uri="{FF2B5EF4-FFF2-40B4-BE49-F238E27FC236}">
+                <a16:creationId xmlns:a16="http://schemas.microsoft.com/office/drawing/2014/main" id="{DF280E10-4699-AC57-5357-BB95CC3975CA}"/>
+              </a:ext>
+            </a:extLst>
+          </p:cNvPr>
+          <p:cNvSpPr>
+            <a:spLocks noGrp="1" noRot="1" noChangeAspect="1"/>
+          </p:cNvSpPr>
+          <p:nvPr>
+            <p:ph type="sldImg"/>
+          </p:nvPr>
+        </p:nvSpPr>
+        <p:spPr/>
+      </p:sp>
+      <p:sp>
+        <p:nvSpPr>
+          <p:cNvPr id="3" name="Notes Placeholder 2">
+            <a:extLst>
+              <a:ext uri="{FF2B5EF4-FFF2-40B4-BE49-F238E27FC236}">
+                <a16:creationId xmlns:a16="http://schemas.microsoft.com/office/drawing/2014/main" id="{B2E49428-9D61-B1B1-B015-41D9E8A722AB}"/>
+              </a:ext>
+            </a:extLst>
+          </p:cNvPr>
+          <p:cNvSpPr>
+            <a:spLocks noGrp="1"/>
+          </p:cNvSpPr>
+          <p:nvPr>
+            <p:ph type="body" idx="1"/>
+          </p:nvPr>
+        </p:nvSpPr>
+        <p:spPr/>
+        <p:txBody>
+          <a:bodyPr/>
+          <a:lstStyle/>
+          <a:p>
+            <a:endParaRPr lang="en-IN" dirty="0"/>
+          </a:p>
+        </p:txBody>
+      </p:sp>
+      <p:sp>
+        <p:nvSpPr>
+          <p:cNvPr id="4" name="Slide Number Placeholder 3">
+            <a:extLst>
+              <a:ext uri="{FF2B5EF4-FFF2-40B4-BE49-F238E27FC236}">
+                <a16:creationId xmlns:a16="http://schemas.microsoft.com/office/drawing/2014/main" id="{55EBBA5C-45F2-7499-A5D8-A48158CE4829}"/>
+              </a:ext>
+            </a:extLst>
+          </p:cNvPr>
+          <p:cNvSpPr>
+            <a:spLocks noGrp="1"/>
+          </p:cNvSpPr>
+          <p:nvPr>
+            <p:ph type="sldNum" sz="quarter" idx="5"/>
+          </p:nvPr>
+        </p:nvSpPr>
+        <p:spPr/>
+        <p:txBody>
+          <a:bodyPr/>
+          <a:lstStyle/>
+          <a:p>
+            <a:fld id="{3605F0D7-6116-4BBB-A0C4-07256CEFAFDC}" type="slidenum">
+              <a:rPr lang="en-IN" smtClean="0"/>
+              <a:t>15</a:t>
+            </a:fld>
+            <a:endParaRPr lang="en-IN"/>
+          </a:p>
+        </p:txBody>
+      </p:sp>
+    </p:spTree>
+    <p:extLst>
+      <p:ext uri="{BB962C8B-B14F-4D97-AF65-F5344CB8AC3E}">
+        <p14:creationId xmlns:p14="http://schemas.microsoft.com/office/powerpoint/2010/main" val="227167129"/>
+      </p:ext>
+    </p:extLst>
+  </p:cSld>
+  <p:clrMapOvr>
+    <a:masterClrMapping/>
+  </p:clrMapOvr>
+</p:notes>
+</file>
+
+<file path=ppt/notesSlides/notesSlide3.xml><?xml version="1.0" encoding="utf-8"?>
+<p:notes xmlns:a="http://schemas.openxmlformats.org/drawingml/2006/main" xmlns:r="http://schemas.openxmlformats.org/officeDocument/2006/relationships" xmlns:p="http://schemas.openxmlformats.org/presentationml/2006/main">
+  <p:cSld>
+    <p:spTree>
+      <p:nvGrpSpPr>
+        <p:cNvPr id="1" name="">
+          <a:extLst>
+            <a:ext uri="{FF2B5EF4-FFF2-40B4-BE49-F238E27FC236}">
+              <a16:creationId xmlns:a16="http://schemas.microsoft.com/office/drawing/2014/main" id="{376CDA85-4E57-0589-F995-D5AC786E70C5}"/>
+            </a:ext>
+          </a:extLst>
+        </p:cNvPr>
+        <p:cNvGrpSpPr/>
+        <p:nvPr/>
+      </p:nvGrpSpPr>
+      <p:grpSpPr>
+        <a:xfrm>
+          <a:off x="0" y="0"/>
+          <a:ext cx="0" cy="0"/>
+          <a:chOff x="0" y="0"/>
+          <a:chExt cx="0" cy="0"/>
+        </a:xfrm>
+      </p:grpSpPr>
+      <p:sp>
+        <p:nvSpPr>
+          <p:cNvPr id="2" name="Slide Image Placeholder 1">
+            <a:extLst>
+              <a:ext uri="{FF2B5EF4-FFF2-40B4-BE49-F238E27FC236}">
+                <a16:creationId xmlns:a16="http://schemas.microsoft.com/office/drawing/2014/main" id="{42B2D44D-DE9A-7E5C-FA16-6E3C326742B3}"/>
+              </a:ext>
+            </a:extLst>
+          </p:cNvPr>
+          <p:cNvSpPr>
+            <a:spLocks noGrp="1" noRot="1" noChangeAspect="1"/>
+          </p:cNvSpPr>
+          <p:nvPr>
+            <p:ph type="sldImg"/>
+          </p:nvPr>
+        </p:nvSpPr>
+        <p:spPr/>
+      </p:sp>
+      <p:sp>
+        <p:nvSpPr>
+          <p:cNvPr id="3" name="Notes Placeholder 2">
+            <a:extLst>
+              <a:ext uri="{FF2B5EF4-FFF2-40B4-BE49-F238E27FC236}">
+                <a16:creationId xmlns:a16="http://schemas.microsoft.com/office/drawing/2014/main" id="{C9D3887E-EF24-6939-0E80-DC3FA6E3D61C}"/>
+              </a:ext>
+            </a:extLst>
+          </p:cNvPr>
+          <p:cNvSpPr>
+            <a:spLocks noGrp="1"/>
+          </p:cNvSpPr>
+          <p:nvPr>
+            <p:ph type="body" idx="1"/>
+          </p:nvPr>
+        </p:nvSpPr>
+        <p:spPr/>
+        <p:txBody>
+          <a:bodyPr/>
+          <a:lstStyle/>
+          <a:p>
+            <a:endParaRPr lang="en-IN" dirty="0"/>
+          </a:p>
+        </p:txBody>
+      </p:sp>
+      <p:sp>
+        <p:nvSpPr>
+          <p:cNvPr id="4" name="Slide Number Placeholder 3">
+            <a:extLst>
+              <a:ext uri="{FF2B5EF4-FFF2-40B4-BE49-F238E27FC236}">
+                <a16:creationId xmlns:a16="http://schemas.microsoft.com/office/drawing/2014/main" id="{3CD76927-8493-D24B-CC9F-50E0B5D3F321}"/>
+              </a:ext>
+            </a:extLst>
+          </p:cNvPr>
+          <p:cNvSpPr>
+            <a:spLocks noGrp="1"/>
+          </p:cNvSpPr>
+          <p:nvPr>
+            <p:ph type="sldNum" sz="quarter" idx="5"/>
+          </p:nvPr>
+        </p:nvSpPr>
+        <p:spPr/>
+        <p:txBody>
+          <a:bodyPr/>
+          <a:lstStyle/>
+          <a:p>
+            <a:fld id="{3605F0D7-6116-4BBB-A0C4-07256CEFAFDC}" type="slidenum">
+              <a:rPr lang="en-IN" smtClean="0"/>
+              <a:t>16</a:t>
+            </a:fld>
+            <a:endParaRPr lang="en-IN"/>
+          </a:p>
+        </p:txBody>
+      </p:sp>
+    </p:spTree>
+    <p:extLst>
+      <p:ext uri="{BB962C8B-B14F-4D97-AF65-F5344CB8AC3E}">
+        <p14:creationId xmlns:p14="http://schemas.microsoft.com/office/powerpoint/2010/main" val="4198749632"/>
+      </p:ext>
+    </p:extLst>
+  </p:cSld>
+  <p:clrMapOvr>
+    <a:masterClrMapping/>
+  </p:clrMapOvr>
+</p:notes>
+</file>
+
 <file path=ppt/slideLayouts/slideLayout1.xml><?xml version="1.0" encoding="utf-8"?>
 <p:sldLayout xmlns:a="http://schemas.openxmlformats.org/drawingml/2006/main" xmlns:r="http://schemas.openxmlformats.org/officeDocument/2006/relationships" xmlns:p="http://schemas.openxmlformats.org/presentationml/2006/main" type="obj" preserve="1">
   <p:cSld name="Title Slide">
@@ -543,7 +883,7 @@
           <a:p>
             <a:fld id="{6A1F3B75-D739-459F-AFFB-6AA49E5EC2D8}" type="datetime1">
               <a:rPr lang="en-US" smtClean="0"/>
-              <a:t>11/15/2024</a:t>
+              <a:t>11/17/2024</a:t>
             </a:fld>
             <a:endParaRPr lang="en-US"/>
           </a:p>
@@ -720,7 +1060,7 @@
           <a:p>
             <a:fld id="{5641E79E-3BE4-4C33-9FDC-8E8BC9AEC30A}" type="datetime1">
               <a:rPr lang="en-US" smtClean="0"/>
-              <a:t>11/15/2024</a:t>
+              <a:t>11/17/2024</a:t>
             </a:fld>
             <a:endParaRPr lang="en-US"/>
           </a:p>
@@ -934,7 +1274,7 @@
           <a:p>
             <a:fld id="{C8B716DF-BFBA-42E5-AE98-99BE7AC39697}" type="datetime1">
               <a:rPr lang="en-US" smtClean="0"/>
-              <a:t>11/15/2024</a:t>
+              <a:t>11/17/2024</a:t>
             </a:fld>
             <a:endParaRPr lang="en-US"/>
           </a:p>
@@ -1082,7 +1422,7 @@
           <a:p>
             <a:fld id="{398F0C5D-AF81-4C6B-9BA2-22DCCBF7E3E0}" type="datetime1">
               <a:rPr lang="en-US" smtClean="0"/>
-              <a:t>11/15/2024</a:t>
+              <a:t>11/17/2024</a:t>
             </a:fld>
             <a:endParaRPr lang="en-US"/>
           </a:p>
@@ -1209,7 +1549,7 @@
           <a:p>
             <a:fld id="{C6B910F7-70A7-44AF-B4B8-5CD810326D05}" type="datetime1">
               <a:rPr lang="en-US" smtClean="0"/>
-              <a:t>11/15/2024</a:t>
+              <a:t>11/17/2024</a:t>
             </a:fld>
             <a:endParaRPr lang="en-US"/>
           </a:p>
@@ -1478,7 +1818,7 @@
           <a:p>
             <a:fld id="{B3220616-63A2-4442-AAF1-F276CF4C6A97}" type="datetime1">
               <a:rPr lang="en-US" smtClean="0"/>
-              <a:t>11/15/2024</a:t>
+              <a:t>11/17/2024</a:t>
             </a:fld>
             <a:endParaRPr lang="en-US"/>
           </a:p>
@@ -2095,6 +2435,2249 @@
 </p:sld>
 </file>
 
+<file path=ppt/slides/slide10.xml><?xml version="1.0" encoding="utf-8"?>
+<p:sld xmlns:a="http://schemas.openxmlformats.org/drawingml/2006/main" xmlns:r="http://schemas.openxmlformats.org/officeDocument/2006/relationships" xmlns:p="http://schemas.openxmlformats.org/presentationml/2006/main">
+  <p:cSld>
+    <p:spTree>
+      <p:nvGrpSpPr>
+        <p:cNvPr id="1" name="">
+          <a:extLst>
+            <a:ext uri="{FF2B5EF4-FFF2-40B4-BE49-F238E27FC236}">
+              <a16:creationId xmlns:a16="http://schemas.microsoft.com/office/drawing/2014/main" id="{9FD54379-DCA5-3B2F-18EC-A3B450F3A914}"/>
+            </a:ext>
+          </a:extLst>
+        </p:cNvPr>
+        <p:cNvGrpSpPr/>
+        <p:nvPr/>
+      </p:nvGrpSpPr>
+      <p:grpSpPr>
+        <a:xfrm>
+          <a:off x="0" y="0"/>
+          <a:ext cx="0" cy="0"/>
+          <a:chOff x="0" y="0"/>
+          <a:chExt cx="0" cy="0"/>
+        </a:xfrm>
+      </p:grpSpPr>
+      <p:sp>
+        <p:nvSpPr>
+          <p:cNvPr id="5" name="TextBox 4">
+            <a:extLst>
+              <a:ext uri="{FF2B5EF4-FFF2-40B4-BE49-F238E27FC236}">
+                <a16:creationId xmlns:a16="http://schemas.microsoft.com/office/drawing/2014/main" id="{CD07B71B-B5BF-A019-3D89-606C36EE935D}"/>
+              </a:ext>
+            </a:extLst>
+          </p:cNvPr>
+          <p:cNvSpPr txBox="1"/>
+          <p:nvPr/>
+        </p:nvSpPr>
+        <p:spPr>
+          <a:xfrm>
+            <a:off x="165556" y="8921859"/>
+            <a:ext cx="11658600" cy="1692771"/>
+          </a:xfrm>
+          <a:prstGeom prst="rect">
+            <a:avLst/>
+          </a:prstGeom>
+          <a:noFill/>
+        </p:spPr>
+        <p:txBody>
+          <a:bodyPr wrap="square">
+            <a:spAutoFit/>
+          </a:bodyPr>
+          <a:lstStyle/>
+          <a:p>
+            <a:pPr algn="ctr"/>
+            <a:r>
+              <a:rPr lang="en-US" sz="3200" b="0" dirty="0">
+                <a:solidFill>
+                  <a:schemeClr val="tx1"/>
+                </a:solidFill>
+                <a:effectLst/>
+                <a:latin typeface="+mj-lt"/>
+              </a:rPr>
+              <a:t>Most number of loan applicants have 10+yrs of Work experience, they are most likely to default as well.</a:t>
+            </a:r>
+            <a:endParaRPr lang="fr-FR" sz="4000" b="1" dirty="0">
+              <a:solidFill>
+                <a:srgbClr val="569CD6"/>
+              </a:solidFill>
+              <a:latin typeface="+mn-lt"/>
+            </a:endParaRPr>
+          </a:p>
+          <a:p>
+            <a:pPr algn="l"/>
+            <a:endParaRPr lang="en-IN" sz="4000" dirty="0">
+              <a:latin typeface="+mn-lt"/>
+            </a:endParaRPr>
+          </a:p>
+        </p:txBody>
+      </p:sp>
+      <p:sp>
+        <p:nvSpPr>
+          <p:cNvPr id="4" name="TextBox 3">
+            <a:extLst>
+              <a:ext uri="{FF2B5EF4-FFF2-40B4-BE49-F238E27FC236}">
+                <a16:creationId xmlns:a16="http://schemas.microsoft.com/office/drawing/2014/main" id="{C8372F8F-D3C7-8747-C716-58F9FAA59964}"/>
+              </a:ext>
+            </a:extLst>
+          </p:cNvPr>
+          <p:cNvSpPr txBox="1"/>
+          <p:nvPr/>
+        </p:nvSpPr>
+        <p:spPr>
+          <a:xfrm>
+            <a:off x="457200" y="1371600"/>
+            <a:ext cx="11658600" cy="2554545"/>
+          </a:xfrm>
+          <a:prstGeom prst="rect">
+            <a:avLst/>
+          </a:prstGeom>
+          <a:noFill/>
+        </p:spPr>
+        <p:txBody>
+          <a:bodyPr wrap="square">
+            <a:spAutoFit/>
+          </a:bodyPr>
+          <a:lstStyle/>
+          <a:p>
+            <a:pPr algn="l"/>
+            <a:r>
+              <a:rPr lang="en-US" sz="4000" b="1" dirty="0">
+                <a:solidFill>
+                  <a:srgbClr val="569CD6"/>
+                </a:solidFill>
+                <a:effectLst/>
+                <a:latin typeface="+mn-lt"/>
+                <a:ea typeface="Calibri" panose="020F0502020204030204" pitchFamily="34" charset="0"/>
+                <a:cs typeface="Calibri" panose="020F0502020204030204" pitchFamily="34" charset="0"/>
+              </a:rPr>
+              <a:t>Bivariate Analysis of Ordered Categorical Variables.</a:t>
+            </a:r>
+            <a:endParaRPr lang="fr-FR" sz="4000" b="1" dirty="0">
+              <a:solidFill>
+                <a:srgbClr val="569CD6"/>
+              </a:solidFill>
+              <a:effectLst/>
+              <a:latin typeface="+mn-lt"/>
+            </a:endParaRPr>
+          </a:p>
+          <a:p>
+            <a:pPr algn="l"/>
+            <a:r>
+              <a:rPr lang="en-US" sz="4000" b="1" dirty="0">
+                <a:solidFill>
+                  <a:schemeClr val="tx1"/>
+                </a:solidFill>
+                <a:latin typeface="+mn-lt"/>
+              </a:rPr>
+              <a:t>3. </a:t>
+            </a:r>
+            <a:r>
+              <a:rPr lang="en-US" sz="4000" b="1" dirty="0">
+                <a:solidFill>
+                  <a:schemeClr val="tx1"/>
+                </a:solidFill>
+                <a:effectLst/>
+                <a:latin typeface="+mn-lt"/>
+              </a:rPr>
+              <a:t>Employment Tenure Vs Loan Status</a:t>
+            </a:r>
+          </a:p>
+          <a:p>
+            <a:pPr algn="l"/>
+            <a:endParaRPr lang="fr-FR" sz="4000" b="1" dirty="0">
+              <a:solidFill>
+                <a:srgbClr val="569CD6"/>
+              </a:solidFill>
+              <a:latin typeface="+mn-lt"/>
+            </a:endParaRPr>
+          </a:p>
+          <a:p>
+            <a:pPr algn="l"/>
+            <a:endParaRPr lang="en-IN" sz="4000" dirty="0">
+              <a:latin typeface="+mn-lt"/>
+            </a:endParaRPr>
+          </a:p>
+        </p:txBody>
+      </p:sp>
+      <p:pic>
+        <p:nvPicPr>
+          <p:cNvPr id="6" name="Picture 5">
+            <a:extLst>
+              <a:ext uri="{FF2B5EF4-FFF2-40B4-BE49-F238E27FC236}">
+                <a16:creationId xmlns:a16="http://schemas.microsoft.com/office/drawing/2014/main" id="{AD1F6238-579B-D42E-3B84-8750C8DC0809}"/>
+              </a:ext>
+            </a:extLst>
+          </p:cNvPr>
+          <p:cNvPicPr>
+            <a:picLocks noChangeAspect="1"/>
+          </p:cNvPicPr>
+          <p:nvPr/>
+        </p:nvPicPr>
+        <p:blipFill>
+          <a:blip r:embed="rId2"/>
+          <a:stretch>
+            <a:fillRect/>
+          </a:stretch>
+        </p:blipFill>
+        <p:spPr>
+          <a:xfrm>
+            <a:off x="165556" y="2664112"/>
+            <a:ext cx="11569244" cy="6156008"/>
+          </a:xfrm>
+          <a:prstGeom prst="rect">
+            <a:avLst/>
+          </a:prstGeom>
+        </p:spPr>
+      </p:pic>
+    </p:spTree>
+    <p:extLst>
+      <p:ext uri="{BB962C8B-B14F-4D97-AF65-F5344CB8AC3E}">
+        <p14:creationId xmlns:p14="http://schemas.microsoft.com/office/powerpoint/2010/main" val="458302020"/>
+      </p:ext>
+    </p:extLst>
+  </p:cSld>
+  <p:clrMapOvr>
+    <a:masterClrMapping/>
+  </p:clrMapOvr>
+</p:sld>
+</file>
+
+<file path=ppt/slides/slide11.xml><?xml version="1.0" encoding="utf-8"?>
+<p:sld xmlns:a="http://schemas.openxmlformats.org/drawingml/2006/main" xmlns:r="http://schemas.openxmlformats.org/officeDocument/2006/relationships" xmlns:p="http://schemas.openxmlformats.org/presentationml/2006/main">
+  <p:cSld>
+    <p:spTree>
+      <p:nvGrpSpPr>
+        <p:cNvPr id="1" name="">
+          <a:extLst>
+            <a:ext uri="{FF2B5EF4-FFF2-40B4-BE49-F238E27FC236}">
+              <a16:creationId xmlns:a16="http://schemas.microsoft.com/office/drawing/2014/main" id="{E2424468-E2E5-B430-1F95-73C58E340FDB}"/>
+            </a:ext>
+          </a:extLst>
+        </p:cNvPr>
+        <p:cNvGrpSpPr/>
+        <p:nvPr/>
+      </p:nvGrpSpPr>
+      <p:grpSpPr>
+        <a:xfrm>
+          <a:off x="0" y="0"/>
+          <a:ext cx="0" cy="0"/>
+          <a:chOff x="0" y="0"/>
+          <a:chExt cx="0" cy="0"/>
+        </a:xfrm>
+      </p:grpSpPr>
+      <p:sp>
+        <p:nvSpPr>
+          <p:cNvPr id="5" name="TextBox 4">
+            <a:extLst>
+              <a:ext uri="{FF2B5EF4-FFF2-40B4-BE49-F238E27FC236}">
+                <a16:creationId xmlns:a16="http://schemas.microsoft.com/office/drawing/2014/main" id="{B1C1898A-5F92-DAC7-4643-C0A938B88E0C}"/>
+              </a:ext>
+            </a:extLst>
+          </p:cNvPr>
+          <p:cNvSpPr txBox="1"/>
+          <p:nvPr/>
+        </p:nvSpPr>
+        <p:spPr>
+          <a:xfrm>
+            <a:off x="165556" y="8921858"/>
+            <a:ext cx="11658600" cy="338554"/>
+          </a:xfrm>
+          <a:prstGeom prst="rect">
+            <a:avLst/>
+          </a:prstGeom>
+          <a:noFill/>
+        </p:spPr>
+        <p:txBody>
+          <a:bodyPr wrap="square">
+            <a:spAutoFit/>
+          </a:bodyPr>
+          <a:lstStyle/>
+          <a:p>
+            <a:pPr algn="ctr"/>
+            <a:r>
+              <a:rPr lang="en-US" sz="1600" b="0" dirty="0">
+                <a:solidFill>
+                  <a:schemeClr val="tx1"/>
+                </a:solidFill>
+                <a:effectLst/>
+                <a:latin typeface="+mj-lt"/>
+              </a:rPr>
+              <a:t>maximum loans are issued against Debt consolidation category and at the same time most people have defaulted in this category.st</a:t>
+            </a:r>
+            <a:endParaRPr lang="en-IN" sz="1600" dirty="0">
+              <a:latin typeface="+mn-lt"/>
+            </a:endParaRPr>
+          </a:p>
+        </p:txBody>
+      </p:sp>
+      <p:sp>
+        <p:nvSpPr>
+          <p:cNvPr id="4" name="TextBox 3">
+            <a:extLst>
+              <a:ext uri="{FF2B5EF4-FFF2-40B4-BE49-F238E27FC236}">
+                <a16:creationId xmlns:a16="http://schemas.microsoft.com/office/drawing/2014/main" id="{7A776C16-0421-591E-A759-0B1F9EE8759B}"/>
+              </a:ext>
+            </a:extLst>
+          </p:cNvPr>
+          <p:cNvSpPr txBox="1"/>
+          <p:nvPr/>
+        </p:nvSpPr>
+        <p:spPr>
+          <a:xfrm>
+            <a:off x="457200" y="1371600"/>
+            <a:ext cx="11658600" cy="3170099"/>
+          </a:xfrm>
+          <a:prstGeom prst="rect">
+            <a:avLst/>
+          </a:prstGeom>
+          <a:noFill/>
+        </p:spPr>
+        <p:txBody>
+          <a:bodyPr wrap="square">
+            <a:spAutoFit/>
+          </a:bodyPr>
+          <a:lstStyle/>
+          <a:p>
+            <a:pPr algn="l"/>
+            <a:r>
+              <a:rPr lang="fr-FR" sz="4000" b="1" dirty="0" err="1">
+                <a:solidFill>
+                  <a:srgbClr val="569CD6"/>
+                </a:solidFill>
+                <a:effectLst/>
+                <a:latin typeface="+mn-lt"/>
+              </a:rPr>
+              <a:t>Bivariate</a:t>
+            </a:r>
+            <a:r>
+              <a:rPr lang="fr-FR" sz="4000" b="1" dirty="0">
+                <a:solidFill>
+                  <a:srgbClr val="569CD6"/>
+                </a:solidFill>
+                <a:effectLst/>
+                <a:latin typeface="+mn-lt"/>
+              </a:rPr>
+              <a:t> </a:t>
+            </a:r>
+            <a:r>
+              <a:rPr lang="fr-FR" sz="4000" b="1" dirty="0" err="1">
+                <a:solidFill>
+                  <a:srgbClr val="569CD6"/>
+                </a:solidFill>
+                <a:effectLst/>
+                <a:latin typeface="+mn-lt"/>
+              </a:rPr>
+              <a:t>Analysis</a:t>
+            </a:r>
+            <a:r>
+              <a:rPr lang="fr-FR" sz="4000" b="1" dirty="0">
+                <a:solidFill>
+                  <a:srgbClr val="569CD6"/>
+                </a:solidFill>
+                <a:effectLst/>
+                <a:latin typeface="+mn-lt"/>
+              </a:rPr>
+              <a:t> of </a:t>
+            </a:r>
+            <a:r>
+              <a:rPr lang="fr-FR" sz="4000" b="1" dirty="0" err="1">
+                <a:solidFill>
+                  <a:srgbClr val="569CD6"/>
+                </a:solidFill>
+                <a:effectLst/>
+                <a:latin typeface="+mn-lt"/>
+              </a:rPr>
+              <a:t>Unordered</a:t>
+            </a:r>
+            <a:r>
+              <a:rPr lang="fr-FR" sz="4000" b="1" dirty="0">
+                <a:solidFill>
+                  <a:srgbClr val="569CD6"/>
+                </a:solidFill>
+                <a:effectLst/>
+                <a:latin typeface="+mn-lt"/>
+              </a:rPr>
+              <a:t> </a:t>
+            </a:r>
+            <a:r>
+              <a:rPr lang="fr-FR" sz="4000" b="1" dirty="0" err="1">
+                <a:solidFill>
+                  <a:srgbClr val="569CD6"/>
+                </a:solidFill>
+                <a:effectLst/>
+                <a:latin typeface="+mn-lt"/>
+              </a:rPr>
+              <a:t>Categorical</a:t>
+            </a:r>
+            <a:r>
+              <a:rPr lang="fr-FR" sz="4000" b="1" dirty="0">
+                <a:solidFill>
+                  <a:srgbClr val="569CD6"/>
+                </a:solidFill>
+                <a:effectLst/>
+                <a:latin typeface="+mn-lt"/>
+              </a:rPr>
+              <a:t> Variables.</a:t>
+            </a:r>
+          </a:p>
+          <a:p>
+            <a:pPr marL="742950" indent="-742950" algn="l">
+              <a:buAutoNum type="arabicPeriod"/>
+            </a:pPr>
+            <a:r>
+              <a:rPr lang="en-US" sz="4000" b="1" dirty="0">
+                <a:solidFill>
+                  <a:schemeClr val="tx1"/>
+                </a:solidFill>
+                <a:effectLst/>
+                <a:latin typeface="+mn-lt"/>
+              </a:rPr>
+              <a:t>Purpose of Loan v/s Loan Status</a:t>
+            </a:r>
+          </a:p>
+          <a:p>
+            <a:pPr marL="742950" indent="-742950" algn="l">
+              <a:buAutoNum type="arabicPeriod"/>
+            </a:pPr>
+            <a:endParaRPr lang="en-US" sz="4000" b="1" dirty="0">
+              <a:solidFill>
+                <a:schemeClr val="tx1"/>
+              </a:solidFill>
+              <a:effectLst/>
+              <a:latin typeface="+mn-lt"/>
+            </a:endParaRPr>
+          </a:p>
+          <a:p>
+            <a:pPr algn="l"/>
+            <a:endParaRPr lang="fr-FR" sz="4000" b="1" dirty="0">
+              <a:solidFill>
+                <a:srgbClr val="569CD6"/>
+              </a:solidFill>
+              <a:latin typeface="+mn-lt"/>
+            </a:endParaRPr>
+          </a:p>
+          <a:p>
+            <a:pPr algn="l"/>
+            <a:endParaRPr lang="en-IN" sz="4000" dirty="0">
+              <a:latin typeface="+mn-lt"/>
+            </a:endParaRPr>
+          </a:p>
+        </p:txBody>
+      </p:sp>
+      <p:pic>
+        <p:nvPicPr>
+          <p:cNvPr id="3" name="Picture 2">
+            <a:extLst>
+              <a:ext uri="{FF2B5EF4-FFF2-40B4-BE49-F238E27FC236}">
+                <a16:creationId xmlns:a16="http://schemas.microsoft.com/office/drawing/2014/main" id="{77C9255C-DE2D-441F-F278-B06A66F9DA38}"/>
+              </a:ext>
+            </a:extLst>
+          </p:cNvPr>
+          <p:cNvPicPr>
+            <a:picLocks noChangeAspect="1"/>
+          </p:cNvPicPr>
+          <p:nvPr/>
+        </p:nvPicPr>
+        <p:blipFill>
+          <a:blip r:embed="rId2"/>
+          <a:stretch>
+            <a:fillRect/>
+          </a:stretch>
+        </p:blipFill>
+        <p:spPr>
+          <a:xfrm>
+            <a:off x="400734" y="2590800"/>
+            <a:ext cx="11188244" cy="6771302"/>
+          </a:xfrm>
+          <a:prstGeom prst="rect">
+            <a:avLst/>
+          </a:prstGeom>
+        </p:spPr>
+      </p:pic>
+      <p:sp>
+        <p:nvSpPr>
+          <p:cNvPr id="7" name="TextBox 6">
+            <a:extLst>
+              <a:ext uri="{FF2B5EF4-FFF2-40B4-BE49-F238E27FC236}">
+                <a16:creationId xmlns:a16="http://schemas.microsoft.com/office/drawing/2014/main" id="{8C286779-2F55-32DD-6973-BFF35724F485}"/>
+              </a:ext>
+            </a:extLst>
+          </p:cNvPr>
+          <p:cNvSpPr txBox="1"/>
+          <p:nvPr/>
+        </p:nvSpPr>
+        <p:spPr>
+          <a:xfrm>
+            <a:off x="211276" y="9180939"/>
+            <a:ext cx="11658600" cy="830997"/>
+          </a:xfrm>
+          <a:prstGeom prst="rect">
+            <a:avLst/>
+          </a:prstGeom>
+          <a:noFill/>
+        </p:spPr>
+        <p:txBody>
+          <a:bodyPr wrap="square">
+            <a:spAutoFit/>
+          </a:bodyPr>
+          <a:lstStyle/>
+          <a:p>
+            <a:pPr algn="ctr"/>
+            <a:r>
+              <a:rPr lang="en-US" sz="2400" dirty="0">
+                <a:latin typeface="+mn-lt"/>
+              </a:rPr>
+              <a:t>Maximum loans are issued against Debt consolidation category and at the same time most people have defaulted in this category.</a:t>
+            </a:r>
+            <a:endParaRPr lang="en-IN" sz="2400" dirty="0">
+              <a:latin typeface="+mn-lt"/>
+            </a:endParaRPr>
+          </a:p>
+        </p:txBody>
+      </p:sp>
+    </p:spTree>
+    <p:extLst>
+      <p:ext uri="{BB962C8B-B14F-4D97-AF65-F5344CB8AC3E}">
+        <p14:creationId xmlns:p14="http://schemas.microsoft.com/office/powerpoint/2010/main" val="1971650069"/>
+      </p:ext>
+    </p:extLst>
+  </p:cSld>
+  <p:clrMapOvr>
+    <a:masterClrMapping/>
+  </p:clrMapOvr>
+</p:sld>
+</file>
+
+<file path=ppt/slides/slide12.xml><?xml version="1.0" encoding="utf-8"?>
+<p:sld xmlns:a="http://schemas.openxmlformats.org/drawingml/2006/main" xmlns:r="http://schemas.openxmlformats.org/officeDocument/2006/relationships" xmlns:p="http://schemas.openxmlformats.org/presentationml/2006/main">
+  <p:cSld>
+    <p:spTree>
+      <p:nvGrpSpPr>
+        <p:cNvPr id="1" name="">
+          <a:extLst>
+            <a:ext uri="{FF2B5EF4-FFF2-40B4-BE49-F238E27FC236}">
+              <a16:creationId xmlns:a16="http://schemas.microsoft.com/office/drawing/2014/main" id="{AC9A8498-7648-AE6E-CEB5-8DE1A09144D3}"/>
+            </a:ext>
+          </a:extLst>
+        </p:cNvPr>
+        <p:cNvGrpSpPr/>
+        <p:nvPr/>
+      </p:nvGrpSpPr>
+      <p:grpSpPr>
+        <a:xfrm>
+          <a:off x="0" y="0"/>
+          <a:ext cx="0" cy="0"/>
+          <a:chOff x="0" y="0"/>
+          <a:chExt cx="0" cy="0"/>
+        </a:xfrm>
+      </p:grpSpPr>
+      <p:sp>
+        <p:nvSpPr>
+          <p:cNvPr id="4" name="TextBox 3">
+            <a:extLst>
+              <a:ext uri="{FF2B5EF4-FFF2-40B4-BE49-F238E27FC236}">
+                <a16:creationId xmlns:a16="http://schemas.microsoft.com/office/drawing/2014/main" id="{1CC67B3F-FEDD-A656-77DF-F3AF2AD30532}"/>
+              </a:ext>
+            </a:extLst>
+          </p:cNvPr>
+          <p:cNvSpPr txBox="1"/>
+          <p:nvPr/>
+        </p:nvSpPr>
+        <p:spPr>
+          <a:xfrm>
+            <a:off x="457200" y="1371600"/>
+            <a:ext cx="11658600" cy="3785652"/>
+          </a:xfrm>
+          <a:prstGeom prst="rect">
+            <a:avLst/>
+          </a:prstGeom>
+          <a:noFill/>
+        </p:spPr>
+        <p:txBody>
+          <a:bodyPr wrap="square">
+            <a:spAutoFit/>
+          </a:bodyPr>
+          <a:lstStyle/>
+          <a:p>
+            <a:pPr algn="l"/>
+            <a:r>
+              <a:rPr lang="fr-FR" sz="4000" b="1" dirty="0" err="1">
+                <a:solidFill>
+                  <a:srgbClr val="569CD6"/>
+                </a:solidFill>
+                <a:effectLst/>
+                <a:latin typeface="+mn-lt"/>
+              </a:rPr>
+              <a:t>Bivariate</a:t>
+            </a:r>
+            <a:r>
+              <a:rPr lang="fr-FR" sz="4000" b="1" dirty="0">
+                <a:solidFill>
+                  <a:srgbClr val="569CD6"/>
+                </a:solidFill>
+                <a:effectLst/>
+                <a:latin typeface="+mn-lt"/>
+              </a:rPr>
+              <a:t> </a:t>
+            </a:r>
+            <a:r>
+              <a:rPr lang="fr-FR" sz="4000" b="1" dirty="0" err="1">
+                <a:solidFill>
+                  <a:srgbClr val="569CD6"/>
+                </a:solidFill>
+                <a:effectLst/>
+                <a:latin typeface="+mn-lt"/>
+              </a:rPr>
+              <a:t>Analysis</a:t>
+            </a:r>
+            <a:r>
+              <a:rPr lang="fr-FR" sz="4000" b="1" dirty="0">
+                <a:solidFill>
+                  <a:srgbClr val="569CD6"/>
+                </a:solidFill>
+                <a:effectLst/>
+                <a:latin typeface="+mn-lt"/>
+              </a:rPr>
+              <a:t> of </a:t>
+            </a:r>
+            <a:r>
+              <a:rPr lang="fr-FR" sz="4000" b="1" dirty="0" err="1">
+                <a:solidFill>
+                  <a:srgbClr val="569CD6"/>
+                </a:solidFill>
+                <a:effectLst/>
+                <a:latin typeface="+mn-lt"/>
+              </a:rPr>
+              <a:t>Unordered</a:t>
+            </a:r>
+            <a:r>
+              <a:rPr lang="fr-FR" sz="4000" b="1" dirty="0">
+                <a:solidFill>
+                  <a:srgbClr val="569CD6"/>
+                </a:solidFill>
+                <a:effectLst/>
+                <a:latin typeface="+mn-lt"/>
+              </a:rPr>
+              <a:t> </a:t>
+            </a:r>
+            <a:r>
+              <a:rPr lang="fr-FR" sz="4000" b="1" dirty="0" err="1">
+                <a:solidFill>
+                  <a:srgbClr val="569CD6"/>
+                </a:solidFill>
+                <a:effectLst/>
+                <a:latin typeface="+mn-lt"/>
+              </a:rPr>
+              <a:t>Categorical</a:t>
+            </a:r>
+            <a:r>
+              <a:rPr lang="fr-FR" sz="4000" b="1" dirty="0">
+                <a:solidFill>
+                  <a:srgbClr val="569CD6"/>
+                </a:solidFill>
+                <a:effectLst/>
+                <a:latin typeface="+mn-lt"/>
+              </a:rPr>
+              <a:t> Variables.</a:t>
+            </a:r>
+          </a:p>
+          <a:p>
+            <a:pPr algn="l"/>
+            <a:r>
+              <a:rPr lang="en-US" sz="4000" b="1" dirty="0">
+                <a:solidFill>
+                  <a:schemeClr val="tx1"/>
+                </a:solidFill>
+                <a:effectLst/>
+                <a:latin typeface="+mn-lt"/>
+              </a:rPr>
+              <a:t>2. Home Ownership Status v/s Loan Status</a:t>
+            </a:r>
+          </a:p>
+          <a:p>
+            <a:pPr algn="l"/>
+            <a:endParaRPr lang="en-US" sz="4000" b="1" dirty="0">
+              <a:solidFill>
+                <a:schemeClr val="tx1"/>
+              </a:solidFill>
+              <a:effectLst/>
+              <a:latin typeface="+mn-lt"/>
+            </a:endParaRPr>
+          </a:p>
+          <a:p>
+            <a:pPr marL="742950" indent="-742950" algn="l">
+              <a:buAutoNum type="arabicPeriod"/>
+            </a:pPr>
+            <a:endParaRPr lang="en-US" sz="4000" b="1" dirty="0">
+              <a:solidFill>
+                <a:schemeClr val="tx1"/>
+              </a:solidFill>
+              <a:effectLst/>
+              <a:latin typeface="+mn-lt"/>
+            </a:endParaRPr>
+          </a:p>
+          <a:p>
+            <a:pPr algn="l"/>
+            <a:endParaRPr lang="fr-FR" sz="4000" b="1" dirty="0">
+              <a:solidFill>
+                <a:srgbClr val="569CD6"/>
+              </a:solidFill>
+              <a:latin typeface="+mn-lt"/>
+            </a:endParaRPr>
+          </a:p>
+          <a:p>
+            <a:pPr algn="l"/>
+            <a:endParaRPr lang="en-IN" sz="4000" dirty="0">
+              <a:latin typeface="+mn-lt"/>
+            </a:endParaRPr>
+          </a:p>
+        </p:txBody>
+      </p:sp>
+      <p:sp>
+        <p:nvSpPr>
+          <p:cNvPr id="7" name="TextBox 6">
+            <a:extLst>
+              <a:ext uri="{FF2B5EF4-FFF2-40B4-BE49-F238E27FC236}">
+                <a16:creationId xmlns:a16="http://schemas.microsoft.com/office/drawing/2014/main" id="{7C6E502F-AD37-33B6-4E34-2A2D471ACA7B}"/>
+              </a:ext>
+            </a:extLst>
+          </p:cNvPr>
+          <p:cNvSpPr txBox="1"/>
+          <p:nvPr/>
+        </p:nvSpPr>
+        <p:spPr>
+          <a:xfrm>
+            <a:off x="211276" y="9180939"/>
+            <a:ext cx="11658600" cy="954107"/>
+          </a:xfrm>
+          <a:prstGeom prst="rect">
+            <a:avLst/>
+          </a:prstGeom>
+          <a:noFill/>
+        </p:spPr>
+        <p:txBody>
+          <a:bodyPr wrap="square">
+            <a:spAutoFit/>
+          </a:bodyPr>
+          <a:lstStyle/>
+          <a:p>
+            <a:pPr algn="ctr"/>
+            <a:r>
+              <a:rPr lang="en-US" sz="2800" dirty="0">
+                <a:latin typeface="+mn-lt"/>
+              </a:rPr>
+              <a:t>The applicants who stay in a rented or mortgaged house are more likely to default.</a:t>
+            </a:r>
+            <a:endParaRPr lang="en-IN" sz="2800" dirty="0">
+              <a:latin typeface="+mn-lt"/>
+            </a:endParaRPr>
+          </a:p>
+        </p:txBody>
+      </p:sp>
+      <p:pic>
+        <p:nvPicPr>
+          <p:cNvPr id="6" name="Picture 5">
+            <a:extLst>
+              <a:ext uri="{FF2B5EF4-FFF2-40B4-BE49-F238E27FC236}">
+                <a16:creationId xmlns:a16="http://schemas.microsoft.com/office/drawing/2014/main" id="{072828CC-5BD0-0C3B-BBE7-A1858721CE76}"/>
+              </a:ext>
+            </a:extLst>
+          </p:cNvPr>
+          <p:cNvPicPr>
+            <a:picLocks noChangeAspect="1"/>
+          </p:cNvPicPr>
+          <p:nvPr/>
+        </p:nvPicPr>
+        <p:blipFill>
+          <a:blip r:embed="rId2"/>
+          <a:stretch>
+            <a:fillRect/>
+          </a:stretch>
+        </p:blipFill>
+        <p:spPr>
+          <a:xfrm>
+            <a:off x="91440" y="2667000"/>
+            <a:ext cx="11712486" cy="6262688"/>
+          </a:xfrm>
+          <a:prstGeom prst="rect">
+            <a:avLst/>
+          </a:prstGeom>
+        </p:spPr>
+      </p:pic>
+    </p:spTree>
+    <p:extLst>
+      <p:ext uri="{BB962C8B-B14F-4D97-AF65-F5344CB8AC3E}">
+        <p14:creationId xmlns:p14="http://schemas.microsoft.com/office/powerpoint/2010/main" val="728726634"/>
+      </p:ext>
+    </p:extLst>
+  </p:cSld>
+  <p:clrMapOvr>
+    <a:masterClrMapping/>
+  </p:clrMapOvr>
+</p:sld>
+</file>
+
+<file path=ppt/slides/slide13.xml><?xml version="1.0" encoding="utf-8"?>
+<p:sld xmlns:a="http://schemas.openxmlformats.org/drawingml/2006/main" xmlns:r="http://schemas.openxmlformats.org/officeDocument/2006/relationships" xmlns:p="http://schemas.openxmlformats.org/presentationml/2006/main">
+  <p:cSld>
+    <p:spTree>
+      <p:nvGrpSpPr>
+        <p:cNvPr id="1" name="">
+          <a:extLst>
+            <a:ext uri="{FF2B5EF4-FFF2-40B4-BE49-F238E27FC236}">
+              <a16:creationId xmlns:a16="http://schemas.microsoft.com/office/drawing/2014/main" id="{67F9336A-B0D4-6B01-5C71-9D61FE2B9C23}"/>
+            </a:ext>
+          </a:extLst>
+        </p:cNvPr>
+        <p:cNvGrpSpPr/>
+        <p:nvPr/>
+      </p:nvGrpSpPr>
+      <p:grpSpPr>
+        <a:xfrm>
+          <a:off x="0" y="0"/>
+          <a:ext cx="0" cy="0"/>
+          <a:chOff x="0" y="0"/>
+          <a:chExt cx="0" cy="0"/>
+        </a:xfrm>
+      </p:grpSpPr>
+      <p:sp>
+        <p:nvSpPr>
+          <p:cNvPr id="4" name="TextBox 3">
+            <a:extLst>
+              <a:ext uri="{FF2B5EF4-FFF2-40B4-BE49-F238E27FC236}">
+                <a16:creationId xmlns:a16="http://schemas.microsoft.com/office/drawing/2014/main" id="{E267E5AC-F898-0E5D-3C51-B5957870FC8F}"/>
+              </a:ext>
+            </a:extLst>
+          </p:cNvPr>
+          <p:cNvSpPr txBox="1"/>
+          <p:nvPr/>
+        </p:nvSpPr>
+        <p:spPr>
+          <a:xfrm>
+            <a:off x="457200" y="1371600"/>
+            <a:ext cx="11658600" cy="4401205"/>
+          </a:xfrm>
+          <a:prstGeom prst="rect">
+            <a:avLst/>
+          </a:prstGeom>
+          <a:noFill/>
+        </p:spPr>
+        <p:txBody>
+          <a:bodyPr wrap="square">
+            <a:spAutoFit/>
+          </a:bodyPr>
+          <a:lstStyle/>
+          <a:p>
+            <a:pPr algn="l"/>
+            <a:r>
+              <a:rPr lang="fr-FR" sz="4000" b="1" dirty="0" err="1">
+                <a:solidFill>
+                  <a:srgbClr val="569CD6"/>
+                </a:solidFill>
+                <a:latin typeface="+mn-lt"/>
+              </a:rPr>
+              <a:t>Bivariate</a:t>
+            </a:r>
+            <a:r>
+              <a:rPr lang="fr-FR" sz="4000" b="1" dirty="0">
+                <a:solidFill>
+                  <a:srgbClr val="569CD6"/>
+                </a:solidFill>
+                <a:latin typeface="+mn-lt"/>
+              </a:rPr>
+              <a:t> </a:t>
+            </a:r>
+            <a:r>
+              <a:rPr lang="fr-FR" sz="4000" b="1" dirty="0" err="1">
+                <a:solidFill>
+                  <a:srgbClr val="569CD6"/>
+                </a:solidFill>
+                <a:latin typeface="+mn-lt"/>
+              </a:rPr>
+              <a:t>Analysis</a:t>
+            </a:r>
+            <a:r>
+              <a:rPr lang="fr-FR" sz="4000" b="1" dirty="0">
+                <a:solidFill>
+                  <a:srgbClr val="569CD6"/>
+                </a:solidFill>
+                <a:latin typeface="+mn-lt"/>
+              </a:rPr>
+              <a:t> of Quantitative Variables</a:t>
+            </a:r>
+          </a:p>
+          <a:p>
+            <a:pPr marL="742950" indent="-742950" algn="l">
+              <a:buAutoNum type="arabicPeriod"/>
+            </a:pPr>
+            <a:r>
+              <a:rPr lang="en-US" sz="4000" b="1" dirty="0">
+                <a:solidFill>
+                  <a:schemeClr val="tx1"/>
+                </a:solidFill>
+                <a:latin typeface="+mn-lt"/>
+              </a:rPr>
+              <a:t>Annual Income range v/s Loan Status</a:t>
+            </a:r>
+          </a:p>
+          <a:p>
+            <a:pPr marL="742950" indent="-742950" algn="l">
+              <a:buAutoNum type="arabicPeriod"/>
+            </a:pPr>
+            <a:endParaRPr lang="en-US" sz="4000" b="1" dirty="0">
+              <a:solidFill>
+                <a:schemeClr val="tx1"/>
+              </a:solidFill>
+              <a:latin typeface="+mn-lt"/>
+            </a:endParaRPr>
+          </a:p>
+          <a:p>
+            <a:pPr algn="l"/>
+            <a:endParaRPr lang="en-US" sz="4000" b="1" dirty="0">
+              <a:solidFill>
+                <a:schemeClr val="tx1"/>
+              </a:solidFill>
+              <a:effectLst/>
+              <a:latin typeface="+mn-lt"/>
+            </a:endParaRPr>
+          </a:p>
+          <a:p>
+            <a:pPr marL="742950" indent="-742950" algn="l">
+              <a:buAutoNum type="arabicPeriod"/>
+            </a:pPr>
+            <a:endParaRPr lang="en-US" sz="4000" b="1" dirty="0">
+              <a:solidFill>
+                <a:schemeClr val="tx1"/>
+              </a:solidFill>
+              <a:effectLst/>
+              <a:latin typeface="+mn-lt"/>
+            </a:endParaRPr>
+          </a:p>
+          <a:p>
+            <a:pPr algn="l"/>
+            <a:endParaRPr lang="fr-FR" sz="4000" b="1" dirty="0">
+              <a:solidFill>
+                <a:srgbClr val="569CD6"/>
+              </a:solidFill>
+              <a:latin typeface="+mn-lt"/>
+            </a:endParaRPr>
+          </a:p>
+          <a:p>
+            <a:pPr algn="l"/>
+            <a:endParaRPr lang="en-IN" sz="4000" dirty="0">
+              <a:latin typeface="+mn-lt"/>
+            </a:endParaRPr>
+          </a:p>
+        </p:txBody>
+      </p:sp>
+      <p:sp>
+        <p:nvSpPr>
+          <p:cNvPr id="7" name="TextBox 6">
+            <a:extLst>
+              <a:ext uri="{FF2B5EF4-FFF2-40B4-BE49-F238E27FC236}">
+                <a16:creationId xmlns:a16="http://schemas.microsoft.com/office/drawing/2014/main" id="{1707921F-DBAD-F141-EACF-1577DAAC7DA2}"/>
+              </a:ext>
+            </a:extLst>
+          </p:cNvPr>
+          <p:cNvSpPr txBox="1"/>
+          <p:nvPr/>
+        </p:nvSpPr>
+        <p:spPr>
+          <a:xfrm>
+            <a:off x="211276" y="9180939"/>
+            <a:ext cx="11658600" cy="954107"/>
+          </a:xfrm>
+          <a:prstGeom prst="rect">
+            <a:avLst/>
+          </a:prstGeom>
+          <a:noFill/>
+        </p:spPr>
+        <p:txBody>
+          <a:bodyPr wrap="square">
+            <a:spAutoFit/>
+          </a:bodyPr>
+          <a:lstStyle/>
+          <a:p>
+            <a:pPr algn="ctr"/>
+            <a:r>
+              <a:rPr lang="en-US" sz="2800" dirty="0">
+                <a:latin typeface="+mn-lt"/>
+              </a:rPr>
+              <a:t>Those who have annual income in the range between 30K-60K have mostly paid the loan.</a:t>
+            </a:r>
+            <a:endParaRPr lang="en-IN" sz="2800" dirty="0">
+              <a:latin typeface="+mn-lt"/>
+            </a:endParaRPr>
+          </a:p>
+        </p:txBody>
+      </p:sp>
+      <p:pic>
+        <p:nvPicPr>
+          <p:cNvPr id="3" name="Picture 2">
+            <a:extLst>
+              <a:ext uri="{FF2B5EF4-FFF2-40B4-BE49-F238E27FC236}">
+                <a16:creationId xmlns:a16="http://schemas.microsoft.com/office/drawing/2014/main" id="{F8EA90BA-14A1-4135-352A-1E49AE8D5B22}"/>
+              </a:ext>
+            </a:extLst>
+          </p:cNvPr>
+          <p:cNvPicPr>
+            <a:picLocks noChangeAspect="1"/>
+          </p:cNvPicPr>
+          <p:nvPr/>
+        </p:nvPicPr>
+        <p:blipFill>
+          <a:blip r:embed="rId2"/>
+          <a:stretch>
+            <a:fillRect/>
+          </a:stretch>
+        </p:blipFill>
+        <p:spPr>
+          <a:xfrm>
+            <a:off x="337364" y="2662981"/>
+            <a:ext cx="11036330" cy="6548438"/>
+          </a:xfrm>
+          <a:prstGeom prst="rect">
+            <a:avLst/>
+          </a:prstGeom>
+        </p:spPr>
+      </p:pic>
+    </p:spTree>
+    <p:extLst>
+      <p:ext uri="{BB962C8B-B14F-4D97-AF65-F5344CB8AC3E}">
+        <p14:creationId xmlns:p14="http://schemas.microsoft.com/office/powerpoint/2010/main" val="3961926675"/>
+      </p:ext>
+    </p:extLst>
+  </p:cSld>
+  <p:clrMapOvr>
+    <a:masterClrMapping/>
+  </p:clrMapOvr>
+</p:sld>
+</file>
+
+<file path=ppt/slides/slide14.xml><?xml version="1.0" encoding="utf-8"?>
+<p:sld xmlns:a="http://schemas.openxmlformats.org/drawingml/2006/main" xmlns:r="http://schemas.openxmlformats.org/officeDocument/2006/relationships" xmlns:p="http://schemas.openxmlformats.org/presentationml/2006/main">
+  <p:cSld>
+    <p:spTree>
+      <p:nvGrpSpPr>
+        <p:cNvPr id="1" name="">
+          <a:extLst>
+            <a:ext uri="{FF2B5EF4-FFF2-40B4-BE49-F238E27FC236}">
+              <a16:creationId xmlns:a16="http://schemas.microsoft.com/office/drawing/2014/main" id="{C9D144ED-3860-B03A-D584-05D0FE079D84}"/>
+            </a:ext>
+          </a:extLst>
+        </p:cNvPr>
+        <p:cNvGrpSpPr/>
+        <p:nvPr/>
+      </p:nvGrpSpPr>
+      <p:grpSpPr>
+        <a:xfrm>
+          <a:off x="0" y="0"/>
+          <a:ext cx="0" cy="0"/>
+          <a:chOff x="0" y="0"/>
+          <a:chExt cx="0" cy="0"/>
+        </a:xfrm>
+      </p:grpSpPr>
+      <p:sp>
+        <p:nvSpPr>
+          <p:cNvPr id="4" name="TextBox 3">
+            <a:extLst>
+              <a:ext uri="{FF2B5EF4-FFF2-40B4-BE49-F238E27FC236}">
+                <a16:creationId xmlns:a16="http://schemas.microsoft.com/office/drawing/2014/main" id="{85418AEC-9BAA-56E0-DA22-7A27C4BFEB14}"/>
+              </a:ext>
+            </a:extLst>
+          </p:cNvPr>
+          <p:cNvSpPr txBox="1"/>
+          <p:nvPr/>
+        </p:nvSpPr>
+        <p:spPr>
+          <a:xfrm>
+            <a:off x="457200" y="1371600"/>
+            <a:ext cx="11658600" cy="4401205"/>
+          </a:xfrm>
+          <a:prstGeom prst="rect">
+            <a:avLst/>
+          </a:prstGeom>
+          <a:noFill/>
+        </p:spPr>
+        <p:txBody>
+          <a:bodyPr wrap="square">
+            <a:spAutoFit/>
+          </a:bodyPr>
+          <a:lstStyle/>
+          <a:p>
+            <a:pPr algn="l"/>
+            <a:r>
+              <a:rPr lang="fr-FR" sz="4000" b="1" dirty="0" err="1">
+                <a:solidFill>
+                  <a:srgbClr val="569CD6"/>
+                </a:solidFill>
+                <a:latin typeface="+mn-lt"/>
+              </a:rPr>
+              <a:t>Bivariate</a:t>
+            </a:r>
+            <a:r>
+              <a:rPr lang="fr-FR" sz="4000" b="1" dirty="0">
+                <a:solidFill>
+                  <a:srgbClr val="569CD6"/>
+                </a:solidFill>
+                <a:latin typeface="+mn-lt"/>
+              </a:rPr>
+              <a:t> </a:t>
+            </a:r>
+            <a:r>
+              <a:rPr lang="fr-FR" sz="4000" b="1" dirty="0" err="1">
+                <a:solidFill>
+                  <a:srgbClr val="569CD6"/>
+                </a:solidFill>
+                <a:latin typeface="+mn-lt"/>
+              </a:rPr>
+              <a:t>Analysis</a:t>
+            </a:r>
+            <a:r>
+              <a:rPr lang="fr-FR" sz="4000" b="1" dirty="0">
+                <a:solidFill>
+                  <a:srgbClr val="569CD6"/>
+                </a:solidFill>
+                <a:latin typeface="+mn-lt"/>
+              </a:rPr>
+              <a:t> of Quantitative Variables</a:t>
+            </a:r>
+          </a:p>
+          <a:p>
+            <a:pPr marL="742950" indent="-742950" algn="l">
+              <a:buAutoNum type="arabicPeriod"/>
+            </a:pPr>
+            <a:r>
+              <a:rPr lang="en-US" sz="4000" b="1" dirty="0">
+                <a:solidFill>
+                  <a:schemeClr val="tx1"/>
+                </a:solidFill>
+                <a:latin typeface="+mn-lt"/>
+              </a:rPr>
+              <a:t>Loan Interest Rate v/s Loan Status</a:t>
+            </a:r>
+          </a:p>
+          <a:p>
+            <a:pPr marL="742950" indent="-742950" algn="l">
+              <a:buAutoNum type="arabicPeriod"/>
+            </a:pPr>
+            <a:endParaRPr lang="en-US" sz="4000" b="1" dirty="0">
+              <a:solidFill>
+                <a:schemeClr val="tx1"/>
+              </a:solidFill>
+              <a:latin typeface="+mn-lt"/>
+            </a:endParaRPr>
+          </a:p>
+          <a:p>
+            <a:pPr algn="l"/>
+            <a:endParaRPr lang="en-US" sz="4000" b="1" dirty="0">
+              <a:solidFill>
+                <a:schemeClr val="tx1"/>
+              </a:solidFill>
+              <a:effectLst/>
+              <a:latin typeface="+mn-lt"/>
+            </a:endParaRPr>
+          </a:p>
+          <a:p>
+            <a:pPr marL="742950" indent="-742950" algn="l">
+              <a:buAutoNum type="arabicPeriod"/>
+            </a:pPr>
+            <a:endParaRPr lang="en-US" sz="4000" b="1" dirty="0">
+              <a:solidFill>
+                <a:schemeClr val="tx1"/>
+              </a:solidFill>
+              <a:effectLst/>
+              <a:latin typeface="+mn-lt"/>
+            </a:endParaRPr>
+          </a:p>
+          <a:p>
+            <a:pPr algn="l"/>
+            <a:endParaRPr lang="fr-FR" sz="4000" b="1" dirty="0">
+              <a:solidFill>
+                <a:srgbClr val="569CD6"/>
+              </a:solidFill>
+              <a:latin typeface="+mn-lt"/>
+            </a:endParaRPr>
+          </a:p>
+          <a:p>
+            <a:pPr algn="l"/>
+            <a:endParaRPr lang="en-IN" sz="4000" dirty="0">
+              <a:latin typeface="+mn-lt"/>
+            </a:endParaRPr>
+          </a:p>
+        </p:txBody>
+      </p:sp>
+      <p:sp>
+        <p:nvSpPr>
+          <p:cNvPr id="7" name="TextBox 6">
+            <a:extLst>
+              <a:ext uri="{FF2B5EF4-FFF2-40B4-BE49-F238E27FC236}">
+                <a16:creationId xmlns:a16="http://schemas.microsoft.com/office/drawing/2014/main" id="{779AED99-B3A2-677B-A77D-E3C0AB582605}"/>
+              </a:ext>
+            </a:extLst>
+          </p:cNvPr>
+          <p:cNvSpPr txBox="1"/>
+          <p:nvPr/>
+        </p:nvSpPr>
+        <p:spPr>
+          <a:xfrm>
+            <a:off x="211276" y="9180939"/>
+            <a:ext cx="11658600" cy="954107"/>
+          </a:xfrm>
+          <a:prstGeom prst="rect">
+            <a:avLst/>
+          </a:prstGeom>
+          <a:noFill/>
+        </p:spPr>
+        <p:txBody>
+          <a:bodyPr wrap="square">
+            <a:spAutoFit/>
+          </a:bodyPr>
+          <a:lstStyle/>
+          <a:p>
+            <a:pPr algn="ctr"/>
+            <a:r>
+              <a:rPr lang="en-US" sz="2800" dirty="0">
+                <a:latin typeface="+mn-lt"/>
+              </a:rPr>
+              <a:t>Most of the borrowers belong to category where Loan Interest Rate is in range of 10%-15%.</a:t>
+            </a:r>
+            <a:endParaRPr lang="en-IN" sz="2800" dirty="0">
+              <a:latin typeface="+mn-lt"/>
+            </a:endParaRPr>
+          </a:p>
+        </p:txBody>
+      </p:sp>
+      <p:pic>
+        <p:nvPicPr>
+          <p:cNvPr id="5" name="Picture 4">
+            <a:extLst>
+              <a:ext uri="{FF2B5EF4-FFF2-40B4-BE49-F238E27FC236}">
+                <a16:creationId xmlns:a16="http://schemas.microsoft.com/office/drawing/2014/main" id="{8BFD6133-AE63-AA17-CAFF-4B95A92B544B}"/>
+              </a:ext>
+            </a:extLst>
+          </p:cNvPr>
+          <p:cNvPicPr>
+            <a:picLocks noChangeAspect="1"/>
+          </p:cNvPicPr>
+          <p:nvPr/>
+        </p:nvPicPr>
+        <p:blipFill>
+          <a:blip r:embed="rId3"/>
+          <a:stretch>
+            <a:fillRect/>
+          </a:stretch>
+        </p:blipFill>
+        <p:spPr>
+          <a:xfrm>
+            <a:off x="211276" y="2667000"/>
+            <a:ext cx="11378933" cy="6662738"/>
+          </a:xfrm>
+          <a:prstGeom prst="rect">
+            <a:avLst/>
+          </a:prstGeom>
+        </p:spPr>
+      </p:pic>
+    </p:spTree>
+    <p:extLst>
+      <p:ext uri="{BB962C8B-B14F-4D97-AF65-F5344CB8AC3E}">
+        <p14:creationId xmlns:p14="http://schemas.microsoft.com/office/powerpoint/2010/main" val="2689279035"/>
+      </p:ext>
+    </p:extLst>
+  </p:cSld>
+  <p:clrMapOvr>
+    <a:masterClrMapping/>
+  </p:clrMapOvr>
+</p:sld>
+</file>
+
+<file path=ppt/slides/slide15.xml><?xml version="1.0" encoding="utf-8"?>
+<p:sld xmlns:a="http://schemas.openxmlformats.org/drawingml/2006/main" xmlns:r="http://schemas.openxmlformats.org/officeDocument/2006/relationships" xmlns:p="http://schemas.openxmlformats.org/presentationml/2006/main">
+  <p:cSld>
+    <p:spTree>
+      <p:nvGrpSpPr>
+        <p:cNvPr id="1" name="">
+          <a:extLst>
+            <a:ext uri="{FF2B5EF4-FFF2-40B4-BE49-F238E27FC236}">
+              <a16:creationId xmlns:a16="http://schemas.microsoft.com/office/drawing/2014/main" id="{2DADA276-681C-CAD4-A1C9-8BA8A96289B7}"/>
+            </a:ext>
+          </a:extLst>
+        </p:cNvPr>
+        <p:cNvGrpSpPr/>
+        <p:nvPr/>
+      </p:nvGrpSpPr>
+      <p:grpSpPr>
+        <a:xfrm>
+          <a:off x="0" y="0"/>
+          <a:ext cx="0" cy="0"/>
+          <a:chOff x="0" y="0"/>
+          <a:chExt cx="0" cy="0"/>
+        </a:xfrm>
+      </p:grpSpPr>
+      <p:sp>
+        <p:nvSpPr>
+          <p:cNvPr id="4" name="TextBox 3">
+            <a:extLst>
+              <a:ext uri="{FF2B5EF4-FFF2-40B4-BE49-F238E27FC236}">
+                <a16:creationId xmlns:a16="http://schemas.microsoft.com/office/drawing/2014/main" id="{599F3F05-CA1B-0B46-764E-419FC9097037}"/>
+              </a:ext>
+            </a:extLst>
+          </p:cNvPr>
+          <p:cNvSpPr txBox="1"/>
+          <p:nvPr/>
+        </p:nvSpPr>
+        <p:spPr>
+          <a:xfrm>
+            <a:off x="457200" y="1371600"/>
+            <a:ext cx="11658600" cy="9941183"/>
+          </a:xfrm>
+          <a:prstGeom prst="rect">
+            <a:avLst/>
+          </a:prstGeom>
+          <a:noFill/>
+        </p:spPr>
+        <p:txBody>
+          <a:bodyPr wrap="square">
+            <a:spAutoFit/>
+          </a:bodyPr>
+          <a:lstStyle/>
+          <a:p>
+            <a:pPr algn="l"/>
+            <a:r>
+              <a:rPr lang="en-US" sz="4800" b="1" dirty="0">
+                <a:solidFill>
+                  <a:srgbClr val="569CD6"/>
+                </a:solidFill>
+                <a:latin typeface="+mn-lt"/>
+              </a:rPr>
+              <a:t>Summary of Bivariate Analysis </a:t>
+            </a:r>
+          </a:p>
+          <a:p>
+            <a:pPr algn="l"/>
+            <a:endParaRPr lang="en-US" sz="2400" b="1" dirty="0">
+              <a:solidFill>
+                <a:schemeClr val="tx1"/>
+              </a:solidFill>
+              <a:latin typeface="+mn-lt"/>
+            </a:endParaRPr>
+          </a:p>
+          <a:p>
+            <a:pPr algn="l"/>
+            <a:r>
+              <a:rPr lang="en-US" sz="2400" b="1" dirty="0">
+                <a:solidFill>
+                  <a:schemeClr val="tx1"/>
+                </a:solidFill>
+                <a:latin typeface="+mn-lt"/>
+              </a:rPr>
+              <a:t>1. Q4 is the most preferred quarter for taking loans.</a:t>
+            </a:r>
+          </a:p>
+          <a:p>
+            <a:pPr algn="l"/>
+            <a:endParaRPr lang="en-US" sz="2400" b="1" dirty="0">
+              <a:solidFill>
+                <a:schemeClr val="tx1"/>
+              </a:solidFill>
+              <a:latin typeface="+mn-lt"/>
+            </a:endParaRPr>
+          </a:p>
+          <a:p>
+            <a:pPr algn="l"/>
+            <a:r>
+              <a:rPr lang="en-US" sz="2400" b="1" dirty="0">
+                <a:solidFill>
+                  <a:schemeClr val="tx1"/>
+                </a:solidFill>
+                <a:latin typeface="+mn-lt"/>
+              </a:rPr>
+              <a:t>2. Loan applicants those applying it for 60 months are likely to default more than the those for 36 months.</a:t>
+            </a:r>
+          </a:p>
+          <a:p>
+            <a:pPr algn="l"/>
+            <a:endParaRPr lang="en-US" sz="2400" b="1" dirty="0">
+              <a:solidFill>
+                <a:schemeClr val="tx1"/>
+              </a:solidFill>
+              <a:latin typeface="+mn-lt"/>
+            </a:endParaRPr>
+          </a:p>
+          <a:p>
+            <a:pPr algn="l"/>
+            <a:r>
+              <a:rPr lang="en-US" sz="2400" b="1" dirty="0">
+                <a:solidFill>
+                  <a:schemeClr val="tx1"/>
+                </a:solidFill>
+                <a:latin typeface="+mn-lt"/>
+              </a:rPr>
+              <a:t>3. Most number of loan applicants have 10+yrs of Work experience, they are most likely to default as well.</a:t>
+            </a:r>
+          </a:p>
+          <a:p>
+            <a:pPr algn="l"/>
+            <a:endParaRPr lang="en-US" sz="2400" b="1" dirty="0">
+              <a:solidFill>
+                <a:schemeClr val="tx1"/>
+              </a:solidFill>
+              <a:latin typeface="+mn-lt"/>
+            </a:endParaRPr>
+          </a:p>
+          <a:p>
+            <a:pPr algn="l"/>
+            <a:r>
+              <a:rPr lang="en-US" sz="2400" b="1" dirty="0">
+                <a:solidFill>
+                  <a:schemeClr val="tx1"/>
+                </a:solidFill>
+                <a:latin typeface="+mn-lt"/>
+              </a:rPr>
+              <a:t>4. Maximum loans are issued against Debt consolidation category and at the same time most people have defaulted in this category.</a:t>
+            </a:r>
+          </a:p>
+          <a:p>
+            <a:pPr algn="l"/>
+            <a:endParaRPr lang="en-US" sz="2400" b="1" dirty="0">
+              <a:solidFill>
+                <a:schemeClr val="tx1"/>
+              </a:solidFill>
+              <a:latin typeface="+mn-lt"/>
+            </a:endParaRPr>
+          </a:p>
+          <a:p>
+            <a:pPr algn="l"/>
+            <a:r>
+              <a:rPr lang="en-US" sz="2400" b="1" dirty="0">
+                <a:solidFill>
+                  <a:schemeClr val="tx1"/>
+                </a:solidFill>
+                <a:latin typeface="+mn-lt"/>
+              </a:rPr>
+              <a:t>5. The applicants who stay in a rented or mortgaged house are more likely to default</a:t>
+            </a:r>
+          </a:p>
+          <a:p>
+            <a:pPr algn="l"/>
+            <a:endParaRPr lang="en-US" sz="2400" b="1" dirty="0">
+              <a:solidFill>
+                <a:schemeClr val="tx1"/>
+              </a:solidFill>
+              <a:latin typeface="+mn-lt"/>
+            </a:endParaRPr>
+          </a:p>
+          <a:p>
+            <a:pPr algn="l"/>
+            <a:r>
+              <a:rPr lang="en-US" sz="2400" b="1" dirty="0">
+                <a:solidFill>
+                  <a:schemeClr val="tx1"/>
+                </a:solidFill>
+                <a:latin typeface="+mn-lt"/>
+              </a:rPr>
+              <a:t>6. Those who have annual </a:t>
+            </a:r>
+            <a:r>
+              <a:rPr lang="en-US" sz="2400" b="1" dirty="0" err="1">
+                <a:solidFill>
+                  <a:schemeClr val="tx1"/>
+                </a:solidFill>
+                <a:latin typeface="+mn-lt"/>
+              </a:rPr>
+              <a:t>icome</a:t>
+            </a:r>
+            <a:r>
+              <a:rPr lang="en-US" sz="2400" b="1" dirty="0">
+                <a:solidFill>
+                  <a:schemeClr val="tx1"/>
+                </a:solidFill>
+                <a:latin typeface="+mn-lt"/>
+              </a:rPr>
+              <a:t> in the range between 30K-60K have mostly paid the loan.</a:t>
+            </a:r>
+          </a:p>
+          <a:p>
+            <a:pPr algn="l"/>
+            <a:endParaRPr lang="en-US" sz="2400" b="1" dirty="0">
+              <a:solidFill>
+                <a:schemeClr val="tx1"/>
+              </a:solidFill>
+              <a:latin typeface="+mn-lt"/>
+            </a:endParaRPr>
+          </a:p>
+          <a:p>
+            <a:pPr algn="l"/>
+            <a:r>
+              <a:rPr lang="en-US" sz="2400" b="1" dirty="0">
+                <a:solidFill>
+                  <a:schemeClr val="tx1"/>
+                </a:solidFill>
+                <a:latin typeface="+mn-lt"/>
+              </a:rPr>
+              <a:t>7. Most of the borrowers belong to category where Loan Interest Rate is in range of 10%-15%.</a:t>
+            </a:r>
+          </a:p>
+          <a:p>
+            <a:pPr algn="l"/>
+            <a:endParaRPr lang="en-US" sz="4000" b="1" dirty="0">
+              <a:solidFill>
+                <a:schemeClr val="tx1"/>
+              </a:solidFill>
+              <a:effectLst/>
+              <a:latin typeface="+mn-lt"/>
+            </a:endParaRPr>
+          </a:p>
+          <a:p>
+            <a:pPr marL="742950" indent="-742950" algn="l">
+              <a:buAutoNum type="arabicPeriod"/>
+            </a:pPr>
+            <a:endParaRPr lang="en-US" sz="4000" b="1" dirty="0">
+              <a:solidFill>
+                <a:schemeClr val="tx1"/>
+              </a:solidFill>
+              <a:effectLst/>
+              <a:latin typeface="+mn-lt"/>
+            </a:endParaRPr>
+          </a:p>
+          <a:p>
+            <a:pPr algn="l"/>
+            <a:endParaRPr lang="fr-FR" sz="4000" b="1" dirty="0">
+              <a:solidFill>
+                <a:srgbClr val="569CD6"/>
+              </a:solidFill>
+              <a:latin typeface="+mn-lt"/>
+            </a:endParaRPr>
+          </a:p>
+          <a:p>
+            <a:pPr algn="l"/>
+            <a:endParaRPr lang="en-IN" sz="4000" dirty="0">
+              <a:latin typeface="+mn-lt"/>
+            </a:endParaRPr>
+          </a:p>
+        </p:txBody>
+      </p:sp>
+    </p:spTree>
+    <p:extLst>
+      <p:ext uri="{BB962C8B-B14F-4D97-AF65-F5344CB8AC3E}">
+        <p14:creationId xmlns:p14="http://schemas.microsoft.com/office/powerpoint/2010/main" val="924821202"/>
+      </p:ext>
+    </p:extLst>
+  </p:cSld>
+  <p:clrMapOvr>
+    <a:masterClrMapping/>
+  </p:clrMapOvr>
+</p:sld>
+</file>
+
+<file path=ppt/slides/slide16.xml><?xml version="1.0" encoding="utf-8"?>
+<p:sld xmlns:a="http://schemas.openxmlformats.org/drawingml/2006/main" xmlns:r="http://schemas.openxmlformats.org/officeDocument/2006/relationships" xmlns:p="http://schemas.openxmlformats.org/presentationml/2006/main">
+  <p:cSld>
+    <p:spTree>
+      <p:nvGrpSpPr>
+        <p:cNvPr id="1" name="">
+          <a:extLst>
+            <a:ext uri="{FF2B5EF4-FFF2-40B4-BE49-F238E27FC236}">
+              <a16:creationId xmlns:a16="http://schemas.microsoft.com/office/drawing/2014/main" id="{7D832879-E0BB-2899-9DEB-04E49DCF6872}"/>
+            </a:ext>
+          </a:extLst>
+        </p:cNvPr>
+        <p:cNvGrpSpPr/>
+        <p:nvPr/>
+      </p:nvGrpSpPr>
+      <p:grpSpPr>
+        <a:xfrm>
+          <a:off x="0" y="0"/>
+          <a:ext cx="0" cy="0"/>
+          <a:chOff x="0" y="0"/>
+          <a:chExt cx="0" cy="0"/>
+        </a:xfrm>
+      </p:grpSpPr>
+      <p:sp>
+        <p:nvSpPr>
+          <p:cNvPr id="4" name="TextBox 3">
+            <a:extLst>
+              <a:ext uri="{FF2B5EF4-FFF2-40B4-BE49-F238E27FC236}">
+                <a16:creationId xmlns:a16="http://schemas.microsoft.com/office/drawing/2014/main" id="{2D740F58-BBA9-041B-0BB8-00E31AF892C5}"/>
+              </a:ext>
+            </a:extLst>
+          </p:cNvPr>
+          <p:cNvSpPr txBox="1"/>
+          <p:nvPr/>
+        </p:nvSpPr>
+        <p:spPr>
+          <a:xfrm>
+            <a:off x="457200" y="1371600"/>
+            <a:ext cx="11658600" cy="9448740"/>
+          </a:xfrm>
+          <a:prstGeom prst="rect">
+            <a:avLst/>
+          </a:prstGeom>
+          <a:noFill/>
+        </p:spPr>
+        <p:txBody>
+          <a:bodyPr wrap="square">
+            <a:spAutoFit/>
+          </a:bodyPr>
+          <a:lstStyle/>
+          <a:p>
+            <a:pPr algn="l"/>
+            <a:r>
+              <a:rPr lang="en-US" sz="4800" b="1" dirty="0">
+                <a:solidFill>
+                  <a:srgbClr val="569CD6"/>
+                </a:solidFill>
+                <a:latin typeface="+mn-lt"/>
+              </a:rPr>
+              <a:t>Conclusion of Bivariate Analysis</a:t>
+            </a:r>
+          </a:p>
+          <a:p>
+            <a:pPr algn="l"/>
+            <a:r>
+              <a:rPr lang="en-US" sz="2000" b="1" dirty="0">
+                <a:solidFill>
+                  <a:schemeClr val="tx1"/>
+                </a:solidFill>
+                <a:latin typeface="+mn-lt"/>
+              </a:rPr>
+              <a:t>1. Seasonal Trends: </a:t>
+            </a:r>
+            <a:r>
+              <a:rPr lang="en-US" sz="2000" dirty="0">
+                <a:solidFill>
+                  <a:schemeClr val="tx1"/>
+                </a:solidFill>
+                <a:latin typeface="+mn-lt"/>
+              </a:rPr>
+              <a:t>December and Q4 are peak periods for loan applications, likely due to the holiday season. The company should anticipate increased demand during these periods and ensure efficient processing to meet customer needs.</a:t>
+            </a:r>
+          </a:p>
+          <a:p>
+            <a:pPr algn="l"/>
+            <a:endParaRPr lang="en-US" sz="2000" b="1" dirty="0">
+              <a:solidFill>
+                <a:schemeClr val="tx1"/>
+              </a:solidFill>
+              <a:latin typeface="+mn-lt"/>
+            </a:endParaRPr>
+          </a:p>
+          <a:p>
+            <a:pPr algn="l"/>
+            <a:r>
+              <a:rPr lang="en-US" sz="2000" b="1" dirty="0">
+                <a:solidFill>
+                  <a:schemeClr val="tx1"/>
+                </a:solidFill>
+                <a:latin typeface="+mn-lt"/>
+              </a:rPr>
+              <a:t>2. Term Length: </a:t>
+            </a:r>
+            <a:r>
+              <a:rPr lang="en-US" sz="2000" dirty="0">
+                <a:solidFill>
+                  <a:schemeClr val="tx1"/>
+                </a:solidFill>
+                <a:latin typeface="+mn-lt"/>
+              </a:rPr>
+              <a:t>Given that applicants opting for 60-month loans are more likely to default, the company should consider evaluating the risk associated with longer-term loans and potentially limiting the maximum term or adjusting interest rates accordingly.</a:t>
+            </a:r>
+          </a:p>
+          <a:p>
+            <a:pPr algn="l"/>
+            <a:endParaRPr lang="en-US" sz="2000" b="1" dirty="0">
+              <a:solidFill>
+                <a:schemeClr val="tx1"/>
+              </a:solidFill>
+              <a:latin typeface="+mn-lt"/>
+            </a:endParaRPr>
+          </a:p>
+          <a:p>
+            <a:pPr algn="l"/>
+            <a:r>
+              <a:rPr lang="en-US" sz="2000" b="1" dirty="0">
+                <a:solidFill>
+                  <a:schemeClr val="tx1"/>
+                </a:solidFill>
+                <a:latin typeface="+mn-lt"/>
+              </a:rPr>
+              <a:t>3. Experience and Default Probability: </a:t>
+            </a:r>
+            <a:r>
+              <a:rPr lang="en-US" sz="2000" dirty="0">
+                <a:solidFill>
+                  <a:schemeClr val="tx1"/>
+                </a:solidFill>
+                <a:latin typeface="+mn-lt"/>
+              </a:rPr>
+              <a:t>Loan applicants with ten or more years of experience are more likely to default. This suggests that experience alone may not be a reliable indicator of creditworthiness. The company should use a more comprehensive credit scoring system that factors in other risk-related attributes.</a:t>
+            </a:r>
+          </a:p>
+          <a:p>
+            <a:pPr algn="l"/>
+            <a:endParaRPr lang="en-US" sz="2000" b="1" dirty="0">
+              <a:solidFill>
+                <a:schemeClr val="tx1"/>
+              </a:solidFill>
+              <a:latin typeface="+mn-lt"/>
+            </a:endParaRPr>
+          </a:p>
+          <a:p>
+            <a:pPr algn="l"/>
+            <a:r>
+              <a:rPr lang="en-US" sz="2000" b="1" dirty="0">
+                <a:solidFill>
+                  <a:schemeClr val="tx1"/>
+                </a:solidFill>
+                <a:latin typeface="+mn-lt"/>
+              </a:rPr>
+              <a:t>4. Debt Consolidation Risk: </a:t>
+            </a:r>
+            <a:r>
+              <a:rPr lang="en-US" sz="2000" dirty="0">
+                <a:solidFill>
+                  <a:schemeClr val="tx1"/>
+                </a:solidFill>
+                <a:latin typeface="+mn-lt"/>
+              </a:rPr>
+              <a:t>Since debt consolidation is the category with the maximum number of loans and high default rates, the company should carefully evaluate applicants seeking debt consolidation loans and potentially adjust interest rates or offer financial counseling services.</a:t>
+            </a:r>
+          </a:p>
+          <a:p>
+            <a:pPr algn="l"/>
+            <a:endParaRPr lang="en-US" sz="2000" b="1" dirty="0">
+              <a:solidFill>
+                <a:schemeClr val="tx1"/>
+              </a:solidFill>
+              <a:latin typeface="+mn-lt"/>
+            </a:endParaRPr>
+          </a:p>
+          <a:p>
+            <a:pPr algn="l"/>
+            <a:r>
+              <a:rPr lang="en-US" sz="2000" b="1" dirty="0">
+                <a:solidFill>
+                  <a:schemeClr val="tx1"/>
+                </a:solidFill>
+                <a:latin typeface="+mn-lt"/>
+              </a:rPr>
+              <a:t>5. Housing Status and Default Risk:</a:t>
+            </a:r>
+            <a:r>
+              <a:rPr lang="en-US" sz="2000" dirty="0">
+                <a:solidFill>
+                  <a:schemeClr val="tx1"/>
+                </a:solidFill>
+                <a:latin typeface="+mn-lt"/>
+              </a:rPr>
+              <a:t> Applicants living in rented or mortgaged houses are more likely to default. This information can be considered in the underwriting process to assess housing stability and its impact on repayment ability.</a:t>
+            </a:r>
+          </a:p>
+          <a:p>
+            <a:pPr algn="l"/>
+            <a:endParaRPr lang="en-US" sz="2000" b="1" dirty="0">
+              <a:solidFill>
+                <a:schemeClr val="tx1"/>
+              </a:solidFill>
+              <a:latin typeface="+mn-lt"/>
+            </a:endParaRPr>
+          </a:p>
+          <a:p>
+            <a:pPr algn="l"/>
+            <a:r>
+              <a:rPr lang="en-US" sz="2000" b="1" dirty="0">
+                <a:solidFill>
+                  <a:schemeClr val="tx1"/>
+                </a:solidFill>
+                <a:latin typeface="+mn-lt"/>
+              </a:rPr>
+              <a:t>6. Low Annual Income: </a:t>
+            </a:r>
+            <a:r>
+              <a:rPr lang="en-US" sz="2000" dirty="0">
+                <a:solidFill>
+                  <a:schemeClr val="tx1"/>
+                </a:solidFill>
+                <a:latin typeface="+mn-lt"/>
+              </a:rPr>
+              <a:t>Applicants with annual incomes less than $40,000 have a higher likelihood of defaulting. The company should consider offering financial education resources or setting maximum loan amounts based on income levels to ensure affordability for borrowers.</a:t>
+            </a:r>
+            <a:endParaRPr lang="en-US" sz="2000" dirty="0">
+              <a:solidFill>
+                <a:schemeClr val="tx1"/>
+              </a:solidFill>
+              <a:effectLst/>
+              <a:latin typeface="+mn-lt"/>
+            </a:endParaRPr>
+          </a:p>
+          <a:p>
+            <a:pPr algn="l"/>
+            <a:endParaRPr lang="fr-FR" sz="4000" b="1" dirty="0">
+              <a:solidFill>
+                <a:srgbClr val="569CD6"/>
+              </a:solidFill>
+              <a:latin typeface="+mn-lt"/>
+            </a:endParaRPr>
+          </a:p>
+          <a:p>
+            <a:pPr algn="l"/>
+            <a:endParaRPr lang="en-IN" sz="4000" dirty="0">
+              <a:latin typeface="+mn-lt"/>
+            </a:endParaRPr>
+          </a:p>
+        </p:txBody>
+      </p:sp>
+    </p:spTree>
+    <p:extLst>
+      <p:ext uri="{BB962C8B-B14F-4D97-AF65-F5344CB8AC3E}">
+        <p14:creationId xmlns:p14="http://schemas.microsoft.com/office/powerpoint/2010/main" val="2172186496"/>
+      </p:ext>
+    </p:extLst>
+  </p:cSld>
+  <p:clrMapOvr>
+    <a:masterClrMapping/>
+  </p:clrMapOvr>
+</p:sld>
+</file>
+
+<file path=ppt/slides/slide17.xml><?xml version="1.0" encoding="utf-8"?>
+<p:sld xmlns:a="http://schemas.openxmlformats.org/drawingml/2006/main" xmlns:r="http://schemas.openxmlformats.org/officeDocument/2006/relationships" xmlns:p="http://schemas.openxmlformats.org/presentationml/2006/main">
+  <p:cSld>
+    <p:spTree>
+      <p:nvGrpSpPr>
+        <p:cNvPr id="1" name=""/>
+        <p:cNvGrpSpPr/>
+        <p:nvPr/>
+      </p:nvGrpSpPr>
+      <p:grpSpPr>
+        <a:xfrm>
+          <a:off x="0" y="0"/>
+          <a:ext cx="0" cy="0"/>
+          <a:chOff x="0" y="0"/>
+          <a:chExt cx="0" cy="0"/>
+        </a:xfrm>
+      </p:grpSpPr>
+      <p:sp>
+        <p:nvSpPr>
+          <p:cNvPr id="5" name="TextBox 4">
+            <a:extLst>
+              <a:ext uri="{FF2B5EF4-FFF2-40B4-BE49-F238E27FC236}">
+                <a16:creationId xmlns:a16="http://schemas.microsoft.com/office/drawing/2014/main" id="{B107232F-8C17-85F6-089F-57CC67D9AAA6}"/>
+              </a:ext>
+            </a:extLst>
+          </p:cNvPr>
+          <p:cNvSpPr txBox="1"/>
+          <p:nvPr/>
+        </p:nvSpPr>
+        <p:spPr>
+          <a:xfrm>
+            <a:off x="381000" y="1143000"/>
+            <a:ext cx="11353800" cy="4401205"/>
+          </a:xfrm>
+          <a:prstGeom prst="rect">
+            <a:avLst/>
+          </a:prstGeom>
+          <a:noFill/>
+        </p:spPr>
+        <p:txBody>
+          <a:bodyPr wrap="square">
+            <a:spAutoFit/>
+          </a:bodyPr>
+          <a:lstStyle/>
+          <a:p>
+            <a:pPr algn="l"/>
+            <a:r>
+              <a:rPr lang="en-US" sz="4000" b="1" dirty="0">
+                <a:solidFill>
+                  <a:srgbClr val="569CD6"/>
+                </a:solidFill>
+                <a:effectLst/>
+                <a:latin typeface="+mn-lt"/>
+                <a:ea typeface="Calibri" panose="020F0502020204030204" pitchFamily="34" charset="0"/>
+                <a:cs typeface="Calibri" panose="020F0502020204030204" pitchFamily="34" charset="0"/>
+              </a:rPr>
+              <a:t>Multivariate Analysis</a:t>
+            </a:r>
+          </a:p>
+          <a:p>
+            <a:pPr algn="l"/>
+            <a:r>
+              <a:rPr lang="en-US" sz="4000" b="1" dirty="0">
+                <a:solidFill>
+                  <a:schemeClr val="tx1"/>
+                </a:solidFill>
+                <a:effectLst/>
+                <a:latin typeface="+mn-lt"/>
+              </a:rPr>
+              <a:t>Multivariate analysis for below listed columns against loan status and the charged off percentage.</a:t>
+            </a:r>
+            <a:endParaRPr lang="fr-FR" sz="4000" b="1" dirty="0">
+              <a:solidFill>
+                <a:schemeClr val="tx1"/>
+              </a:solidFill>
+              <a:effectLst/>
+              <a:latin typeface="+mn-lt"/>
+            </a:endParaRPr>
+          </a:p>
+          <a:p>
+            <a:pPr algn="l"/>
+            <a:r>
+              <a:rPr lang="en-US" sz="4000" b="1" dirty="0">
+                <a:solidFill>
+                  <a:schemeClr val="tx1"/>
+                </a:solidFill>
+                <a:effectLst/>
+                <a:latin typeface="+mn-lt"/>
+              </a:rPr>
+              <a:t>1. Employment Tenure</a:t>
+            </a:r>
+          </a:p>
+          <a:p>
+            <a:pPr algn="l"/>
+            <a:r>
+              <a:rPr lang="en-US" sz="4000" b="1" dirty="0">
+                <a:solidFill>
+                  <a:schemeClr val="tx1"/>
+                </a:solidFill>
+                <a:effectLst/>
+                <a:latin typeface="+mn-lt"/>
+              </a:rPr>
+              <a:t>2. Loan Purpose</a:t>
+            </a:r>
+          </a:p>
+          <a:p>
+            <a:pPr algn="l"/>
+            <a:r>
+              <a:rPr lang="en-US" sz="4000" b="1" dirty="0">
+                <a:solidFill>
+                  <a:schemeClr val="tx1"/>
+                </a:solidFill>
+                <a:latin typeface="+mn-lt"/>
+              </a:rPr>
+              <a:t>3. Home Ownership Status</a:t>
+            </a:r>
+          </a:p>
+          <a:p>
+            <a:pPr algn="l"/>
+            <a:r>
+              <a:rPr lang="en-US" sz="4000" b="1" dirty="0">
+                <a:solidFill>
+                  <a:schemeClr val="tx1"/>
+                </a:solidFill>
+                <a:effectLst/>
+                <a:latin typeface="+mn-lt"/>
+              </a:rPr>
+              <a:t>4. Annual Income Range </a:t>
+            </a:r>
+          </a:p>
+        </p:txBody>
+      </p:sp>
+    </p:spTree>
+    <p:extLst>
+      <p:ext uri="{BB962C8B-B14F-4D97-AF65-F5344CB8AC3E}">
+        <p14:creationId xmlns:p14="http://schemas.microsoft.com/office/powerpoint/2010/main" val="4059648216"/>
+      </p:ext>
+    </p:extLst>
+  </p:cSld>
+  <p:clrMapOvr>
+    <a:masterClrMapping/>
+  </p:clrMapOvr>
+</p:sld>
+</file>
+
+<file path=ppt/slides/slide18.xml><?xml version="1.0" encoding="utf-8"?>
+<p:sld xmlns:a="http://schemas.openxmlformats.org/drawingml/2006/main" xmlns:r="http://schemas.openxmlformats.org/officeDocument/2006/relationships" xmlns:p="http://schemas.openxmlformats.org/presentationml/2006/main">
+  <p:cSld>
+    <p:spTree>
+      <p:nvGrpSpPr>
+        <p:cNvPr id="1" name="">
+          <a:extLst>
+            <a:ext uri="{FF2B5EF4-FFF2-40B4-BE49-F238E27FC236}">
+              <a16:creationId xmlns:a16="http://schemas.microsoft.com/office/drawing/2014/main" id="{1F1E4B43-A715-70F3-2EBC-E106FFC93EAB}"/>
+            </a:ext>
+          </a:extLst>
+        </p:cNvPr>
+        <p:cNvGrpSpPr/>
+        <p:nvPr/>
+      </p:nvGrpSpPr>
+      <p:grpSpPr>
+        <a:xfrm>
+          <a:off x="0" y="0"/>
+          <a:ext cx="0" cy="0"/>
+          <a:chOff x="0" y="0"/>
+          <a:chExt cx="0" cy="0"/>
+        </a:xfrm>
+      </p:grpSpPr>
+      <p:sp>
+        <p:nvSpPr>
+          <p:cNvPr id="5" name="TextBox 4">
+            <a:extLst>
+              <a:ext uri="{FF2B5EF4-FFF2-40B4-BE49-F238E27FC236}">
+                <a16:creationId xmlns:a16="http://schemas.microsoft.com/office/drawing/2014/main" id="{489F0084-F729-F2D6-EB87-79E4E5B0563F}"/>
+              </a:ext>
+            </a:extLst>
+          </p:cNvPr>
+          <p:cNvSpPr txBox="1"/>
+          <p:nvPr/>
+        </p:nvSpPr>
+        <p:spPr>
+          <a:xfrm>
+            <a:off x="381000" y="1143000"/>
+            <a:ext cx="11353800" cy="2554545"/>
+          </a:xfrm>
+          <a:prstGeom prst="rect">
+            <a:avLst/>
+          </a:prstGeom>
+          <a:noFill/>
+        </p:spPr>
+        <p:txBody>
+          <a:bodyPr wrap="square">
+            <a:spAutoFit/>
+          </a:bodyPr>
+          <a:lstStyle/>
+          <a:p>
+            <a:pPr algn="l"/>
+            <a:r>
+              <a:rPr lang="en-US" sz="4000" b="1" dirty="0">
+                <a:solidFill>
+                  <a:srgbClr val="569CD6"/>
+                </a:solidFill>
+                <a:effectLst/>
+                <a:latin typeface="+mn-lt"/>
+                <a:ea typeface="Calibri" panose="020F0502020204030204" pitchFamily="34" charset="0"/>
+                <a:cs typeface="Calibri" panose="020F0502020204030204" pitchFamily="34" charset="0"/>
+              </a:rPr>
+              <a:t>Multivariate Analysis</a:t>
+            </a:r>
+          </a:p>
+          <a:p>
+            <a:pPr algn="l"/>
+            <a:r>
+              <a:rPr lang="en-US" sz="4000" b="1" dirty="0">
+                <a:solidFill>
+                  <a:schemeClr val="tx1"/>
+                </a:solidFill>
+                <a:effectLst/>
+                <a:latin typeface="+mn-lt"/>
+              </a:rPr>
+              <a:t>Multivariate analysis of Employment Tenure against loan status and the charged off percentage.</a:t>
+            </a:r>
+            <a:endParaRPr lang="fr-FR" sz="4000" b="1" dirty="0">
+              <a:solidFill>
+                <a:schemeClr val="tx1"/>
+              </a:solidFill>
+              <a:effectLst/>
+              <a:latin typeface="+mn-lt"/>
+            </a:endParaRPr>
+          </a:p>
+          <a:p>
+            <a:pPr algn="l"/>
+            <a:endParaRPr lang="en-US" sz="4000" b="1" dirty="0">
+              <a:solidFill>
+                <a:schemeClr val="tx1"/>
+              </a:solidFill>
+              <a:effectLst/>
+              <a:latin typeface="+mn-lt"/>
+            </a:endParaRPr>
+          </a:p>
+        </p:txBody>
+      </p:sp>
+      <p:pic>
+        <p:nvPicPr>
+          <p:cNvPr id="3" name="Picture 2">
+            <a:extLst>
+              <a:ext uri="{FF2B5EF4-FFF2-40B4-BE49-F238E27FC236}">
+                <a16:creationId xmlns:a16="http://schemas.microsoft.com/office/drawing/2014/main" id="{B06C55B2-3E35-2772-6838-4C10420BBA9A}"/>
+              </a:ext>
+            </a:extLst>
+          </p:cNvPr>
+          <p:cNvPicPr>
+            <a:picLocks noChangeAspect="1"/>
+          </p:cNvPicPr>
+          <p:nvPr/>
+        </p:nvPicPr>
+        <p:blipFill>
+          <a:blip r:embed="rId2"/>
+          <a:stretch>
+            <a:fillRect/>
+          </a:stretch>
+        </p:blipFill>
+        <p:spPr>
+          <a:xfrm>
+            <a:off x="15240" y="3651825"/>
+            <a:ext cx="12192000" cy="5109988"/>
+          </a:xfrm>
+          <a:prstGeom prst="rect">
+            <a:avLst/>
+          </a:prstGeom>
+        </p:spPr>
+      </p:pic>
+    </p:spTree>
+    <p:extLst>
+      <p:ext uri="{BB962C8B-B14F-4D97-AF65-F5344CB8AC3E}">
+        <p14:creationId xmlns:p14="http://schemas.microsoft.com/office/powerpoint/2010/main" val="1315280703"/>
+      </p:ext>
+    </p:extLst>
+  </p:cSld>
+  <p:clrMapOvr>
+    <a:masterClrMapping/>
+  </p:clrMapOvr>
+</p:sld>
+</file>
+
+<file path=ppt/slides/slide19.xml><?xml version="1.0" encoding="utf-8"?>
+<p:sld xmlns:a="http://schemas.openxmlformats.org/drawingml/2006/main" xmlns:r="http://schemas.openxmlformats.org/officeDocument/2006/relationships" xmlns:p="http://schemas.openxmlformats.org/presentationml/2006/main">
+  <p:cSld>
+    <p:spTree>
+      <p:nvGrpSpPr>
+        <p:cNvPr id="1" name="">
+          <a:extLst>
+            <a:ext uri="{FF2B5EF4-FFF2-40B4-BE49-F238E27FC236}">
+              <a16:creationId xmlns:a16="http://schemas.microsoft.com/office/drawing/2014/main" id="{0141FCB0-A79E-C70E-BBA8-0FD27257FDE7}"/>
+            </a:ext>
+          </a:extLst>
+        </p:cNvPr>
+        <p:cNvGrpSpPr/>
+        <p:nvPr/>
+      </p:nvGrpSpPr>
+      <p:grpSpPr>
+        <a:xfrm>
+          <a:off x="0" y="0"/>
+          <a:ext cx="0" cy="0"/>
+          <a:chOff x="0" y="0"/>
+          <a:chExt cx="0" cy="0"/>
+        </a:xfrm>
+      </p:grpSpPr>
+      <p:sp>
+        <p:nvSpPr>
+          <p:cNvPr id="5" name="TextBox 4">
+            <a:extLst>
+              <a:ext uri="{FF2B5EF4-FFF2-40B4-BE49-F238E27FC236}">
+                <a16:creationId xmlns:a16="http://schemas.microsoft.com/office/drawing/2014/main" id="{C183B0BC-BE1C-EDB8-7424-CA4169DF93DA}"/>
+              </a:ext>
+            </a:extLst>
+          </p:cNvPr>
+          <p:cNvSpPr txBox="1"/>
+          <p:nvPr/>
+        </p:nvSpPr>
+        <p:spPr>
+          <a:xfrm>
+            <a:off x="381000" y="1143000"/>
+            <a:ext cx="11353800" cy="3785652"/>
+          </a:xfrm>
+          <a:prstGeom prst="rect">
+            <a:avLst/>
+          </a:prstGeom>
+          <a:noFill/>
+        </p:spPr>
+        <p:txBody>
+          <a:bodyPr wrap="square">
+            <a:spAutoFit/>
+          </a:bodyPr>
+          <a:lstStyle/>
+          <a:p>
+            <a:pPr algn="l"/>
+            <a:r>
+              <a:rPr lang="en-US" sz="4000" b="1" dirty="0">
+                <a:solidFill>
+                  <a:srgbClr val="569CD6"/>
+                </a:solidFill>
+                <a:effectLst/>
+                <a:latin typeface="+mn-lt"/>
+                <a:ea typeface="Calibri" panose="020F0502020204030204" pitchFamily="34" charset="0"/>
+                <a:cs typeface="Calibri" panose="020F0502020204030204" pitchFamily="34" charset="0"/>
+              </a:rPr>
+              <a:t>Multivariate Analysis</a:t>
+            </a:r>
+          </a:p>
+          <a:p>
+            <a:pPr algn="l"/>
+            <a:r>
+              <a:rPr lang="en-US" sz="4000" b="1" dirty="0">
+                <a:solidFill>
+                  <a:schemeClr val="tx1"/>
+                </a:solidFill>
+                <a:effectLst/>
+                <a:latin typeface="+mn-lt"/>
+              </a:rPr>
+              <a:t>Multivariate analysis of Loan Purpose against loan status and the charged off percentage.</a:t>
+            </a:r>
+          </a:p>
+          <a:p>
+            <a:pPr algn="l"/>
+            <a:endParaRPr lang="en-US" sz="4000" b="1" dirty="0">
+              <a:solidFill>
+                <a:schemeClr val="tx1"/>
+              </a:solidFill>
+              <a:latin typeface="+mn-lt"/>
+            </a:endParaRPr>
+          </a:p>
+          <a:p>
+            <a:pPr algn="l"/>
+            <a:endParaRPr lang="fr-FR" sz="4000" b="1" dirty="0">
+              <a:solidFill>
+                <a:schemeClr val="tx1"/>
+              </a:solidFill>
+              <a:effectLst/>
+              <a:latin typeface="+mn-lt"/>
+            </a:endParaRPr>
+          </a:p>
+          <a:p>
+            <a:pPr algn="l"/>
+            <a:endParaRPr lang="en-US" sz="4000" b="1" dirty="0">
+              <a:solidFill>
+                <a:schemeClr val="tx1"/>
+              </a:solidFill>
+              <a:effectLst/>
+              <a:latin typeface="+mn-lt"/>
+            </a:endParaRPr>
+          </a:p>
+        </p:txBody>
+      </p:sp>
+      <p:pic>
+        <p:nvPicPr>
+          <p:cNvPr id="4" name="Picture 3">
+            <a:extLst>
+              <a:ext uri="{FF2B5EF4-FFF2-40B4-BE49-F238E27FC236}">
+                <a16:creationId xmlns:a16="http://schemas.microsoft.com/office/drawing/2014/main" id="{7243833A-1C6F-7CEC-BD35-A7E0DF2DE5E6}"/>
+              </a:ext>
+            </a:extLst>
+          </p:cNvPr>
+          <p:cNvPicPr>
+            <a:picLocks noChangeAspect="1"/>
+          </p:cNvPicPr>
+          <p:nvPr/>
+        </p:nvPicPr>
+        <p:blipFill>
+          <a:blip r:embed="rId2"/>
+          <a:stretch>
+            <a:fillRect/>
+          </a:stretch>
+        </p:blipFill>
+        <p:spPr>
+          <a:xfrm>
+            <a:off x="30480" y="3505200"/>
+            <a:ext cx="12192000" cy="5097301"/>
+          </a:xfrm>
+          <a:prstGeom prst="rect">
+            <a:avLst/>
+          </a:prstGeom>
+        </p:spPr>
+      </p:pic>
+    </p:spTree>
+    <p:extLst>
+      <p:ext uri="{BB962C8B-B14F-4D97-AF65-F5344CB8AC3E}">
+        <p14:creationId xmlns:p14="http://schemas.microsoft.com/office/powerpoint/2010/main" val="555792195"/>
+      </p:ext>
+    </p:extLst>
+  </p:cSld>
+  <p:clrMapOvr>
+    <a:masterClrMapping/>
+  </p:clrMapOvr>
+</p:sld>
+</file>
+
 <file path=ppt/slides/slide2.xml><?xml version="1.0" encoding="utf-8"?>
 <p:sld xmlns:a="http://schemas.openxmlformats.org/drawingml/2006/main" xmlns:r="http://schemas.openxmlformats.org/officeDocument/2006/relationships" xmlns:p="http://schemas.openxmlformats.org/presentationml/2006/main">
   <p:cSld>
@@ -2138,9 +4721,15 @@
           <a:bodyPr/>
           <a:lstStyle/>
           <a:p>
+            <a:pPr algn="l"/>
             <a:r>
               <a:rPr lang="en-IN" sz="4000" b="1" dirty="0">
-                <a:latin typeface="+mn-lt"/>
+                <a:solidFill>
+                  <a:srgbClr val="569CD6"/>
+                </a:solidFill>
+                <a:latin typeface="+mn-lt"/>
+                <a:ea typeface="Calibri" panose="020F0502020204030204" pitchFamily="34" charset="0"/>
+                <a:cs typeface="Calibri" panose="020F0502020204030204" pitchFamily="34" charset="0"/>
               </a:rPr>
               <a:t>Objective</a:t>
             </a:r>
@@ -2254,6 +4843,348 @@
         </p:txBody>
       </p:sp>
     </p:spTree>
+  </p:cSld>
+  <p:clrMapOvr>
+    <a:masterClrMapping/>
+  </p:clrMapOvr>
+</p:sld>
+</file>
+
+<file path=ppt/slides/slide20.xml><?xml version="1.0" encoding="utf-8"?>
+<p:sld xmlns:a="http://schemas.openxmlformats.org/drawingml/2006/main" xmlns:r="http://schemas.openxmlformats.org/officeDocument/2006/relationships" xmlns:p="http://schemas.openxmlformats.org/presentationml/2006/main">
+  <p:cSld>
+    <p:spTree>
+      <p:nvGrpSpPr>
+        <p:cNvPr id="1" name="">
+          <a:extLst>
+            <a:ext uri="{FF2B5EF4-FFF2-40B4-BE49-F238E27FC236}">
+              <a16:creationId xmlns:a16="http://schemas.microsoft.com/office/drawing/2014/main" id="{AE4C9F5C-4789-02CE-18DA-733FA1EB4CA9}"/>
+            </a:ext>
+          </a:extLst>
+        </p:cNvPr>
+        <p:cNvGrpSpPr/>
+        <p:nvPr/>
+      </p:nvGrpSpPr>
+      <p:grpSpPr>
+        <a:xfrm>
+          <a:off x="0" y="0"/>
+          <a:ext cx="0" cy="0"/>
+          <a:chOff x="0" y="0"/>
+          <a:chExt cx="0" cy="0"/>
+        </a:xfrm>
+      </p:grpSpPr>
+      <p:sp>
+        <p:nvSpPr>
+          <p:cNvPr id="5" name="TextBox 4">
+            <a:extLst>
+              <a:ext uri="{FF2B5EF4-FFF2-40B4-BE49-F238E27FC236}">
+                <a16:creationId xmlns:a16="http://schemas.microsoft.com/office/drawing/2014/main" id="{B2B880CE-1CC3-F1F9-EC1E-5424F3903209}"/>
+              </a:ext>
+            </a:extLst>
+          </p:cNvPr>
+          <p:cNvSpPr txBox="1"/>
+          <p:nvPr/>
+        </p:nvSpPr>
+        <p:spPr>
+          <a:xfrm>
+            <a:off x="381000" y="1143000"/>
+            <a:ext cx="11353800" cy="5016758"/>
+          </a:xfrm>
+          <a:prstGeom prst="rect">
+            <a:avLst/>
+          </a:prstGeom>
+          <a:noFill/>
+        </p:spPr>
+        <p:txBody>
+          <a:bodyPr wrap="square">
+            <a:spAutoFit/>
+          </a:bodyPr>
+          <a:lstStyle/>
+          <a:p>
+            <a:pPr algn="l"/>
+            <a:r>
+              <a:rPr lang="en-US" sz="4000" b="1" dirty="0">
+                <a:solidFill>
+                  <a:srgbClr val="569CD6"/>
+                </a:solidFill>
+                <a:effectLst/>
+                <a:latin typeface="+mn-lt"/>
+                <a:ea typeface="Calibri" panose="020F0502020204030204" pitchFamily="34" charset="0"/>
+                <a:cs typeface="Calibri" panose="020F0502020204030204" pitchFamily="34" charset="0"/>
+              </a:rPr>
+              <a:t>Multivariate Analysis</a:t>
+            </a:r>
+          </a:p>
+          <a:p>
+            <a:pPr algn="l"/>
+            <a:r>
+              <a:rPr lang="en-US" sz="4000" b="1" dirty="0">
+                <a:solidFill>
+                  <a:schemeClr val="tx1"/>
+                </a:solidFill>
+                <a:effectLst/>
+                <a:latin typeface="+mn-lt"/>
+              </a:rPr>
+              <a:t>Multivariate analysis of Home Ownership Status against loan status and the charged off percentage.</a:t>
+            </a:r>
+          </a:p>
+          <a:p>
+            <a:pPr algn="l"/>
+            <a:endParaRPr lang="en-US" sz="4000" b="1" dirty="0">
+              <a:solidFill>
+                <a:schemeClr val="tx1"/>
+              </a:solidFill>
+              <a:latin typeface="+mn-lt"/>
+            </a:endParaRPr>
+          </a:p>
+          <a:p>
+            <a:pPr algn="l"/>
+            <a:endParaRPr lang="en-US" sz="4000" b="1" dirty="0">
+              <a:solidFill>
+                <a:schemeClr val="tx1"/>
+              </a:solidFill>
+              <a:effectLst/>
+              <a:latin typeface="+mn-lt"/>
+            </a:endParaRPr>
+          </a:p>
+          <a:p>
+            <a:pPr algn="l"/>
+            <a:endParaRPr lang="en-US" sz="4000" b="1" dirty="0">
+              <a:solidFill>
+                <a:schemeClr val="tx1"/>
+              </a:solidFill>
+              <a:latin typeface="+mn-lt"/>
+            </a:endParaRPr>
+          </a:p>
+          <a:p>
+            <a:pPr algn="l"/>
+            <a:endParaRPr lang="fr-FR" sz="4000" b="1" dirty="0">
+              <a:solidFill>
+                <a:schemeClr val="tx1"/>
+              </a:solidFill>
+              <a:effectLst/>
+              <a:latin typeface="+mn-lt"/>
+            </a:endParaRPr>
+          </a:p>
+          <a:p>
+            <a:pPr algn="l"/>
+            <a:endParaRPr lang="en-US" sz="4000" b="1" dirty="0">
+              <a:solidFill>
+                <a:schemeClr val="tx1"/>
+              </a:solidFill>
+              <a:effectLst/>
+              <a:latin typeface="+mn-lt"/>
+            </a:endParaRPr>
+          </a:p>
+        </p:txBody>
+      </p:sp>
+      <p:pic>
+        <p:nvPicPr>
+          <p:cNvPr id="3" name="Picture 2">
+            <a:extLst>
+              <a:ext uri="{FF2B5EF4-FFF2-40B4-BE49-F238E27FC236}">
+                <a16:creationId xmlns:a16="http://schemas.microsoft.com/office/drawing/2014/main" id="{64965E06-268C-9B4F-9CA9-4DF62A448F44}"/>
+              </a:ext>
+            </a:extLst>
+          </p:cNvPr>
+          <p:cNvPicPr>
+            <a:picLocks noChangeAspect="1"/>
+          </p:cNvPicPr>
+          <p:nvPr/>
+        </p:nvPicPr>
+        <p:blipFill>
+          <a:blip r:embed="rId2"/>
+          <a:stretch>
+            <a:fillRect/>
+          </a:stretch>
+        </p:blipFill>
+        <p:spPr>
+          <a:xfrm>
+            <a:off x="0" y="3825258"/>
+            <a:ext cx="12192000" cy="5090142"/>
+          </a:xfrm>
+          <a:prstGeom prst="rect">
+            <a:avLst/>
+          </a:prstGeom>
+        </p:spPr>
+      </p:pic>
+    </p:spTree>
+    <p:extLst>
+      <p:ext uri="{BB962C8B-B14F-4D97-AF65-F5344CB8AC3E}">
+        <p14:creationId xmlns:p14="http://schemas.microsoft.com/office/powerpoint/2010/main" val="2315375783"/>
+      </p:ext>
+    </p:extLst>
+  </p:cSld>
+  <p:clrMapOvr>
+    <a:masterClrMapping/>
+  </p:clrMapOvr>
+</p:sld>
+</file>
+
+<file path=ppt/slides/slide21.xml><?xml version="1.0" encoding="utf-8"?>
+<p:sld xmlns:a="http://schemas.openxmlformats.org/drawingml/2006/main" xmlns:r="http://schemas.openxmlformats.org/officeDocument/2006/relationships" xmlns:p="http://schemas.openxmlformats.org/presentationml/2006/main">
+  <p:cSld>
+    <p:spTree>
+      <p:nvGrpSpPr>
+        <p:cNvPr id="1" name="">
+          <a:extLst>
+            <a:ext uri="{FF2B5EF4-FFF2-40B4-BE49-F238E27FC236}">
+              <a16:creationId xmlns:a16="http://schemas.microsoft.com/office/drawing/2014/main" id="{7EB9F350-6B9E-090A-0B7B-FAD264833124}"/>
+            </a:ext>
+          </a:extLst>
+        </p:cNvPr>
+        <p:cNvGrpSpPr/>
+        <p:nvPr/>
+      </p:nvGrpSpPr>
+      <p:grpSpPr>
+        <a:xfrm>
+          <a:off x="0" y="0"/>
+          <a:ext cx="0" cy="0"/>
+          <a:chOff x="0" y="0"/>
+          <a:chExt cx="0" cy="0"/>
+        </a:xfrm>
+      </p:grpSpPr>
+      <p:sp>
+        <p:nvSpPr>
+          <p:cNvPr id="5" name="TextBox 4">
+            <a:extLst>
+              <a:ext uri="{FF2B5EF4-FFF2-40B4-BE49-F238E27FC236}">
+                <a16:creationId xmlns:a16="http://schemas.microsoft.com/office/drawing/2014/main" id="{05D7742C-A7B8-F7AC-A594-A2D6E2016D1F}"/>
+              </a:ext>
+            </a:extLst>
+          </p:cNvPr>
+          <p:cNvSpPr txBox="1"/>
+          <p:nvPr/>
+        </p:nvSpPr>
+        <p:spPr>
+          <a:xfrm>
+            <a:off x="381000" y="1143000"/>
+            <a:ext cx="11353800" cy="5016758"/>
+          </a:xfrm>
+          <a:prstGeom prst="rect">
+            <a:avLst/>
+          </a:prstGeom>
+          <a:noFill/>
+        </p:spPr>
+        <p:txBody>
+          <a:bodyPr wrap="square">
+            <a:spAutoFit/>
+          </a:bodyPr>
+          <a:lstStyle/>
+          <a:p>
+            <a:pPr algn="l"/>
+            <a:r>
+              <a:rPr lang="en-US" sz="4000" b="1" dirty="0">
+                <a:solidFill>
+                  <a:srgbClr val="569CD6"/>
+                </a:solidFill>
+                <a:effectLst/>
+                <a:latin typeface="+mn-lt"/>
+                <a:ea typeface="Calibri" panose="020F0502020204030204" pitchFamily="34" charset="0"/>
+                <a:cs typeface="Calibri" panose="020F0502020204030204" pitchFamily="34" charset="0"/>
+              </a:rPr>
+              <a:t>Multivariate Analysis</a:t>
+            </a:r>
+          </a:p>
+          <a:p>
+            <a:pPr algn="l"/>
+            <a:r>
+              <a:rPr lang="en-US" sz="4000" b="1" dirty="0">
+                <a:solidFill>
+                  <a:schemeClr val="tx1"/>
+                </a:solidFill>
+                <a:effectLst/>
+                <a:latin typeface="+mn-lt"/>
+              </a:rPr>
+              <a:t>Multivariate analysis of Annual Income Range against loan status and the charged off percentage.</a:t>
+            </a:r>
+          </a:p>
+          <a:p>
+            <a:pPr algn="l"/>
+            <a:endParaRPr lang="en-US" sz="4000" b="1" dirty="0">
+              <a:solidFill>
+                <a:schemeClr val="tx1"/>
+              </a:solidFill>
+              <a:latin typeface="+mn-lt"/>
+            </a:endParaRPr>
+          </a:p>
+          <a:p>
+            <a:pPr algn="l"/>
+            <a:endParaRPr lang="en-US" sz="4000" b="1" dirty="0">
+              <a:solidFill>
+                <a:schemeClr val="tx1"/>
+              </a:solidFill>
+              <a:effectLst/>
+              <a:latin typeface="+mn-lt"/>
+            </a:endParaRPr>
+          </a:p>
+          <a:p>
+            <a:pPr algn="l"/>
+            <a:endParaRPr lang="en-US" sz="4000" b="1" dirty="0">
+              <a:solidFill>
+                <a:schemeClr val="tx1"/>
+              </a:solidFill>
+              <a:latin typeface="+mn-lt"/>
+            </a:endParaRPr>
+          </a:p>
+          <a:p>
+            <a:pPr algn="l"/>
+            <a:endParaRPr lang="fr-FR" sz="4000" b="1" dirty="0">
+              <a:solidFill>
+                <a:schemeClr val="tx1"/>
+              </a:solidFill>
+              <a:effectLst/>
+              <a:latin typeface="+mn-lt"/>
+            </a:endParaRPr>
+          </a:p>
+          <a:p>
+            <a:pPr algn="l"/>
+            <a:endParaRPr lang="en-US" sz="4000" b="1" dirty="0">
+              <a:solidFill>
+                <a:schemeClr val="tx1"/>
+              </a:solidFill>
+              <a:effectLst/>
+              <a:latin typeface="+mn-lt"/>
+            </a:endParaRPr>
+          </a:p>
+        </p:txBody>
+      </p:sp>
+      <p:pic>
+        <p:nvPicPr>
+          <p:cNvPr id="3" name="Picture 2">
+            <a:extLst>
+              <a:ext uri="{FF2B5EF4-FFF2-40B4-BE49-F238E27FC236}">
+                <a16:creationId xmlns:a16="http://schemas.microsoft.com/office/drawing/2014/main" id="{D528483C-F63C-3862-BA0D-1CD44EFF9090}"/>
+              </a:ext>
+            </a:extLst>
+          </p:cNvPr>
+          <p:cNvPicPr>
+            <a:picLocks noChangeAspect="1"/>
+          </p:cNvPicPr>
+          <p:nvPr/>
+        </p:nvPicPr>
+        <p:blipFill>
+          <a:blip r:embed="rId2"/>
+          <a:stretch>
+            <a:fillRect/>
+          </a:stretch>
+        </p:blipFill>
+        <p:spPr>
+          <a:xfrm>
+            <a:off x="0" y="3962400"/>
+            <a:ext cx="12192000" cy="5129297"/>
+          </a:xfrm>
+          <a:prstGeom prst="rect">
+            <a:avLst/>
+          </a:prstGeom>
+        </p:spPr>
+      </p:pic>
+    </p:spTree>
+    <p:extLst>
+      <p:ext uri="{BB962C8B-B14F-4D97-AF65-F5344CB8AC3E}">
+        <p14:creationId xmlns:p14="http://schemas.microsoft.com/office/powerpoint/2010/main" val="3233872747"/>
+      </p:ext>
+    </p:extLst>
   </p:cSld>
   <p:clrMapOvr>
     <a:masterClrMapping/>
@@ -2297,7 +5228,7 @@
         <p:spPr>
           <a:xfrm>
             <a:off x="457200" y="1219200"/>
-            <a:ext cx="9296400" cy="4267200"/>
+            <a:ext cx="9296400" cy="3724096"/>
           </a:xfrm>
         </p:spPr>
         <p:txBody>
@@ -2306,7 +5237,12 @@
           <a:p>
             <a:r>
               <a:rPr lang="en-IN" sz="4000" b="1" dirty="0">
-                <a:latin typeface="+mn-lt"/>
+                <a:solidFill>
+                  <a:srgbClr val="569CD6"/>
+                </a:solidFill>
+                <a:latin typeface="+mn-lt"/>
+                <a:ea typeface="Calibri" panose="020F0502020204030204" pitchFamily="34" charset="0"/>
+                <a:cs typeface="Calibri" panose="020F0502020204030204" pitchFamily="34" charset="0"/>
               </a:rPr>
               <a:t>Technology Used</a:t>
             </a:r>
@@ -2334,7 +5270,12 @@
             </a:br>
             <a:r>
               <a:rPr lang="en-IN" sz="4000" b="1" dirty="0">
-                <a:latin typeface="+mn-lt"/>
+                <a:solidFill>
+                  <a:srgbClr val="569CD6"/>
+                </a:solidFill>
+                <a:latin typeface="+mn-lt"/>
+                <a:ea typeface="Calibri" panose="020F0502020204030204" pitchFamily="34" charset="0"/>
+                <a:cs typeface="Calibri" panose="020F0502020204030204" pitchFamily="34" charset="0"/>
               </a:rPr>
               <a:t>Libraries used</a:t>
             </a:r>
@@ -2589,7 +5530,12 @@
           <a:p>
             <a:r>
               <a:rPr lang="en-US" sz="4000" b="1" dirty="0">
-                <a:latin typeface="+mn-lt"/>
+                <a:solidFill>
+                  <a:srgbClr val="569CD6"/>
+                </a:solidFill>
+                <a:latin typeface="+mn-lt"/>
+                <a:ea typeface="Calibri" panose="020F0502020204030204" pitchFamily="34" charset="0"/>
+                <a:cs typeface="Calibri" panose="020F0502020204030204" pitchFamily="34" charset="0"/>
               </a:rPr>
               <a:t>Data Overview:</a:t>
             </a:r>
@@ -2856,7 +5802,12 @@
           <a:p>
             <a:r>
               <a:rPr lang="en-US" sz="4000" b="1" dirty="0">
-                <a:latin typeface="+mn-lt"/>
+                <a:solidFill>
+                  <a:srgbClr val="569CD6"/>
+                </a:solidFill>
+                <a:latin typeface="+mn-lt"/>
+                <a:ea typeface="Calibri" panose="020F0502020204030204" pitchFamily="34" charset="0"/>
+                <a:cs typeface="Calibri" panose="020F0502020204030204" pitchFamily="34" charset="0"/>
               </a:rPr>
               <a:t>Data Processing Approach</a:t>
             </a:r>
@@ -3832,7 +6783,12 @@
           <a:p>
             <a:r>
               <a:rPr lang="en-US" sz="4000" b="1" dirty="0">
-                <a:latin typeface="+mn-lt"/>
+                <a:solidFill>
+                  <a:srgbClr val="569CD6"/>
+                </a:solidFill>
+                <a:latin typeface="+mn-lt"/>
+                <a:ea typeface="Calibri" panose="020F0502020204030204" pitchFamily="34" charset="0"/>
+                <a:cs typeface="Calibri" panose="020F0502020204030204" pitchFamily="34" charset="0"/>
               </a:rPr>
               <a:t>Data Analysis Approach</a:t>
             </a:r>
@@ -3972,8 +6928,8 @@
         </p:nvSpPr>
         <p:spPr>
           <a:xfrm>
-            <a:off x="762000" y="1219200"/>
-            <a:ext cx="8458200" cy="707886"/>
+            <a:off x="304800" y="1219200"/>
+            <a:ext cx="11658600" cy="8710077"/>
           </a:xfrm>
           <a:prstGeom prst="rect">
             <a:avLst/>
@@ -3986,12 +6942,268 @@
           </a:bodyPr>
           <a:lstStyle/>
           <a:p>
-            <a:r>
-              <a:rPr lang="en-IN" sz="4000" b="1" i="0" u="none" strike="noStrike" baseline="0" dirty="0">
+            <a:pPr algn="l"/>
+            <a:r>
+              <a:rPr lang="en-US" sz="4000" b="1" dirty="0">
+                <a:solidFill>
+                  <a:srgbClr val="569CD6"/>
+                </a:solidFill>
+                <a:effectLst/>
+                <a:latin typeface="+mn-lt"/>
+                <a:ea typeface="Calibri" panose="020F0502020204030204" pitchFamily="34" charset="0"/>
+                <a:cs typeface="Calibri" panose="020F0502020204030204" pitchFamily="34" charset="0"/>
+              </a:rPr>
+              <a:t>Bivariate Analysis of Ordered Categorical Variables.</a:t>
+            </a:r>
+            <a:endParaRPr lang="fr-FR" sz="4000" b="1" dirty="0">
+              <a:solidFill>
+                <a:srgbClr val="569CD6"/>
+              </a:solidFill>
+              <a:effectLst/>
+              <a:latin typeface="+mn-lt"/>
+            </a:endParaRPr>
+          </a:p>
+          <a:p>
+            <a:pPr algn="l"/>
+            <a:r>
+              <a:rPr lang="en-US" sz="4000" b="1" dirty="0">
+                <a:solidFill>
+                  <a:schemeClr val="tx1"/>
+                </a:solidFill>
+                <a:effectLst/>
+                <a:latin typeface="+mn-lt"/>
+              </a:rPr>
+              <a:t>1. Loan Disbursal Quarter Vs Loan Status</a:t>
+            </a:r>
+          </a:p>
+          <a:p>
+            <a:pPr algn="l"/>
+            <a:r>
+              <a:rPr lang="en-US" sz="4000" b="1" dirty="0">
+                <a:solidFill>
+                  <a:schemeClr val="tx1"/>
+                </a:solidFill>
+                <a:effectLst/>
+                <a:latin typeface="+mn-lt"/>
+              </a:rPr>
+              <a:t>2. Term of Loan Vs Loan Status</a:t>
+            </a:r>
+          </a:p>
+          <a:p>
+            <a:pPr algn="l"/>
+            <a:r>
+              <a:rPr lang="en-US" sz="4000" b="1" dirty="0">
+                <a:solidFill>
+                  <a:schemeClr val="tx1"/>
+                </a:solidFill>
+                <a:effectLst/>
+                <a:latin typeface="+mn-lt"/>
+              </a:rPr>
+              <a:t>3. Employment Tenure Vs Loan Status</a:t>
+            </a:r>
+          </a:p>
+          <a:p>
+            <a:pPr algn="l"/>
+            <a:endParaRPr lang="en-US" sz="4000" b="1" dirty="0">
+              <a:solidFill>
+                <a:schemeClr val="tx1"/>
+              </a:solidFill>
+              <a:latin typeface="+mn-lt"/>
+            </a:endParaRPr>
+          </a:p>
+          <a:p>
+            <a:pPr algn="l"/>
+            <a:r>
+              <a:rPr lang="fr-FR" sz="4000" b="1" dirty="0" err="1">
+                <a:solidFill>
+                  <a:srgbClr val="569CD6"/>
+                </a:solidFill>
+                <a:effectLst/>
+                <a:latin typeface="+mn-lt"/>
+              </a:rPr>
+              <a:t>Bivariate</a:t>
+            </a:r>
+            <a:r>
+              <a:rPr lang="fr-FR" sz="4000" b="1" dirty="0">
+                <a:solidFill>
+                  <a:srgbClr val="569CD6"/>
+                </a:solidFill>
+                <a:effectLst/>
+                <a:latin typeface="+mn-lt"/>
+              </a:rPr>
+              <a:t> </a:t>
+            </a:r>
+            <a:r>
+              <a:rPr lang="fr-FR" sz="4000" b="1" dirty="0" err="1">
+                <a:solidFill>
+                  <a:srgbClr val="569CD6"/>
+                </a:solidFill>
+                <a:effectLst/>
                 <a:latin typeface="+mn-lt"/>
               </a:rPr>
               <a:t>Analysis</a:t>
             </a:r>
+            <a:r>
+              <a:rPr lang="fr-FR" sz="4000" b="1" dirty="0">
+                <a:solidFill>
+                  <a:srgbClr val="569CD6"/>
+                </a:solidFill>
+                <a:effectLst/>
+                <a:latin typeface="+mn-lt"/>
+              </a:rPr>
+              <a:t> of </a:t>
+            </a:r>
+            <a:r>
+              <a:rPr lang="fr-FR" sz="4000" b="1" dirty="0" err="1">
+                <a:solidFill>
+                  <a:srgbClr val="569CD6"/>
+                </a:solidFill>
+                <a:effectLst/>
+                <a:latin typeface="+mn-lt"/>
+              </a:rPr>
+              <a:t>Unordered</a:t>
+            </a:r>
+            <a:r>
+              <a:rPr lang="fr-FR" sz="4000" b="1" dirty="0">
+                <a:solidFill>
+                  <a:srgbClr val="569CD6"/>
+                </a:solidFill>
+                <a:effectLst/>
+                <a:latin typeface="+mn-lt"/>
+              </a:rPr>
+              <a:t> </a:t>
+            </a:r>
+            <a:r>
+              <a:rPr lang="fr-FR" sz="4000" b="1" dirty="0" err="1">
+                <a:solidFill>
+                  <a:srgbClr val="569CD6"/>
+                </a:solidFill>
+                <a:effectLst/>
+                <a:latin typeface="+mn-lt"/>
+              </a:rPr>
+              <a:t>Categorical</a:t>
+            </a:r>
+            <a:r>
+              <a:rPr lang="fr-FR" sz="4000" b="1" dirty="0">
+                <a:solidFill>
+                  <a:srgbClr val="569CD6"/>
+                </a:solidFill>
+                <a:effectLst/>
+                <a:latin typeface="+mn-lt"/>
+              </a:rPr>
+              <a:t> Variables.</a:t>
+            </a:r>
+          </a:p>
+          <a:p>
+            <a:pPr algn="l"/>
+            <a:r>
+              <a:rPr lang="en-US" sz="4000" b="1" dirty="0">
+                <a:solidFill>
+                  <a:schemeClr val="tx1"/>
+                </a:solidFill>
+                <a:effectLst/>
+                <a:latin typeface="+mn-lt"/>
+              </a:rPr>
+              <a:t>1. Purpose of Loan v/s Loan Status</a:t>
+            </a:r>
+          </a:p>
+          <a:p>
+            <a:pPr algn="l"/>
+            <a:r>
+              <a:rPr lang="en-US" sz="4000" b="1" dirty="0">
+                <a:solidFill>
+                  <a:schemeClr val="tx1"/>
+                </a:solidFill>
+                <a:effectLst/>
+                <a:latin typeface="+mn-lt"/>
+              </a:rPr>
+              <a:t>2. Home Ownership Status v/s Loan Status</a:t>
+            </a:r>
+          </a:p>
+          <a:p>
+            <a:pPr algn="l"/>
+            <a:endParaRPr lang="en-IN" sz="4000" dirty="0">
+              <a:latin typeface="+mn-lt"/>
+            </a:endParaRPr>
+          </a:p>
+          <a:p>
+            <a:pPr algn="l"/>
+            <a:r>
+              <a:rPr lang="fr-FR" sz="4000" b="1" dirty="0" err="1">
+                <a:solidFill>
+                  <a:srgbClr val="569CD6"/>
+                </a:solidFill>
+                <a:latin typeface="+mn-lt"/>
+              </a:rPr>
+              <a:t>Bivariate</a:t>
+            </a:r>
+            <a:r>
+              <a:rPr lang="fr-FR" sz="4000" b="1" dirty="0">
+                <a:solidFill>
+                  <a:srgbClr val="569CD6"/>
+                </a:solidFill>
+                <a:latin typeface="+mn-lt"/>
+              </a:rPr>
+              <a:t> </a:t>
+            </a:r>
+            <a:r>
+              <a:rPr lang="fr-FR" sz="4000" b="1" dirty="0" err="1">
+                <a:solidFill>
+                  <a:srgbClr val="569CD6"/>
+                </a:solidFill>
+                <a:latin typeface="+mn-lt"/>
+              </a:rPr>
+              <a:t>Analysis</a:t>
+            </a:r>
+            <a:r>
+              <a:rPr lang="fr-FR" sz="4000" b="1" dirty="0">
+                <a:solidFill>
+                  <a:srgbClr val="569CD6"/>
+                </a:solidFill>
+                <a:latin typeface="+mn-lt"/>
+              </a:rPr>
+              <a:t> of Quantitative Variables</a:t>
+            </a:r>
+          </a:p>
+          <a:p>
+            <a:pPr marL="742950" indent="-742950" algn="l">
+              <a:buAutoNum type="arabicPeriod"/>
+            </a:pPr>
+            <a:r>
+              <a:rPr lang="en-US" sz="4000" b="1" dirty="0">
+                <a:solidFill>
+                  <a:schemeClr val="tx1"/>
+                </a:solidFill>
+                <a:latin typeface="+mn-lt"/>
+              </a:rPr>
+              <a:t>Annual Income range v/s Loan Status</a:t>
+            </a:r>
+          </a:p>
+          <a:p>
+            <a:pPr marL="742950" indent="-742950" algn="l">
+              <a:buAutoNum type="arabicPeriod"/>
+            </a:pPr>
+            <a:r>
+              <a:rPr lang="en-US" sz="4000" b="1" dirty="0">
+                <a:solidFill>
+                  <a:schemeClr val="tx1"/>
+                </a:solidFill>
+                <a:latin typeface="+mn-lt"/>
+              </a:rPr>
+              <a:t>Loan Interest Rate v/s Loan Status</a:t>
+            </a:r>
+          </a:p>
+          <a:p>
+            <a:pPr algn="l"/>
+            <a:endParaRPr lang="fr-FR" sz="4000" b="1" dirty="0">
+              <a:solidFill>
+                <a:srgbClr val="569CD6"/>
+              </a:solidFill>
+              <a:latin typeface="+mn-lt"/>
+            </a:endParaRPr>
+          </a:p>
+          <a:p>
+            <a:pPr algn="l"/>
             <a:endParaRPr lang="en-IN" sz="4000" dirty="0">
               <a:latin typeface="+mn-lt"/>
             </a:endParaRPr>
@@ -4002,6 +7214,419 @@
     <p:extLst>
       <p:ext uri="{BB962C8B-B14F-4D97-AF65-F5344CB8AC3E}">
         <p14:creationId xmlns:p14="http://schemas.microsoft.com/office/powerpoint/2010/main" val="2520409953"/>
+      </p:ext>
+    </p:extLst>
+  </p:cSld>
+  <p:clrMapOvr>
+    <a:masterClrMapping/>
+  </p:clrMapOvr>
+</p:sld>
+</file>
+
+<file path=ppt/slides/slide8.xml><?xml version="1.0" encoding="utf-8"?>
+<p:sld xmlns:a="http://schemas.openxmlformats.org/drawingml/2006/main" xmlns:r="http://schemas.openxmlformats.org/officeDocument/2006/relationships" xmlns:p="http://schemas.openxmlformats.org/presentationml/2006/main">
+  <p:cSld>
+    <p:spTree>
+      <p:nvGrpSpPr>
+        <p:cNvPr id="1" name="">
+          <a:extLst>
+            <a:ext uri="{FF2B5EF4-FFF2-40B4-BE49-F238E27FC236}">
+              <a16:creationId xmlns:a16="http://schemas.microsoft.com/office/drawing/2014/main" id="{68D52813-BDFE-603C-9C21-4D6D9D56D515}"/>
+            </a:ext>
+          </a:extLst>
+        </p:cNvPr>
+        <p:cNvGrpSpPr/>
+        <p:nvPr/>
+      </p:nvGrpSpPr>
+      <p:grpSpPr>
+        <a:xfrm>
+          <a:off x="0" y="0"/>
+          <a:ext cx="0" cy="0"/>
+          <a:chOff x="0" y="0"/>
+          <a:chExt cx="0" cy="0"/>
+        </a:xfrm>
+      </p:grpSpPr>
+      <p:sp>
+        <p:nvSpPr>
+          <p:cNvPr id="5" name="TextBox 4">
+            <a:extLst>
+              <a:ext uri="{FF2B5EF4-FFF2-40B4-BE49-F238E27FC236}">
+                <a16:creationId xmlns:a16="http://schemas.microsoft.com/office/drawing/2014/main" id="{08980DE4-8508-73B3-A121-7D89F63CA498}"/>
+              </a:ext>
+            </a:extLst>
+          </p:cNvPr>
+          <p:cNvSpPr txBox="1"/>
+          <p:nvPr/>
+        </p:nvSpPr>
+        <p:spPr>
+          <a:xfrm>
+            <a:off x="353053" y="9051608"/>
+            <a:ext cx="11427467" cy="1815882"/>
+          </a:xfrm>
+          <a:prstGeom prst="rect">
+            <a:avLst/>
+          </a:prstGeom>
+          <a:noFill/>
+        </p:spPr>
+        <p:txBody>
+          <a:bodyPr wrap="square">
+            <a:spAutoFit/>
+          </a:bodyPr>
+          <a:lstStyle/>
+          <a:p>
+            <a:pPr algn="ctr"/>
+            <a:r>
+              <a:rPr lang="en-US" sz="3200" b="0" dirty="0">
+                <a:solidFill>
+                  <a:schemeClr val="tx1"/>
+                </a:solidFill>
+                <a:effectLst/>
+                <a:latin typeface="+mj-lt"/>
+              </a:rPr>
+              <a:t>Q4 is the most preferred quarter for taking loans</a:t>
+            </a:r>
+          </a:p>
+          <a:p>
+            <a:pPr algn="l"/>
+            <a:endParaRPr lang="fr-FR" sz="4000" b="1" dirty="0">
+              <a:solidFill>
+                <a:srgbClr val="569CD6"/>
+              </a:solidFill>
+              <a:latin typeface="+mn-lt"/>
+            </a:endParaRPr>
+          </a:p>
+          <a:p>
+            <a:pPr algn="l"/>
+            <a:endParaRPr lang="en-IN" sz="4000" dirty="0">
+              <a:latin typeface="+mn-lt"/>
+            </a:endParaRPr>
+          </a:p>
+        </p:txBody>
+      </p:sp>
+      <p:pic>
+        <p:nvPicPr>
+          <p:cNvPr id="3" name="Picture 2">
+            <a:extLst>
+              <a:ext uri="{FF2B5EF4-FFF2-40B4-BE49-F238E27FC236}">
+                <a16:creationId xmlns:a16="http://schemas.microsoft.com/office/drawing/2014/main" id="{34F98353-E79E-A71C-9813-2C1EDD4F606B}"/>
+              </a:ext>
+            </a:extLst>
+          </p:cNvPr>
+          <p:cNvPicPr>
+            <a:picLocks noChangeAspect="1"/>
+          </p:cNvPicPr>
+          <p:nvPr/>
+        </p:nvPicPr>
+        <p:blipFill>
+          <a:blip r:embed="rId2"/>
+          <a:stretch>
+            <a:fillRect/>
+          </a:stretch>
+        </p:blipFill>
+        <p:spPr>
+          <a:xfrm>
+            <a:off x="228600" y="2971800"/>
+            <a:ext cx="11427467" cy="6110288"/>
+          </a:xfrm>
+          <a:prstGeom prst="rect">
+            <a:avLst/>
+          </a:prstGeom>
+        </p:spPr>
+      </p:pic>
+      <p:sp>
+        <p:nvSpPr>
+          <p:cNvPr id="4" name="TextBox 3">
+            <a:extLst>
+              <a:ext uri="{FF2B5EF4-FFF2-40B4-BE49-F238E27FC236}">
+                <a16:creationId xmlns:a16="http://schemas.microsoft.com/office/drawing/2014/main" id="{6FAF1302-19CF-0709-FA74-49D4362177A8}"/>
+              </a:ext>
+            </a:extLst>
+          </p:cNvPr>
+          <p:cNvSpPr txBox="1"/>
+          <p:nvPr/>
+        </p:nvSpPr>
+        <p:spPr>
+          <a:xfrm>
+            <a:off x="457200" y="1371600"/>
+            <a:ext cx="11658600" cy="2554545"/>
+          </a:xfrm>
+          <a:prstGeom prst="rect">
+            <a:avLst/>
+          </a:prstGeom>
+          <a:noFill/>
+        </p:spPr>
+        <p:txBody>
+          <a:bodyPr wrap="square">
+            <a:spAutoFit/>
+          </a:bodyPr>
+          <a:lstStyle/>
+          <a:p>
+            <a:pPr algn="l"/>
+            <a:r>
+              <a:rPr lang="en-US" sz="4000" b="1" dirty="0">
+                <a:solidFill>
+                  <a:srgbClr val="569CD6"/>
+                </a:solidFill>
+                <a:effectLst/>
+                <a:latin typeface="+mn-lt"/>
+                <a:ea typeface="Calibri" panose="020F0502020204030204" pitchFamily="34" charset="0"/>
+                <a:cs typeface="Calibri" panose="020F0502020204030204" pitchFamily="34" charset="0"/>
+              </a:rPr>
+              <a:t>Bivariate Analysis of Ordered Categorical Variables.</a:t>
+            </a:r>
+            <a:endParaRPr lang="fr-FR" sz="4000" b="1" dirty="0">
+              <a:solidFill>
+                <a:srgbClr val="569CD6"/>
+              </a:solidFill>
+              <a:effectLst/>
+              <a:latin typeface="+mn-lt"/>
+            </a:endParaRPr>
+          </a:p>
+          <a:p>
+            <a:pPr algn="l"/>
+            <a:r>
+              <a:rPr lang="en-US" sz="4000" b="1" dirty="0">
+                <a:solidFill>
+                  <a:schemeClr val="tx1"/>
+                </a:solidFill>
+                <a:effectLst/>
+                <a:latin typeface="+mn-lt"/>
+              </a:rPr>
+              <a:t>1. Loan Disbursal Quarter Vs Loan Status</a:t>
+            </a:r>
+          </a:p>
+          <a:p>
+            <a:pPr algn="l"/>
+            <a:endParaRPr lang="fr-FR" sz="4000" b="1" dirty="0">
+              <a:solidFill>
+                <a:srgbClr val="569CD6"/>
+              </a:solidFill>
+              <a:latin typeface="+mn-lt"/>
+            </a:endParaRPr>
+          </a:p>
+          <a:p>
+            <a:pPr algn="l"/>
+            <a:endParaRPr lang="en-IN" sz="4000" dirty="0">
+              <a:latin typeface="+mn-lt"/>
+            </a:endParaRPr>
+          </a:p>
+        </p:txBody>
+      </p:sp>
+    </p:spTree>
+    <p:extLst>
+      <p:ext uri="{BB962C8B-B14F-4D97-AF65-F5344CB8AC3E}">
+        <p14:creationId xmlns:p14="http://schemas.microsoft.com/office/powerpoint/2010/main" val="4200062102"/>
+      </p:ext>
+    </p:extLst>
+  </p:cSld>
+  <p:clrMapOvr>
+    <a:masterClrMapping/>
+  </p:clrMapOvr>
+</p:sld>
+</file>
+
+<file path=ppt/slides/slide9.xml><?xml version="1.0" encoding="utf-8"?>
+<p:sld xmlns:a="http://schemas.openxmlformats.org/drawingml/2006/main" xmlns:r="http://schemas.openxmlformats.org/officeDocument/2006/relationships" xmlns:p="http://schemas.openxmlformats.org/presentationml/2006/main">
+  <p:cSld>
+    <p:spTree>
+      <p:nvGrpSpPr>
+        <p:cNvPr id="1" name="">
+          <a:extLst>
+            <a:ext uri="{FF2B5EF4-FFF2-40B4-BE49-F238E27FC236}">
+              <a16:creationId xmlns:a16="http://schemas.microsoft.com/office/drawing/2014/main" id="{193E0D41-AE2C-8FC6-873D-950FC075F5E3}"/>
+            </a:ext>
+          </a:extLst>
+        </p:cNvPr>
+        <p:cNvGrpSpPr/>
+        <p:nvPr/>
+      </p:nvGrpSpPr>
+      <p:grpSpPr>
+        <a:xfrm>
+          <a:off x="0" y="0"/>
+          <a:ext cx="0" cy="0"/>
+          <a:chOff x="0" y="0"/>
+          <a:chExt cx="0" cy="0"/>
+        </a:xfrm>
+      </p:grpSpPr>
+      <p:sp>
+        <p:nvSpPr>
+          <p:cNvPr id="5" name="TextBox 4">
+            <a:extLst>
+              <a:ext uri="{FF2B5EF4-FFF2-40B4-BE49-F238E27FC236}">
+                <a16:creationId xmlns:a16="http://schemas.microsoft.com/office/drawing/2014/main" id="{948F1268-502C-82E4-5BB7-7807ECC81777}"/>
+              </a:ext>
+            </a:extLst>
+          </p:cNvPr>
+          <p:cNvSpPr txBox="1"/>
+          <p:nvPr/>
+        </p:nvSpPr>
+        <p:spPr>
+          <a:xfrm>
+            <a:off x="353053" y="9051608"/>
+            <a:ext cx="11658600" cy="1938992"/>
+          </a:xfrm>
+          <a:prstGeom prst="rect">
+            <a:avLst/>
+          </a:prstGeom>
+          <a:noFill/>
+        </p:spPr>
+        <p:txBody>
+          <a:bodyPr wrap="square">
+            <a:spAutoFit/>
+          </a:bodyPr>
+          <a:lstStyle/>
+          <a:p>
+            <a:pPr algn="ctr"/>
+            <a:r>
+              <a:rPr lang="en-US" sz="2800" b="0" dirty="0">
+                <a:solidFill>
+                  <a:schemeClr val="tx1"/>
+                </a:solidFill>
+                <a:effectLst/>
+                <a:latin typeface="+mj-lt"/>
+              </a:rPr>
+              <a:t>Loan applicants those applying it for 60 months are likely to default more than the those for 36 months.</a:t>
+            </a:r>
+          </a:p>
+          <a:p>
+            <a:pPr algn="l"/>
+            <a:endParaRPr lang="fr-FR" sz="2400" b="1" dirty="0">
+              <a:solidFill>
+                <a:srgbClr val="569CD6"/>
+              </a:solidFill>
+              <a:latin typeface="+mn-lt"/>
+            </a:endParaRPr>
+          </a:p>
+          <a:p>
+            <a:pPr algn="l"/>
+            <a:endParaRPr lang="en-IN" sz="4000" dirty="0">
+              <a:latin typeface="+mn-lt"/>
+            </a:endParaRPr>
+          </a:p>
+        </p:txBody>
+      </p:sp>
+      <p:sp>
+        <p:nvSpPr>
+          <p:cNvPr id="4" name="TextBox 3">
+            <a:extLst>
+              <a:ext uri="{FF2B5EF4-FFF2-40B4-BE49-F238E27FC236}">
+                <a16:creationId xmlns:a16="http://schemas.microsoft.com/office/drawing/2014/main" id="{A3DD0183-5997-7AFF-1FD7-E0ECBAA17B09}"/>
+              </a:ext>
+            </a:extLst>
+          </p:cNvPr>
+          <p:cNvSpPr txBox="1"/>
+          <p:nvPr/>
+        </p:nvSpPr>
+        <p:spPr>
+          <a:xfrm>
+            <a:off x="457200" y="1371600"/>
+            <a:ext cx="11658600" cy="2554545"/>
+          </a:xfrm>
+          <a:prstGeom prst="rect">
+            <a:avLst/>
+          </a:prstGeom>
+          <a:noFill/>
+        </p:spPr>
+        <p:txBody>
+          <a:bodyPr wrap="square">
+            <a:spAutoFit/>
+          </a:bodyPr>
+          <a:lstStyle/>
+          <a:p>
+            <a:pPr algn="l"/>
+            <a:r>
+              <a:rPr lang="en-US" sz="4000" b="1" dirty="0">
+                <a:solidFill>
+                  <a:srgbClr val="569CD6"/>
+                </a:solidFill>
+                <a:effectLst/>
+                <a:latin typeface="+mn-lt"/>
+                <a:ea typeface="Calibri" panose="020F0502020204030204" pitchFamily="34" charset="0"/>
+                <a:cs typeface="Calibri" panose="020F0502020204030204" pitchFamily="34" charset="0"/>
+              </a:rPr>
+              <a:t>Bivariate Analysis of Ordered Categorical Variables.</a:t>
+            </a:r>
+            <a:endParaRPr lang="fr-FR" sz="4000" b="1" dirty="0">
+              <a:solidFill>
+                <a:srgbClr val="569CD6"/>
+              </a:solidFill>
+              <a:effectLst/>
+              <a:latin typeface="+mn-lt"/>
+            </a:endParaRPr>
+          </a:p>
+          <a:p>
+            <a:pPr algn="l"/>
+            <a:r>
+              <a:rPr lang="en-US" sz="4000" b="1" dirty="0">
+                <a:solidFill>
+                  <a:schemeClr val="tx1"/>
+                </a:solidFill>
+                <a:latin typeface="+mn-lt"/>
+              </a:rPr>
+              <a:t>2</a:t>
+            </a:r>
+            <a:r>
+              <a:rPr lang="en-US" sz="4000" b="1" dirty="0">
+                <a:solidFill>
+                  <a:schemeClr val="tx1"/>
+                </a:solidFill>
+                <a:effectLst/>
+                <a:latin typeface="+mn-lt"/>
+              </a:rPr>
+              <a:t>. Term of Loan Vs Loan Status</a:t>
+            </a:r>
+          </a:p>
+          <a:p>
+            <a:pPr algn="l"/>
+            <a:endParaRPr lang="fr-FR" sz="4000" b="1" dirty="0">
+              <a:solidFill>
+                <a:srgbClr val="569CD6"/>
+              </a:solidFill>
+              <a:latin typeface="+mn-lt"/>
+            </a:endParaRPr>
+          </a:p>
+          <a:p>
+            <a:pPr algn="l"/>
+            <a:endParaRPr lang="en-IN" sz="4000" dirty="0">
+              <a:latin typeface="+mn-lt"/>
+            </a:endParaRPr>
+          </a:p>
+        </p:txBody>
+      </p:sp>
+      <p:pic>
+        <p:nvPicPr>
+          <p:cNvPr id="6" name="Picture 5">
+            <a:extLst>
+              <a:ext uri="{FF2B5EF4-FFF2-40B4-BE49-F238E27FC236}">
+                <a16:creationId xmlns:a16="http://schemas.microsoft.com/office/drawing/2014/main" id="{60939678-207D-E196-3DF8-472D290F1BF0}"/>
+              </a:ext>
+            </a:extLst>
+          </p:cNvPr>
+          <p:cNvPicPr>
+            <a:picLocks noChangeAspect="1"/>
+          </p:cNvPicPr>
+          <p:nvPr/>
+        </p:nvPicPr>
+        <p:blipFill>
+          <a:blip r:embed="rId2"/>
+          <a:stretch>
+            <a:fillRect/>
+          </a:stretch>
+        </p:blipFill>
+        <p:spPr>
+          <a:xfrm>
+            <a:off x="0" y="2743200"/>
+            <a:ext cx="11974404" cy="6402736"/>
+          </a:xfrm>
+          <a:prstGeom prst="rect">
+            <a:avLst/>
+          </a:prstGeom>
+        </p:spPr>
+      </p:pic>
+    </p:spTree>
+    <p:extLst>
+      <p:ext uri="{BB962C8B-B14F-4D97-AF65-F5344CB8AC3E}">
+        <p14:creationId xmlns:p14="http://schemas.microsoft.com/office/powerpoint/2010/main" val="3794477351"/>
       </p:ext>
     </p:extLst>
   </p:cSld>

</xml_diff>